<commit_message>
updated mod 01 ppt and added mod 3 ppt
</commit_message>
<xml_diff>
--- a/Templates/PPTs and pdfs released apr 2019/AZ-900T01 Microsoft Azure Fundamentals-01.pptx
+++ b/Templates/PPTs and pdfs released apr 2019/AZ-900T01 Microsoft Azure Fundamentals-01.pptx
@@ -21,18 +21,18 @@
     <p:sldId id="1670" r:id="rId12"/>
     <p:sldId id="1860" r:id="rId13"/>
     <p:sldId id="1859" r:id="rId14"/>
-    <p:sldId id="1889" r:id="rId15"/>
+    <p:sldId id="1905" r:id="rId15"/>
     <p:sldId id="1890" r:id="rId16"/>
     <p:sldId id="1891" r:id="rId17"/>
-    <p:sldId id="1892" r:id="rId18"/>
-    <p:sldId id="1861" r:id="rId19"/>
-    <p:sldId id="1894" r:id="rId20"/>
+    <p:sldId id="1861" r:id="rId18"/>
+    <p:sldId id="1906" r:id="rId19"/>
+    <p:sldId id="1907" r:id="rId20"/>
     <p:sldId id="1893" r:id="rId21"/>
     <p:sldId id="1895" r:id="rId22"/>
     <p:sldId id="1896" r:id="rId23"/>
-    <p:sldId id="1899" r:id="rId24"/>
-    <p:sldId id="1901" r:id="rId25"/>
-    <p:sldId id="1902" r:id="rId26"/>
+    <p:sldId id="1908" r:id="rId24"/>
+    <p:sldId id="1909" r:id="rId25"/>
+    <p:sldId id="1910" r:id="rId26"/>
     <p:sldId id="1862" r:id="rId27"/>
     <p:sldId id="1903" r:id="rId28"/>
     <p:sldId id="1904" r:id="rId29"/>
@@ -151,18 +151,18 @@
             <p14:sldId id="1670"/>
             <p14:sldId id="1860"/>
             <p14:sldId id="1859"/>
-            <p14:sldId id="1889"/>
+            <p14:sldId id="1905"/>
             <p14:sldId id="1890"/>
             <p14:sldId id="1891"/>
-            <p14:sldId id="1892"/>
             <p14:sldId id="1861"/>
-            <p14:sldId id="1894"/>
+            <p14:sldId id="1906"/>
+            <p14:sldId id="1907"/>
             <p14:sldId id="1893"/>
             <p14:sldId id="1895"/>
             <p14:sldId id="1896"/>
-            <p14:sldId id="1899"/>
-            <p14:sldId id="1901"/>
-            <p14:sldId id="1902"/>
+            <p14:sldId id="1908"/>
+            <p14:sldId id="1909"/>
+            <p14:sldId id="1910"/>
             <p14:sldId id="1862"/>
             <p14:sldId id="1903"/>
             <p14:sldId id="1904"/>
@@ -302,7 +302,7 @@
               <a:rPr lang="en-US" smtClean="0">
                 <a:latin typeface="Segoe UI" pitchFamily="34" charset="0"/>
               </a:rPr>
-              <a:t>4/5/2019 12:39 PM</a:t>
+              <a:t>4/6/2019 5:49 AM</a:t>
             </a:fld>
             <a:endParaRPr lang="en-US" dirty="0">
               <a:latin typeface="Segoe UI" pitchFamily="34" charset="0"/>
@@ -580,7 +580,7 @@
           <a:p>
             <a:fld id="{386CE63F-9E7F-4C04-9D0D-FCA25A8E9E86}" type="datetime8">
               <a:rPr lang="en-US" smtClean="0"/>
-              <a:t>4/5/2019 12:39 PM</a:t>
+              <a:t>4/6/2019 5:49 AM</a:t>
             </a:fld>
             <a:endParaRPr lang="en-US" dirty="0"/>
           </a:p>
@@ -947,7 +947,7 @@
           <a:p>
             <a:fld id="{3619146B-24F9-441E-A368-DB3B5A84C1D4}" type="datetime8">
               <a:rPr lang="en-US" smtClean="0"/>
-              <a:t>4/5/2019 12:42 PM</a:t>
+              <a:t>4/6/2019 5:49 AM</a:t>
             </a:fld>
             <a:endParaRPr lang="en-US" dirty="0"/>
           </a:p>
@@ -1112,7 +1112,7 @@
           <a:p>
             <a:fld id="{E2F19A73-88F5-4B80-A929-CF8E66EE5449}" type="datetime8">
               <a:rPr lang="en-US" smtClean="0"/>
-              <a:t>4/5/2019 1:20 PM</a:t>
+              <a:t>4/6/2019 5:49 AM</a:t>
             </a:fld>
             <a:endParaRPr lang="en-US" dirty="0"/>
           </a:p>
@@ -1277,7 +1277,7 @@
           <a:p>
             <a:fld id="{801BB6DB-292D-4F55-8FEB-A2186E983E2E}" type="datetime8">
               <a:rPr lang="en-US" smtClean="0"/>
-              <a:t>4/5/2019 1:20 PM</a:t>
+              <a:t>4/6/2019 5:49 AM</a:t>
             </a:fld>
             <a:endParaRPr lang="en-US" dirty="0"/>
           </a:p>
@@ -1374,7 +1374,7 @@
                   <a:schemeClr val="tx1"/>
                 </a:solidFill>
                 <a:effectLst/>
-                <a:latin typeface="+mn-lt"/>
+                <a:latin typeface="Segoe UI Light" pitchFamily="34" charset="0"/>
                 <a:ea typeface="+mn-ea"/>
                 <a:cs typeface="+mn-cs"/>
               </a:rPr>
@@ -1450,7 +1450,7 @@
                   <a:schemeClr val="tx1"/>
                 </a:solidFill>
                 <a:effectLst/>
-                <a:latin typeface="+mn-lt"/>
+                <a:latin typeface="Segoe UI Light" pitchFamily="34" charset="0"/>
                 <a:ea typeface="+mn-ea"/>
                 <a:cs typeface="+mn-cs"/>
               </a:rPr>
@@ -1459,97 +1459,126 @@
             <a:endParaRPr lang="en-IE" sz="900" dirty="0"/>
           </a:p>
           <a:p>
-            <a:endParaRPr lang="en-US" dirty="0"/>
-          </a:p>
-        </p:txBody>
-      </p:sp>
-      <p:sp>
-        <p:nvSpPr>
-          <p:cNvPr id="4" name="Slide Number Placeholder 3"/>
-          <p:cNvSpPr>
-            <a:spLocks noGrp="1"/>
-          </p:cNvSpPr>
-          <p:nvPr>
-            <p:ph type="sldNum" sz="quarter" idx="5"/>
-          </p:nvPr>
-        </p:nvSpPr>
-        <p:spPr/>
-        <p:txBody>
-          <a:bodyPr/>
-          <a:lstStyle/>
-          <a:p>
-            <a:pPr marL="0" marR="0" lvl="0" indent="0" algn="r" defTabSz="914400" rtl="0" eaLnBrk="1" fontAlgn="auto" latinLnBrk="0" hangingPunct="1">
-              <a:lnSpc>
-                <a:spcPct val="100000"/>
-              </a:lnSpc>
-              <a:spcBef>
-                <a:spcPts val="0"/>
-              </a:spcBef>
-              <a:spcAft>
-                <a:spcPts val="0"/>
-              </a:spcAft>
-              <a:buClrTx/>
-              <a:buSzTx/>
-              <a:buFontTx/>
-              <a:buNone/>
-              <a:tabLst/>
-              <a:defRPr/>
-            </a:pPr>
-            <a:fld id="{6F86FB4F-9A3A-4149-B0E9-5278F91246FB}" type="slidenum">
-              <a:rPr kumimoji="0" lang="en-US" sz="1200" b="0" i="0" u="none" strike="noStrike" kern="1200" cap="none" spc="0" normalizeH="0" baseline="0" noProof="0" smtClean="0">
-                <a:ln>
-                  <a:noFill/>
-                </a:ln>
-                <a:solidFill>
-                  <a:prstClr val="black"/>
-                </a:solidFill>
-                <a:effectLst/>
-                <a:uLnTx/>
-                <a:uFillTx/>
-                <a:latin typeface="Calibri" panose="020F0502020204030204"/>
-                <a:ea typeface="+mn-ea"/>
-                <a:cs typeface="+mn-cs"/>
-              </a:rPr>
-              <a:pPr marL="0" marR="0" lvl="0" indent="0" algn="r" defTabSz="914400" rtl="0" eaLnBrk="1" fontAlgn="auto" latinLnBrk="0" hangingPunct="1">
-                <a:lnSpc>
-                  <a:spcPct val="100000"/>
-                </a:lnSpc>
-                <a:spcBef>
-                  <a:spcPts val="0"/>
-                </a:spcBef>
-                <a:spcAft>
-                  <a:spcPts val="0"/>
-                </a:spcAft>
-                <a:buClrTx/>
-                <a:buSzTx/>
-                <a:buFontTx/>
-                <a:buNone/>
-                <a:tabLst/>
-                <a:defRPr/>
-              </a:pPr>
-              <a:t>12</a:t>
-            </a:fld>
-            <a:endParaRPr kumimoji="0" lang="en-US" sz="1200" b="0" i="0" u="none" strike="noStrike" kern="1200" cap="none" spc="0" normalizeH="0" baseline="0" noProof="0" dirty="0">
-              <a:ln>
-                <a:noFill/>
-              </a:ln>
+            <a:endParaRPr lang="en-IE" sz="900" b="0" i="0" u="none" strike="noStrike" kern="1200" dirty="0">
               <a:solidFill>
-                <a:prstClr val="black"/>
+                <a:schemeClr val="tx1"/>
               </a:solidFill>
               <a:effectLst/>
-              <a:uLnTx/>
-              <a:uFillTx/>
-              <a:latin typeface="Calibri" panose="020F0502020204030204"/>
+              <a:latin typeface="Segoe UI Light" pitchFamily="34" charset="0"/>
               <a:ea typeface="+mn-ea"/>
               <a:cs typeface="+mn-cs"/>
             </a:endParaRPr>
           </a:p>
         </p:txBody>
       </p:sp>
+      <p:sp>
+        <p:nvSpPr>
+          <p:cNvPr id="4" name="Header Placeholder 3"/>
+          <p:cNvSpPr>
+            <a:spLocks noGrp="1"/>
+          </p:cNvSpPr>
+          <p:nvPr>
+            <p:ph type="hdr" sz="quarter" idx="10"/>
+          </p:nvPr>
+        </p:nvSpPr>
+        <p:spPr/>
+        <p:txBody>
+          <a:bodyPr/>
+          <a:lstStyle/>
+          <a:p>
+            <a:endParaRPr lang="en-US" dirty="0"/>
+          </a:p>
+        </p:txBody>
+      </p:sp>
+      <p:sp>
+        <p:nvSpPr>
+          <p:cNvPr id="5" name="Footer Placeholder 4"/>
+          <p:cNvSpPr>
+            <a:spLocks noGrp="1"/>
+          </p:cNvSpPr>
+          <p:nvPr>
+            <p:ph type="ftr" sz="quarter" idx="11"/>
+          </p:nvPr>
+        </p:nvSpPr>
+        <p:spPr/>
+        <p:txBody>
+          <a:bodyPr/>
+          <a:lstStyle/>
+          <a:p>
+            <a:pPr defTabSz="914099" eaLnBrk="0" hangingPunct="0"/>
+            <a:r>
+              <a:rPr lang="en-US" sz="400" dirty="0">
+                <a:gradFill>
+                  <a:gsLst>
+                    <a:gs pos="0">
+                      <a:prstClr val="black"/>
+                    </a:gs>
+                    <a:gs pos="100000">
+                      <a:prstClr val="black"/>
+                    </a:gs>
+                  </a:gsLst>
+                  <a:lin ang="5400000" scaled="0"/>
+                </a:gradFill>
+                <a:latin typeface="Segoe UI" pitchFamily="34" charset="0"/>
+                <a:ea typeface="Segoe UI" pitchFamily="34" charset="0"/>
+                <a:cs typeface="Segoe UI" pitchFamily="34" charset="0"/>
+              </a:rPr>
+              <a:t>© Microsoft Corporation. All rights reserved. MICROSOFT MAKES NO WARRANTIES, EXPRESS, IMPLIED OR STATUTORY, AS TO THE INFORMATION IN THIS PRESENTATION.</a:t>
+            </a:r>
+          </a:p>
+        </p:txBody>
+      </p:sp>
+      <p:sp>
+        <p:nvSpPr>
+          <p:cNvPr id="6" name="Date Placeholder 5"/>
+          <p:cNvSpPr>
+            <a:spLocks noGrp="1"/>
+          </p:cNvSpPr>
+          <p:nvPr>
+            <p:ph type="dt" idx="12"/>
+          </p:nvPr>
+        </p:nvSpPr>
+        <p:spPr/>
+        <p:txBody>
+          <a:bodyPr/>
+          <a:lstStyle/>
+          <a:p>
+            <a:fld id="{9427A7F7-BB1E-479D-AFAA-B52F4D0C99F2}" type="datetime8">
+              <a:rPr lang="en-US" smtClean="0"/>
+              <a:t>4/6/2019 6:01 AM</a:t>
+            </a:fld>
+            <a:endParaRPr lang="en-US" dirty="0"/>
+          </a:p>
+        </p:txBody>
+      </p:sp>
+      <p:sp>
+        <p:nvSpPr>
+          <p:cNvPr id="7" name="Slide Number Placeholder 6"/>
+          <p:cNvSpPr>
+            <a:spLocks noGrp="1"/>
+          </p:cNvSpPr>
+          <p:nvPr>
+            <p:ph type="sldNum" sz="quarter" idx="13"/>
+          </p:nvPr>
+        </p:nvSpPr>
+        <p:spPr/>
+        <p:txBody>
+          <a:bodyPr/>
+          <a:lstStyle/>
+          <a:p>
+            <a:fld id="{B4008EB6-D09E-4580-8CD6-DDB14511944F}" type="slidenum">
+              <a:rPr lang="en-US" smtClean="0"/>
+              <a:pPr/>
+              <a:t>12</a:t>
+            </a:fld>
+            <a:endParaRPr lang="en-US" dirty="0"/>
+          </a:p>
+        </p:txBody>
+      </p:sp>
     </p:spTree>
     <p:extLst>
       <p:ext uri="{BB962C8B-B14F-4D97-AF65-F5344CB8AC3E}">
-        <p14:creationId xmlns:p14="http://schemas.microsoft.com/office/powerpoint/2010/main" val="2994943541"/>
+        <p14:creationId xmlns:p14="http://schemas.microsoft.com/office/powerpoint/2010/main" val="372472870"/>
       </p:ext>
     </p:extLst>
   </p:cSld>
@@ -1888,7 +1917,7 @@
           <a:p>
             <a:fld id="{9427A7F7-BB1E-479D-AFAA-B52F4D0C99F2}" type="datetime8">
               <a:rPr lang="en-US" smtClean="0"/>
-              <a:t>4/5/2019 1:26 PM</a:t>
+              <a:t>4/6/2019 6:01 AM</a:t>
             </a:fld>
             <a:endParaRPr lang="en-US" dirty="0"/>
           </a:p>
@@ -1921,7 +1950,7 @@
     </p:spTree>
     <p:extLst>
       <p:ext uri="{BB962C8B-B14F-4D97-AF65-F5344CB8AC3E}">
-        <p14:creationId xmlns:p14="http://schemas.microsoft.com/office/powerpoint/2010/main" val="372472870"/>
+        <p14:creationId xmlns:p14="http://schemas.microsoft.com/office/powerpoint/2010/main" val="2238523764"/>
       </p:ext>
     </p:extLst>
   </p:cSld>
@@ -2183,7 +2212,7 @@
                   <a:schemeClr val="tx1"/>
                 </a:solidFill>
                 <a:effectLst/>
-                <a:latin typeface="+mn-lt"/>
+                <a:latin typeface="Segoe UI Light" pitchFamily="34" charset="0"/>
                 <a:ea typeface="+mn-ea"/>
                 <a:cs typeface="+mn-cs"/>
               </a:rPr>
@@ -2196,97 +2225,129 @@
               </a:rPr>
               <a:t>https://azure.microsoft.com/en-us/overview/hybrid-cloud/</a:t>
             </a:r>
-            <a:endParaRPr lang="en-US" dirty="0"/>
-          </a:p>
-        </p:txBody>
-      </p:sp>
-      <p:sp>
-        <p:nvSpPr>
-          <p:cNvPr id="4" name="Slide Number Placeholder 3"/>
-          <p:cNvSpPr>
-            <a:spLocks noGrp="1"/>
-          </p:cNvSpPr>
-          <p:nvPr>
-            <p:ph type="sldNum" sz="quarter" idx="5"/>
-          </p:nvPr>
-        </p:nvSpPr>
-        <p:spPr/>
-        <p:txBody>
-          <a:bodyPr/>
-          <a:lstStyle/>
-          <a:p>
-            <a:pPr marL="0" marR="0" lvl="0" indent="0" algn="r" defTabSz="914400" rtl="0" eaLnBrk="1" fontAlgn="auto" latinLnBrk="0" hangingPunct="1">
-              <a:lnSpc>
-                <a:spcPct val="100000"/>
-              </a:lnSpc>
-              <a:spcBef>
-                <a:spcPts val="0"/>
-              </a:spcBef>
-              <a:spcAft>
-                <a:spcPts val="0"/>
-              </a:spcAft>
-              <a:buClrTx/>
-              <a:buSzTx/>
-              <a:buFontTx/>
-              <a:buNone/>
-              <a:tabLst/>
-              <a:defRPr/>
-            </a:pPr>
-            <a:fld id="{6F86FB4F-9A3A-4149-B0E9-5278F91246FB}" type="slidenum">
-              <a:rPr kumimoji="0" lang="en-US" sz="1200" b="0" i="0" u="none" strike="noStrike" kern="1200" cap="none" spc="0" normalizeH="0" baseline="0" noProof="0" smtClean="0">
-                <a:ln>
-                  <a:noFill/>
-                </a:ln>
-                <a:solidFill>
-                  <a:prstClr val="black"/>
-                </a:solidFill>
-                <a:effectLst/>
-                <a:uLnTx/>
-                <a:uFillTx/>
-                <a:latin typeface="Calibri" panose="020F0502020204030204"/>
-                <a:ea typeface="+mn-ea"/>
-                <a:cs typeface="+mn-cs"/>
-              </a:rPr>
-              <a:pPr marL="0" marR="0" lvl="0" indent="0" algn="r" defTabSz="914400" rtl="0" eaLnBrk="1" fontAlgn="auto" latinLnBrk="0" hangingPunct="1">
-                <a:lnSpc>
-                  <a:spcPct val="100000"/>
-                </a:lnSpc>
-                <a:spcBef>
-                  <a:spcPts val="0"/>
-                </a:spcBef>
-                <a:spcAft>
-                  <a:spcPts val="0"/>
-                </a:spcAft>
-                <a:buClrTx/>
-                <a:buSzTx/>
-                <a:buFontTx/>
-                <a:buNone/>
-                <a:tabLst/>
-                <a:defRPr/>
-              </a:pPr>
-              <a:t>14</a:t>
-            </a:fld>
-            <a:endParaRPr kumimoji="0" lang="en-US" sz="1200" b="0" i="0" u="none" strike="noStrike" kern="1200" cap="none" spc="0" normalizeH="0" baseline="0" noProof="0" dirty="0">
-              <a:ln>
-                <a:noFill/>
-              </a:ln>
+            <a:endParaRPr lang="en-US" sz="900" dirty="0"/>
+          </a:p>
+          <a:p>
+            <a:endParaRPr lang="en-IE" sz="900" b="0" i="0" u="none" strike="noStrike" kern="1200" dirty="0">
               <a:solidFill>
-                <a:prstClr val="black"/>
+                <a:schemeClr val="tx1"/>
               </a:solidFill>
               <a:effectLst/>
-              <a:uLnTx/>
-              <a:uFillTx/>
-              <a:latin typeface="Calibri" panose="020F0502020204030204"/>
+              <a:latin typeface="Segoe UI Light" pitchFamily="34" charset="0"/>
               <a:ea typeface="+mn-ea"/>
               <a:cs typeface="+mn-cs"/>
             </a:endParaRPr>
           </a:p>
         </p:txBody>
       </p:sp>
+      <p:sp>
+        <p:nvSpPr>
+          <p:cNvPr id="4" name="Header Placeholder 3"/>
+          <p:cNvSpPr>
+            <a:spLocks noGrp="1"/>
+          </p:cNvSpPr>
+          <p:nvPr>
+            <p:ph type="hdr" sz="quarter" idx="10"/>
+          </p:nvPr>
+        </p:nvSpPr>
+        <p:spPr/>
+        <p:txBody>
+          <a:bodyPr/>
+          <a:lstStyle/>
+          <a:p>
+            <a:endParaRPr lang="en-US" dirty="0"/>
+          </a:p>
+        </p:txBody>
+      </p:sp>
+      <p:sp>
+        <p:nvSpPr>
+          <p:cNvPr id="5" name="Footer Placeholder 4"/>
+          <p:cNvSpPr>
+            <a:spLocks noGrp="1"/>
+          </p:cNvSpPr>
+          <p:nvPr>
+            <p:ph type="ftr" sz="quarter" idx="11"/>
+          </p:nvPr>
+        </p:nvSpPr>
+        <p:spPr/>
+        <p:txBody>
+          <a:bodyPr/>
+          <a:lstStyle/>
+          <a:p>
+            <a:pPr defTabSz="914099" eaLnBrk="0" hangingPunct="0"/>
+            <a:r>
+              <a:rPr lang="en-US" sz="400" dirty="0">
+                <a:gradFill>
+                  <a:gsLst>
+                    <a:gs pos="0">
+                      <a:prstClr val="black"/>
+                    </a:gs>
+                    <a:gs pos="100000">
+                      <a:prstClr val="black"/>
+                    </a:gs>
+                  </a:gsLst>
+                  <a:lin ang="5400000" scaled="0"/>
+                </a:gradFill>
+                <a:latin typeface="Segoe UI" pitchFamily="34" charset="0"/>
+                <a:ea typeface="Segoe UI" pitchFamily="34" charset="0"/>
+                <a:cs typeface="Segoe UI" pitchFamily="34" charset="0"/>
+              </a:rPr>
+              <a:t>© Microsoft Corporation. All rights reserved. MICROSOFT MAKES NO WARRANTIES, EXPRESS, IMPLIED OR STATUTORY, AS TO THE INFORMATION IN THIS PRESENTATION.</a:t>
+            </a:r>
+          </a:p>
+        </p:txBody>
+      </p:sp>
+      <p:sp>
+        <p:nvSpPr>
+          <p:cNvPr id="6" name="Date Placeholder 5"/>
+          <p:cNvSpPr>
+            <a:spLocks noGrp="1"/>
+          </p:cNvSpPr>
+          <p:nvPr>
+            <p:ph type="dt" idx="12"/>
+          </p:nvPr>
+        </p:nvSpPr>
+        <p:spPr/>
+        <p:txBody>
+          <a:bodyPr/>
+          <a:lstStyle/>
+          <a:p>
+            <a:fld id="{9427A7F7-BB1E-479D-AFAA-B52F4D0C99F2}" type="datetime8">
+              <a:rPr lang="en-US" smtClean="0"/>
+              <a:t>4/6/2019 6:01 AM</a:t>
+            </a:fld>
+            <a:endParaRPr lang="en-US" dirty="0"/>
+          </a:p>
+        </p:txBody>
+      </p:sp>
+      <p:sp>
+        <p:nvSpPr>
+          <p:cNvPr id="7" name="Slide Number Placeholder 6"/>
+          <p:cNvSpPr>
+            <a:spLocks noGrp="1"/>
+          </p:cNvSpPr>
+          <p:nvPr>
+            <p:ph type="sldNum" sz="quarter" idx="13"/>
+          </p:nvPr>
+        </p:nvSpPr>
+        <p:spPr/>
+        <p:txBody>
+          <a:bodyPr/>
+          <a:lstStyle/>
+          <a:p>
+            <a:fld id="{B4008EB6-D09E-4580-8CD6-DDB14511944F}" type="slidenum">
+              <a:rPr lang="en-US" smtClean="0"/>
+              <a:pPr/>
+              <a:t>14</a:t>
+            </a:fld>
+            <a:endParaRPr lang="en-US" dirty="0"/>
+          </a:p>
+        </p:txBody>
+      </p:sp>
     </p:spTree>
     <p:extLst>
       <p:ext uri="{BB962C8B-B14F-4D97-AF65-F5344CB8AC3E}">
-        <p14:creationId xmlns:p14="http://schemas.microsoft.com/office/powerpoint/2010/main" val="3858503605"/>
+        <p14:creationId xmlns:p14="http://schemas.microsoft.com/office/powerpoint/2010/main" val="1018682050"/>
       </p:ext>
     </p:extLst>
   </p:cSld>
@@ -2571,7 +2632,7 @@
           <a:p>
             <a:fld id="{9427A7F7-BB1E-479D-AFAA-B52F4D0C99F2}" type="datetime8">
               <a:rPr lang="en-US" smtClean="0"/>
-              <a:t>4/5/2019 1:50 PM</a:t>
+              <a:t>4/6/2019 5:49 AM</a:t>
             </a:fld>
             <a:endParaRPr lang="en-US" dirty="0"/>
           </a:p>
@@ -2736,7 +2797,7 @@
           <a:p>
             <a:fld id="{E2F19A73-88F5-4B80-A929-CF8E66EE5449}" type="datetime8">
               <a:rPr lang="en-US" smtClean="0"/>
-              <a:t>4/5/2019 1:29 PM</a:t>
+              <a:t>4/6/2019 5:49 AM</a:t>
             </a:fld>
             <a:endParaRPr lang="en-US" dirty="0"/>
           </a:p>
@@ -2901,7 +2962,7 @@
           <a:p>
             <a:fld id="{801BB6DB-292D-4F55-8FEB-A2186E983E2E}" type="datetime8">
               <a:rPr lang="en-US" smtClean="0"/>
-              <a:t>4/5/2019 1:29 PM</a:t>
+              <a:t>4/6/2019 5:49 AM</a:t>
             </a:fld>
             <a:endParaRPr lang="en-US" dirty="0"/>
           </a:p>
@@ -2988,9 +3049,6 @@
           <a:bodyPr/>
           <a:lstStyle/>
           <a:p>
-            <a:endParaRPr lang="en-US" dirty="0"/>
-          </a:p>
-          <a:p>
             <a:r>
               <a:rPr lang="en-IE" sz="900" b="0" i="0" u="none" strike="noStrike" kern="1200" dirty="0">
                 <a:solidFill>
@@ -3016,12 +3074,12 @@
       </p:sp>
       <p:sp>
         <p:nvSpPr>
-          <p:cNvPr id="4" name="Slide Number Placeholder 3"/>
-          <p:cNvSpPr>
-            <a:spLocks noGrp="1"/>
-          </p:cNvSpPr>
-          <p:nvPr>
-            <p:ph type="sldNum" sz="quarter" idx="5"/>
+          <p:cNvPr id="4" name="Header Placeholder 3"/>
+          <p:cNvSpPr>
+            <a:spLocks noGrp="1"/>
+          </p:cNvSpPr>
+          <p:nvPr>
+            <p:ph type="hdr" sz="quarter" idx="10"/>
           </p:nvPr>
         </p:nvSpPr>
         <p:spPr/>
@@ -3029,78 +3087,99 @@
           <a:bodyPr/>
           <a:lstStyle/>
           <a:p>
-            <a:pPr marL="0" marR="0" lvl="0" indent="0" algn="r" defTabSz="914400" rtl="0" eaLnBrk="1" fontAlgn="auto" latinLnBrk="0" hangingPunct="1">
-              <a:lnSpc>
-                <a:spcPct val="100000"/>
-              </a:lnSpc>
-              <a:spcBef>
-                <a:spcPts val="0"/>
-              </a:spcBef>
-              <a:spcAft>
-                <a:spcPts val="0"/>
-              </a:spcAft>
-              <a:buClrTx/>
-              <a:buSzTx/>
-              <a:buFontTx/>
-              <a:buNone/>
-              <a:tabLst/>
-              <a:defRPr/>
-            </a:pPr>
-            <a:fld id="{6F86FB4F-9A3A-4149-B0E9-5278F91246FB}" type="slidenum">
-              <a:rPr kumimoji="0" lang="en-US" sz="1200" b="0" i="0" u="none" strike="noStrike" kern="1200" cap="none" spc="0" normalizeH="0" baseline="0" noProof="0" smtClean="0">
-                <a:ln>
-                  <a:noFill/>
-                </a:ln>
-                <a:solidFill>
-                  <a:prstClr val="black"/>
-                </a:solidFill>
-                <a:effectLst/>
-                <a:uLnTx/>
-                <a:uFillTx/>
-                <a:latin typeface="Calibri" panose="020F0502020204030204"/>
-                <a:ea typeface="+mn-ea"/>
-                <a:cs typeface="+mn-cs"/>
+            <a:endParaRPr lang="en-US" dirty="0"/>
+          </a:p>
+        </p:txBody>
+      </p:sp>
+      <p:sp>
+        <p:nvSpPr>
+          <p:cNvPr id="5" name="Footer Placeholder 4"/>
+          <p:cNvSpPr>
+            <a:spLocks noGrp="1"/>
+          </p:cNvSpPr>
+          <p:nvPr>
+            <p:ph type="ftr" sz="quarter" idx="11"/>
+          </p:nvPr>
+        </p:nvSpPr>
+        <p:spPr/>
+        <p:txBody>
+          <a:bodyPr/>
+          <a:lstStyle/>
+          <a:p>
+            <a:pPr defTabSz="914099" eaLnBrk="0" hangingPunct="0"/>
+            <a:r>
+              <a:rPr lang="en-US" sz="400" dirty="0">
+                <a:gradFill>
+                  <a:gsLst>
+                    <a:gs pos="0">
+                      <a:prstClr val="black"/>
+                    </a:gs>
+                    <a:gs pos="100000">
+                      <a:prstClr val="black"/>
+                    </a:gs>
+                  </a:gsLst>
+                  <a:lin ang="5400000" scaled="0"/>
+                </a:gradFill>
+                <a:latin typeface="Segoe UI" pitchFamily="34" charset="0"/>
+                <a:ea typeface="Segoe UI" pitchFamily="34" charset="0"/>
+                <a:cs typeface="Segoe UI" pitchFamily="34" charset="0"/>
               </a:rPr>
-              <a:pPr marL="0" marR="0" lvl="0" indent="0" algn="r" defTabSz="914400" rtl="0" eaLnBrk="1" fontAlgn="auto" latinLnBrk="0" hangingPunct="1">
-                <a:lnSpc>
-                  <a:spcPct val="100000"/>
-                </a:lnSpc>
-                <a:spcBef>
-                  <a:spcPts val="0"/>
-                </a:spcBef>
-                <a:spcAft>
-                  <a:spcPts val="0"/>
-                </a:spcAft>
-                <a:buClrTx/>
-                <a:buSzTx/>
-                <a:buFontTx/>
-                <a:buNone/>
-                <a:tabLst/>
-                <a:defRPr/>
-              </a:pPr>
+              <a:t>© Microsoft Corporation. All rights reserved. MICROSOFT MAKES NO WARRANTIES, EXPRESS, IMPLIED OR STATUTORY, AS TO THE INFORMATION IN THIS PRESENTATION.</a:t>
+            </a:r>
+          </a:p>
+        </p:txBody>
+      </p:sp>
+      <p:sp>
+        <p:nvSpPr>
+          <p:cNvPr id="6" name="Date Placeholder 5"/>
+          <p:cNvSpPr>
+            <a:spLocks noGrp="1"/>
+          </p:cNvSpPr>
+          <p:nvPr>
+            <p:ph type="dt" idx="12"/>
+          </p:nvPr>
+        </p:nvSpPr>
+        <p:spPr/>
+        <p:txBody>
+          <a:bodyPr/>
+          <a:lstStyle/>
+          <a:p>
+            <a:fld id="{9427A7F7-BB1E-479D-AFAA-B52F4D0C99F2}" type="datetime8">
+              <a:rPr lang="en-US" smtClean="0"/>
+              <a:t>4/6/2019 6:01 AM</a:t>
+            </a:fld>
+            <a:endParaRPr lang="en-US" dirty="0"/>
+          </a:p>
+        </p:txBody>
+      </p:sp>
+      <p:sp>
+        <p:nvSpPr>
+          <p:cNvPr id="7" name="Slide Number Placeholder 6"/>
+          <p:cNvSpPr>
+            <a:spLocks noGrp="1"/>
+          </p:cNvSpPr>
+          <p:nvPr>
+            <p:ph type="sldNum" sz="quarter" idx="13"/>
+          </p:nvPr>
+        </p:nvSpPr>
+        <p:spPr/>
+        <p:txBody>
+          <a:bodyPr/>
+          <a:lstStyle/>
+          <a:p>
+            <a:fld id="{B4008EB6-D09E-4580-8CD6-DDB14511944F}" type="slidenum">
+              <a:rPr lang="en-US" smtClean="0"/>
+              <a:pPr/>
               <a:t>18</a:t>
             </a:fld>
-            <a:endParaRPr kumimoji="0" lang="en-US" sz="1200" b="0" i="0" u="none" strike="noStrike" kern="1200" cap="none" spc="0" normalizeH="0" baseline="0" noProof="0" dirty="0">
-              <a:ln>
-                <a:noFill/>
-              </a:ln>
-              <a:solidFill>
-                <a:prstClr val="black"/>
-              </a:solidFill>
-              <a:effectLst/>
-              <a:uLnTx/>
-              <a:uFillTx/>
-              <a:latin typeface="Calibri" panose="020F0502020204030204"/>
-              <a:ea typeface="+mn-ea"/>
-              <a:cs typeface="+mn-cs"/>
-            </a:endParaRPr>
+            <a:endParaRPr lang="en-US" dirty="0"/>
           </a:p>
         </p:txBody>
       </p:sp>
     </p:spTree>
     <p:extLst>
       <p:ext uri="{BB962C8B-B14F-4D97-AF65-F5344CB8AC3E}">
-        <p14:creationId xmlns:p14="http://schemas.microsoft.com/office/powerpoint/2010/main" val="1638829061"/>
+        <p14:creationId xmlns:p14="http://schemas.microsoft.com/office/powerpoint/2010/main" val="467849115"/>
       </p:ext>
     </p:extLst>
   </p:cSld>
@@ -3154,12 +3233,6 @@
           <a:bodyPr/>
           <a:lstStyle/>
           <a:p>
-            <a:endParaRPr lang="en-IE" sz="900" b="1" dirty="0">
-              <a:latin typeface="Segoe UI Semilight" panose="020B0402040204020203" pitchFamily="34" charset="0"/>
-              <a:cs typeface="Segoe UI Semilight" panose="020B0402040204020203" pitchFamily="34" charset="0"/>
-            </a:endParaRPr>
-          </a:p>
-          <a:p>
             <a:r>
               <a:rPr lang="en-IE" sz="900" b="1" i="0" u="none" strike="noStrike" kern="1200" dirty="0">
                 <a:solidFill>
@@ -3230,7 +3303,31 @@
                 <a:ea typeface="+mn-ea"/>
                 <a:cs typeface="Segoe UI Semilight" panose="020B0402040204020203" pitchFamily="34" charset="0"/>
               </a:rPr>
-              <a:t>. Tools provided as a service with PaaS allow organizations to analyze and mine their data. They can find insights and patterns, and predict outcomes to improve business decisions such as forecasting, product design, and investment returns.</a:t>
+              <a:t>. Tools provided as a service with PaaS allow organizations to </a:t>
+            </a:r>
+            <a:r>
+              <a:rPr lang="en-IE" sz="900" b="0" i="0" u="none" strike="noStrike" kern="1200" dirty="0" err="1">
+                <a:solidFill>
+                  <a:schemeClr val="tx1"/>
+                </a:solidFill>
+                <a:effectLst/>
+                <a:latin typeface="Segoe UI Semilight" panose="020B0402040204020203" pitchFamily="34" charset="0"/>
+                <a:ea typeface="+mn-ea"/>
+                <a:cs typeface="Segoe UI Semilight" panose="020B0402040204020203" pitchFamily="34" charset="0"/>
+              </a:rPr>
+              <a:t>analyze</a:t>
+            </a:r>
+            <a:r>
+              <a:rPr lang="en-IE" sz="900" b="0" i="0" u="none" strike="noStrike" kern="1200" dirty="0">
+                <a:solidFill>
+                  <a:schemeClr val="tx1"/>
+                </a:solidFill>
+                <a:effectLst/>
+                <a:latin typeface="Segoe UI Semilight" panose="020B0402040204020203" pitchFamily="34" charset="0"/>
+                <a:ea typeface="+mn-ea"/>
+                <a:cs typeface="Segoe UI Semilight" panose="020B0402040204020203" pitchFamily="34" charset="0"/>
+              </a:rPr>
+              <a:t> and mine their data. They can find insights and patterns, and predict outcomes to improve business decisions such as forecasting, product design, and investment returns.</a:t>
             </a:r>
           </a:p>
           <a:p>
@@ -3265,18 +3362,18 @@
               <a:rPr lang="en-IE" sz="900" u="sng" dirty="0"/>
               <a:t>https://azure.microsoft.com/en-us/overview/what-is-paas/</a:t>
             </a:r>
-            <a:endParaRPr lang="en-US" dirty="0"/>
-          </a:p>
-        </p:txBody>
-      </p:sp>
-      <p:sp>
-        <p:nvSpPr>
-          <p:cNvPr id="4" name="Slide Number Placeholder 3"/>
-          <p:cNvSpPr>
-            <a:spLocks noGrp="1"/>
-          </p:cNvSpPr>
-          <p:nvPr>
-            <p:ph type="sldNum" sz="quarter" idx="5"/>
+            <a:endParaRPr lang="en-US" sz="900" dirty="0"/>
+          </a:p>
+        </p:txBody>
+      </p:sp>
+      <p:sp>
+        <p:nvSpPr>
+          <p:cNvPr id="4" name="Header Placeholder 3"/>
+          <p:cNvSpPr>
+            <a:spLocks noGrp="1"/>
+          </p:cNvSpPr>
+          <p:nvPr>
+            <p:ph type="hdr" sz="quarter" idx="10"/>
           </p:nvPr>
         </p:nvSpPr>
         <p:spPr/>
@@ -3284,78 +3381,99 @@
           <a:bodyPr/>
           <a:lstStyle/>
           <a:p>
-            <a:pPr marL="0" marR="0" lvl="0" indent="0" algn="r" defTabSz="914400" rtl="0" eaLnBrk="1" fontAlgn="auto" latinLnBrk="0" hangingPunct="1">
-              <a:lnSpc>
-                <a:spcPct val="100000"/>
-              </a:lnSpc>
-              <a:spcBef>
-                <a:spcPts val="0"/>
-              </a:spcBef>
-              <a:spcAft>
-                <a:spcPts val="0"/>
-              </a:spcAft>
-              <a:buClrTx/>
-              <a:buSzTx/>
-              <a:buFontTx/>
-              <a:buNone/>
-              <a:tabLst/>
-              <a:defRPr/>
-            </a:pPr>
-            <a:fld id="{6F86FB4F-9A3A-4149-B0E9-5278F91246FB}" type="slidenum">
-              <a:rPr kumimoji="0" lang="en-US" sz="1200" b="0" i="0" u="none" strike="noStrike" kern="1200" cap="none" spc="0" normalizeH="0" baseline="0" noProof="0" smtClean="0">
-                <a:ln>
-                  <a:noFill/>
-                </a:ln>
-                <a:solidFill>
-                  <a:prstClr val="black"/>
-                </a:solidFill>
-                <a:effectLst/>
-                <a:uLnTx/>
-                <a:uFillTx/>
-                <a:latin typeface="Calibri" panose="020F0502020204030204"/>
-                <a:ea typeface="+mn-ea"/>
-                <a:cs typeface="+mn-cs"/>
+            <a:endParaRPr lang="en-US" dirty="0"/>
+          </a:p>
+        </p:txBody>
+      </p:sp>
+      <p:sp>
+        <p:nvSpPr>
+          <p:cNvPr id="5" name="Footer Placeholder 4"/>
+          <p:cNvSpPr>
+            <a:spLocks noGrp="1"/>
+          </p:cNvSpPr>
+          <p:nvPr>
+            <p:ph type="ftr" sz="quarter" idx="11"/>
+          </p:nvPr>
+        </p:nvSpPr>
+        <p:spPr/>
+        <p:txBody>
+          <a:bodyPr/>
+          <a:lstStyle/>
+          <a:p>
+            <a:pPr defTabSz="914099" eaLnBrk="0" hangingPunct="0"/>
+            <a:r>
+              <a:rPr lang="en-US" sz="400" dirty="0">
+                <a:gradFill>
+                  <a:gsLst>
+                    <a:gs pos="0">
+                      <a:prstClr val="black"/>
+                    </a:gs>
+                    <a:gs pos="100000">
+                      <a:prstClr val="black"/>
+                    </a:gs>
+                  </a:gsLst>
+                  <a:lin ang="5400000" scaled="0"/>
+                </a:gradFill>
+                <a:latin typeface="Segoe UI" pitchFamily="34" charset="0"/>
+                <a:ea typeface="Segoe UI" pitchFamily="34" charset="0"/>
+                <a:cs typeface="Segoe UI" pitchFamily="34" charset="0"/>
               </a:rPr>
-              <a:pPr marL="0" marR="0" lvl="0" indent="0" algn="r" defTabSz="914400" rtl="0" eaLnBrk="1" fontAlgn="auto" latinLnBrk="0" hangingPunct="1">
-                <a:lnSpc>
-                  <a:spcPct val="100000"/>
-                </a:lnSpc>
-                <a:spcBef>
-                  <a:spcPts val="0"/>
-                </a:spcBef>
-                <a:spcAft>
-                  <a:spcPts val="0"/>
-                </a:spcAft>
-                <a:buClrTx/>
-                <a:buSzTx/>
-                <a:buFontTx/>
-                <a:buNone/>
-                <a:tabLst/>
-                <a:defRPr/>
-              </a:pPr>
+              <a:t>© Microsoft Corporation. All rights reserved. MICROSOFT MAKES NO WARRANTIES, EXPRESS, IMPLIED OR STATUTORY, AS TO THE INFORMATION IN THIS PRESENTATION.</a:t>
+            </a:r>
+          </a:p>
+        </p:txBody>
+      </p:sp>
+      <p:sp>
+        <p:nvSpPr>
+          <p:cNvPr id="6" name="Date Placeholder 5"/>
+          <p:cNvSpPr>
+            <a:spLocks noGrp="1"/>
+          </p:cNvSpPr>
+          <p:nvPr>
+            <p:ph type="dt" idx="12"/>
+          </p:nvPr>
+        </p:nvSpPr>
+        <p:spPr/>
+        <p:txBody>
+          <a:bodyPr/>
+          <a:lstStyle/>
+          <a:p>
+            <a:fld id="{9427A7F7-BB1E-479D-AFAA-B52F4D0C99F2}" type="datetime8">
+              <a:rPr lang="en-US" smtClean="0"/>
+              <a:t>4/6/2019 6:02 AM</a:t>
+            </a:fld>
+            <a:endParaRPr lang="en-US" dirty="0"/>
+          </a:p>
+        </p:txBody>
+      </p:sp>
+      <p:sp>
+        <p:nvSpPr>
+          <p:cNvPr id="7" name="Slide Number Placeholder 6"/>
+          <p:cNvSpPr>
+            <a:spLocks noGrp="1"/>
+          </p:cNvSpPr>
+          <p:nvPr>
+            <p:ph type="sldNum" sz="quarter" idx="13"/>
+          </p:nvPr>
+        </p:nvSpPr>
+        <p:spPr/>
+        <p:txBody>
+          <a:bodyPr/>
+          <a:lstStyle/>
+          <a:p>
+            <a:fld id="{B4008EB6-D09E-4580-8CD6-DDB14511944F}" type="slidenum">
+              <a:rPr lang="en-US" smtClean="0"/>
+              <a:pPr/>
               <a:t>19</a:t>
             </a:fld>
-            <a:endParaRPr kumimoji="0" lang="en-US" sz="1200" b="0" i="0" u="none" strike="noStrike" kern="1200" cap="none" spc="0" normalizeH="0" baseline="0" noProof="0" dirty="0">
-              <a:ln>
-                <a:noFill/>
-              </a:ln>
-              <a:solidFill>
-                <a:prstClr val="black"/>
-              </a:solidFill>
-              <a:effectLst/>
-              <a:uLnTx/>
-              <a:uFillTx/>
-              <a:latin typeface="Calibri" panose="020F0502020204030204"/>
-              <a:ea typeface="+mn-ea"/>
-              <a:cs typeface="+mn-cs"/>
-            </a:endParaRPr>
+            <a:endParaRPr lang="en-US" dirty="0"/>
           </a:p>
         </p:txBody>
       </p:sp>
     </p:spTree>
     <p:extLst>
       <p:ext uri="{BB962C8B-B14F-4D97-AF65-F5344CB8AC3E}">
-        <p14:creationId xmlns:p14="http://schemas.microsoft.com/office/powerpoint/2010/main" val="3863976856"/>
+        <p14:creationId xmlns:p14="http://schemas.microsoft.com/office/powerpoint/2010/main" val="1127486741"/>
       </p:ext>
     </p:extLst>
   </p:cSld>
@@ -3487,7 +3605,7 @@
           <a:p>
             <a:fld id="{E2F19A73-88F5-4B80-A929-CF8E66EE5449}" type="datetime8">
               <a:rPr lang="en-US" smtClean="0"/>
-              <a:t>4/5/2019 12:41 PM</a:t>
+              <a:t>4/6/2019 5:49 AM</a:t>
             </a:fld>
             <a:endParaRPr lang="en-US" dirty="0"/>
           </a:p>
@@ -3579,7 +3697,7 @@
                 <a:schemeClr val="tx1"/>
               </a:solidFill>
               <a:effectLst/>
-              <a:latin typeface="+mn-lt"/>
+              <a:latin typeface="Segoe UI Light" pitchFamily="34" charset="0"/>
               <a:ea typeface="+mn-ea"/>
               <a:cs typeface="+mn-cs"/>
             </a:endParaRPr>
@@ -3648,12 +3766,12 @@
       </p:sp>
       <p:sp>
         <p:nvSpPr>
-          <p:cNvPr id="4" name="Slide Number Placeholder 3"/>
-          <p:cNvSpPr>
-            <a:spLocks noGrp="1"/>
-          </p:cNvSpPr>
-          <p:nvPr>
-            <p:ph type="sldNum" sz="quarter" idx="5"/>
+          <p:cNvPr id="4" name="Header Placeholder 3"/>
+          <p:cNvSpPr>
+            <a:spLocks noGrp="1"/>
+          </p:cNvSpPr>
+          <p:nvPr>
+            <p:ph type="hdr" sz="quarter" idx="10"/>
           </p:nvPr>
         </p:nvSpPr>
         <p:spPr/>
@@ -3661,78 +3779,99 @@
           <a:bodyPr/>
           <a:lstStyle/>
           <a:p>
-            <a:pPr marL="0" marR="0" lvl="0" indent="0" algn="r" defTabSz="914400" rtl="0" eaLnBrk="1" fontAlgn="auto" latinLnBrk="0" hangingPunct="1">
-              <a:lnSpc>
-                <a:spcPct val="100000"/>
-              </a:lnSpc>
-              <a:spcBef>
-                <a:spcPts val="0"/>
-              </a:spcBef>
-              <a:spcAft>
-                <a:spcPts val="0"/>
-              </a:spcAft>
-              <a:buClrTx/>
-              <a:buSzTx/>
-              <a:buFontTx/>
-              <a:buNone/>
-              <a:tabLst/>
-              <a:defRPr/>
-            </a:pPr>
-            <a:fld id="{6F86FB4F-9A3A-4149-B0E9-5278F91246FB}" type="slidenum">
-              <a:rPr kumimoji="0" lang="en-US" sz="1200" b="0" i="0" u="none" strike="noStrike" kern="1200" cap="none" spc="0" normalizeH="0" baseline="0" noProof="0" smtClean="0">
-                <a:ln>
-                  <a:noFill/>
-                </a:ln>
-                <a:solidFill>
-                  <a:prstClr val="black"/>
-                </a:solidFill>
-                <a:effectLst/>
-                <a:uLnTx/>
-                <a:uFillTx/>
-                <a:latin typeface="Calibri" panose="020F0502020204030204"/>
-                <a:ea typeface="+mn-ea"/>
-                <a:cs typeface="+mn-cs"/>
+            <a:endParaRPr lang="en-US" dirty="0"/>
+          </a:p>
+        </p:txBody>
+      </p:sp>
+      <p:sp>
+        <p:nvSpPr>
+          <p:cNvPr id="5" name="Footer Placeholder 4"/>
+          <p:cNvSpPr>
+            <a:spLocks noGrp="1"/>
+          </p:cNvSpPr>
+          <p:nvPr>
+            <p:ph type="ftr" sz="quarter" idx="11"/>
+          </p:nvPr>
+        </p:nvSpPr>
+        <p:spPr/>
+        <p:txBody>
+          <a:bodyPr/>
+          <a:lstStyle/>
+          <a:p>
+            <a:pPr defTabSz="914099" eaLnBrk="0" hangingPunct="0"/>
+            <a:r>
+              <a:rPr lang="en-US" sz="400" dirty="0">
+                <a:gradFill>
+                  <a:gsLst>
+                    <a:gs pos="0">
+                      <a:prstClr val="black"/>
+                    </a:gs>
+                    <a:gs pos="100000">
+                      <a:prstClr val="black"/>
+                    </a:gs>
+                  </a:gsLst>
+                  <a:lin ang="5400000" scaled="0"/>
+                </a:gradFill>
+                <a:latin typeface="Segoe UI" pitchFamily="34" charset="0"/>
+                <a:ea typeface="Segoe UI" pitchFamily="34" charset="0"/>
+                <a:cs typeface="Segoe UI" pitchFamily="34" charset="0"/>
               </a:rPr>
-              <a:pPr marL="0" marR="0" lvl="0" indent="0" algn="r" defTabSz="914400" rtl="0" eaLnBrk="1" fontAlgn="auto" latinLnBrk="0" hangingPunct="1">
-                <a:lnSpc>
-                  <a:spcPct val="100000"/>
-                </a:lnSpc>
-                <a:spcBef>
-                  <a:spcPts val="0"/>
-                </a:spcBef>
-                <a:spcAft>
-                  <a:spcPts val="0"/>
-                </a:spcAft>
-                <a:buClrTx/>
-                <a:buSzTx/>
-                <a:buFontTx/>
-                <a:buNone/>
-                <a:tabLst/>
-                <a:defRPr/>
-              </a:pPr>
+              <a:t>© Microsoft Corporation. All rights reserved. MICROSOFT MAKES NO WARRANTIES, EXPRESS, IMPLIED OR STATUTORY, AS TO THE INFORMATION IN THIS PRESENTATION.</a:t>
+            </a:r>
+          </a:p>
+        </p:txBody>
+      </p:sp>
+      <p:sp>
+        <p:nvSpPr>
+          <p:cNvPr id="6" name="Date Placeholder 5"/>
+          <p:cNvSpPr>
+            <a:spLocks noGrp="1"/>
+          </p:cNvSpPr>
+          <p:nvPr>
+            <p:ph type="dt" idx="12"/>
+          </p:nvPr>
+        </p:nvSpPr>
+        <p:spPr/>
+        <p:txBody>
+          <a:bodyPr/>
+          <a:lstStyle/>
+          <a:p>
+            <a:fld id="{9427A7F7-BB1E-479D-AFAA-B52F4D0C99F2}" type="datetime8">
+              <a:rPr lang="en-US" smtClean="0"/>
+              <a:t>4/6/2019 5:59 AM</a:t>
+            </a:fld>
+            <a:endParaRPr lang="en-US" dirty="0"/>
+          </a:p>
+        </p:txBody>
+      </p:sp>
+      <p:sp>
+        <p:nvSpPr>
+          <p:cNvPr id="7" name="Slide Number Placeholder 6"/>
+          <p:cNvSpPr>
+            <a:spLocks noGrp="1"/>
+          </p:cNvSpPr>
+          <p:nvPr>
+            <p:ph type="sldNum" sz="quarter" idx="13"/>
+          </p:nvPr>
+        </p:nvSpPr>
+        <p:spPr/>
+        <p:txBody>
+          <a:bodyPr/>
+          <a:lstStyle/>
+          <a:p>
+            <a:fld id="{B4008EB6-D09E-4580-8CD6-DDB14511944F}" type="slidenum">
+              <a:rPr lang="en-US" smtClean="0"/>
+              <a:pPr/>
               <a:t>20</a:t>
             </a:fld>
-            <a:endParaRPr kumimoji="0" lang="en-US" sz="1200" b="0" i="0" u="none" strike="noStrike" kern="1200" cap="none" spc="0" normalizeH="0" baseline="0" noProof="0" dirty="0">
-              <a:ln>
-                <a:noFill/>
-              </a:ln>
-              <a:solidFill>
-                <a:prstClr val="black"/>
-              </a:solidFill>
-              <a:effectLst/>
-              <a:uLnTx/>
-              <a:uFillTx/>
-              <a:latin typeface="Calibri" panose="020F0502020204030204"/>
-              <a:ea typeface="+mn-ea"/>
-              <a:cs typeface="+mn-cs"/>
-            </a:endParaRPr>
+            <a:endParaRPr lang="en-US" dirty="0"/>
           </a:p>
         </p:txBody>
       </p:sp>
     </p:spTree>
     <p:extLst>
       <p:ext uri="{BB962C8B-B14F-4D97-AF65-F5344CB8AC3E}">
-        <p14:creationId xmlns:p14="http://schemas.microsoft.com/office/powerpoint/2010/main" val="4232131216"/>
+        <p14:creationId xmlns:p14="http://schemas.microsoft.com/office/powerpoint/2010/main" val="3345437609"/>
       </p:ext>
     </p:extLst>
   </p:cSld>
@@ -4379,7 +4518,7 @@
           <a:p>
             <a:fld id="{9427A7F7-BB1E-479D-AFAA-B52F4D0C99F2}" type="datetime8">
               <a:rPr lang="en-US" smtClean="0"/>
-              <a:t>4/5/2019 1:37 PM</a:t>
+              <a:t>4/6/2019 5:49 AM</a:t>
             </a:fld>
             <a:endParaRPr lang="en-US" dirty="0"/>
           </a:p>
@@ -4608,7 +4747,7 @@
           <a:p>
             <a:fld id="{9427A7F7-BB1E-479D-AFAA-B52F4D0C99F2}" type="datetime8">
               <a:rPr lang="en-US" smtClean="0"/>
-              <a:t>4/5/2019 1:39 PM</a:t>
+              <a:t>4/6/2019 5:49 AM</a:t>
             </a:fld>
             <a:endParaRPr lang="en-US" dirty="0"/>
           </a:p>
@@ -4773,7 +4912,7 @@
           <a:p>
             <a:fld id="{E2F19A73-88F5-4B80-A929-CF8E66EE5449}" type="datetime8">
               <a:rPr lang="en-US" smtClean="0"/>
-              <a:t>4/5/2019 1:43 PM</a:t>
+              <a:t>4/6/2019 5:49 AM</a:t>
             </a:fld>
             <a:endParaRPr lang="en-US" dirty="0"/>
           </a:p>
@@ -5033,7 +5172,7 @@
           <a:p>
             <a:fld id="{2D0AF0B6-AF0D-4EDB-B60E-27694EB68262}" type="datetime8">
               <a:rPr lang="en-US" smtClean="0"/>
-              <a:t>4/5/2019 1:43 PM</a:t>
+              <a:t>4/6/2019 5:49 AM</a:t>
             </a:fld>
             <a:endParaRPr lang="en-US" dirty="0"/>
           </a:p>
@@ -5198,7 +5337,7 @@
           <a:p>
             <a:fld id="{72E0C910-0166-48E0-B8EF-5071277A02A8}" type="datetime8">
               <a:rPr lang="en-US" smtClean="0"/>
-              <a:t>4/5/2019 12:44 PM</a:t>
+              <a:t>4/6/2019 5:49 AM</a:t>
             </a:fld>
             <a:endParaRPr lang="en-US" dirty="0"/>
           </a:p>
@@ -5363,7 +5502,7 @@
           <a:p>
             <a:fld id="{E2F19A73-88F5-4B80-A929-CF8E66EE5449}" type="datetime8">
               <a:rPr lang="en-US" smtClean="0"/>
-              <a:t>4/5/2019 12:45 PM</a:t>
+              <a:t>4/6/2019 5:49 AM</a:t>
             </a:fld>
             <a:endParaRPr lang="en-US" dirty="0"/>
           </a:p>
@@ -5528,7 +5667,7 @@
           <a:p>
             <a:fld id="{801BB6DB-292D-4F55-8FEB-A2186E983E2E}" type="datetime8">
               <a:rPr lang="en-US" smtClean="0"/>
-              <a:t>4/5/2019 12:47 PM</a:t>
+              <a:t>4/6/2019 5:49 AM</a:t>
             </a:fld>
             <a:endParaRPr lang="en-US" dirty="0"/>
           </a:p>
@@ -5739,7 +5878,7 @@
           <a:p>
             <a:fld id="{9427A7F7-BB1E-479D-AFAA-B52F4D0C99F2}" type="datetime8">
               <a:rPr lang="en-US" smtClean="0"/>
-              <a:t>4/5/2019 1:52 PM</a:t>
+              <a:t>4/6/2019 5:49 AM</a:t>
             </a:fld>
             <a:endParaRPr lang="en-US" dirty="0"/>
           </a:p>
@@ -5965,7 +6104,7 @@
           <a:p>
             <a:fld id="{9427A7F7-BB1E-479D-AFAA-B52F4D0C99F2}" type="datetime8">
               <a:rPr lang="en-US" smtClean="0"/>
-              <a:t>4/5/2019 1:16 PM</a:t>
+              <a:t>4/6/2019 5:49 AM</a:t>
             </a:fld>
             <a:endParaRPr lang="en-US" dirty="0"/>
           </a:p>
@@ -6218,7 +6357,7 @@
           <a:p>
             <a:fld id="{9427A7F7-BB1E-479D-AFAA-B52F4D0C99F2}" type="datetime8">
               <a:rPr lang="en-US" smtClean="0"/>
-              <a:t>4/5/2019 1:16 PM</a:t>
+              <a:t>4/6/2019 5:49 AM</a:t>
             </a:fld>
             <a:endParaRPr lang="en-US" dirty="0"/>
           </a:p>
@@ -6306,7 +6445,7 @@
           <a:lstStyle/>
           <a:p>
             <a:r>
-              <a:rPr lang="en-IE" sz="1200" b="0" i="0" u="none" strike="noStrike" kern="1200" dirty="0">
+              <a:rPr lang="en-IE" sz="900" b="0" i="0" u="none" strike="noStrike" kern="1200" dirty="0">
                 <a:solidFill>
                   <a:schemeClr val="tx1"/>
                 </a:solidFill>
@@ -6319,7 +6458,7 @@
             </a:r>
           </a:p>
           <a:p>
-            <a:endParaRPr lang="en-IE" sz="1200" b="0" i="0" u="none" strike="noStrike" kern="1200" dirty="0">
+            <a:endParaRPr lang="en-IE" sz="900" b="0" i="0" u="none" strike="noStrike" kern="1200" dirty="0">
               <a:solidFill>
                 <a:schemeClr val="tx1"/>
               </a:solidFill>
@@ -6331,7 +6470,7 @@
           </a:p>
           <a:p>
             <a:r>
-              <a:rPr lang="en-IE" sz="1200" b="0" i="0" u="none" strike="noStrike" kern="1200" dirty="0">
+              <a:rPr lang="en-IE" sz="900" b="0" i="0" u="none" strike="noStrike" kern="1200" dirty="0">
                 <a:solidFill>
                   <a:schemeClr val="tx1"/>
                 </a:solidFill>
@@ -6349,7 +6488,7 @@
               <a:buChar char="•"/>
             </a:pPr>
             <a:r>
-              <a:rPr lang="en-IE" sz="1200" b="0" i="0" u="none" strike="noStrike" kern="1200" dirty="0">
+              <a:rPr lang="en-IE" sz="900" b="0" i="0" u="none" strike="noStrike" kern="1200" dirty="0">
                 <a:solidFill>
                   <a:schemeClr val="tx1"/>
                 </a:solidFill>
@@ -6367,7 +6506,7 @@
               <a:buChar char="•"/>
             </a:pPr>
             <a:r>
-              <a:rPr lang="en-IE" sz="1200" b="0" i="0" u="none" strike="noStrike" kern="1200" dirty="0">
+              <a:rPr lang="en-IE" sz="900" b="0" i="0" u="none" strike="noStrike" kern="1200" dirty="0">
                 <a:solidFill>
                   <a:schemeClr val="tx1"/>
                 </a:solidFill>
@@ -6385,7 +6524,7 @@
               <a:buChar char="•"/>
             </a:pPr>
             <a:r>
-              <a:rPr lang="en-IE" sz="1200" b="0" i="0" u="none" strike="noStrike" kern="1200" dirty="0">
+              <a:rPr lang="en-IE" sz="900" b="0" i="0" u="none" strike="noStrike" kern="1200" dirty="0">
                 <a:solidFill>
                   <a:schemeClr val="tx1"/>
                 </a:solidFill>
@@ -6403,7 +6542,7 @@
               <a:buChar char="•"/>
             </a:pPr>
             <a:r>
-              <a:rPr lang="en-IE" sz="1200" b="0" i="0" u="none" strike="noStrike" kern="1200" dirty="0">
+              <a:rPr lang="en-IE" sz="900" b="0" i="0" u="none" strike="noStrike" kern="1200" dirty="0">
                 <a:solidFill>
                   <a:schemeClr val="tx1"/>
                 </a:solidFill>
@@ -6415,19 +6554,16 @@
               <a:t>The ability to stop paying for resources that are no longer needed</a:t>
             </a:r>
           </a:p>
-          <a:p>
-            <a:endParaRPr lang="en-US" sz="900" dirty="0"/>
-          </a:p>
-        </p:txBody>
-      </p:sp>
-      <p:sp>
-        <p:nvSpPr>
-          <p:cNvPr id="4" name="Slide Number Placeholder 3"/>
-          <p:cNvSpPr>
-            <a:spLocks noGrp="1"/>
-          </p:cNvSpPr>
-          <p:nvPr>
-            <p:ph type="sldNum" sz="quarter" idx="5"/>
+        </p:txBody>
+      </p:sp>
+      <p:sp>
+        <p:nvSpPr>
+          <p:cNvPr id="4" name="Header Placeholder 3"/>
+          <p:cNvSpPr>
+            <a:spLocks noGrp="1"/>
+          </p:cNvSpPr>
+          <p:nvPr>
+            <p:ph type="hdr" sz="quarter" idx="10"/>
           </p:nvPr>
         </p:nvSpPr>
         <p:spPr/>
@@ -6435,78 +6571,99 @@
           <a:bodyPr/>
           <a:lstStyle/>
           <a:p>
-            <a:pPr marL="0" marR="0" lvl="0" indent="0" algn="r" defTabSz="914400" rtl="0" eaLnBrk="1" fontAlgn="auto" latinLnBrk="0" hangingPunct="1">
-              <a:lnSpc>
-                <a:spcPct val="100000"/>
-              </a:lnSpc>
-              <a:spcBef>
-                <a:spcPts val="0"/>
-              </a:spcBef>
-              <a:spcAft>
-                <a:spcPts val="0"/>
-              </a:spcAft>
-              <a:buClrTx/>
-              <a:buSzTx/>
-              <a:buFontTx/>
-              <a:buNone/>
-              <a:tabLst/>
-              <a:defRPr/>
-            </a:pPr>
-            <a:fld id="{6F86FB4F-9A3A-4149-B0E9-5278F91246FB}" type="slidenum">
-              <a:rPr kumimoji="0" lang="en-US" sz="1200" b="0" i="0" u="none" strike="noStrike" kern="1200" cap="none" spc="0" normalizeH="0" baseline="0" noProof="0" smtClean="0">
-                <a:ln>
-                  <a:noFill/>
-                </a:ln>
-                <a:solidFill>
-                  <a:prstClr val="black"/>
-                </a:solidFill>
-                <a:effectLst/>
-                <a:uLnTx/>
-                <a:uFillTx/>
-                <a:latin typeface="Calibri" panose="020F0502020204030204"/>
-                <a:ea typeface="+mn-ea"/>
-                <a:cs typeface="+mn-cs"/>
+            <a:endParaRPr lang="en-US" dirty="0"/>
+          </a:p>
+        </p:txBody>
+      </p:sp>
+      <p:sp>
+        <p:nvSpPr>
+          <p:cNvPr id="5" name="Footer Placeholder 4"/>
+          <p:cNvSpPr>
+            <a:spLocks noGrp="1"/>
+          </p:cNvSpPr>
+          <p:nvPr>
+            <p:ph type="ftr" sz="quarter" idx="11"/>
+          </p:nvPr>
+        </p:nvSpPr>
+        <p:spPr/>
+        <p:txBody>
+          <a:bodyPr/>
+          <a:lstStyle/>
+          <a:p>
+            <a:pPr defTabSz="914099" eaLnBrk="0" hangingPunct="0"/>
+            <a:r>
+              <a:rPr lang="en-US" sz="400" dirty="0">
+                <a:gradFill>
+                  <a:gsLst>
+                    <a:gs pos="0">
+                      <a:prstClr val="black"/>
+                    </a:gs>
+                    <a:gs pos="100000">
+                      <a:prstClr val="black"/>
+                    </a:gs>
+                  </a:gsLst>
+                  <a:lin ang="5400000" scaled="0"/>
+                </a:gradFill>
+                <a:latin typeface="Segoe UI" pitchFamily="34" charset="0"/>
+                <a:ea typeface="Segoe UI" pitchFamily="34" charset="0"/>
+                <a:cs typeface="Segoe UI" pitchFamily="34" charset="0"/>
               </a:rPr>
-              <a:pPr marL="0" marR="0" lvl="0" indent="0" algn="r" defTabSz="914400" rtl="0" eaLnBrk="1" fontAlgn="auto" latinLnBrk="0" hangingPunct="1">
-                <a:lnSpc>
-                  <a:spcPct val="100000"/>
-                </a:lnSpc>
-                <a:spcBef>
-                  <a:spcPts val="0"/>
-                </a:spcBef>
-                <a:spcAft>
-                  <a:spcPts val="0"/>
-                </a:spcAft>
-                <a:buClrTx/>
-                <a:buSzTx/>
-                <a:buFontTx/>
-                <a:buNone/>
-                <a:tabLst/>
-                <a:defRPr/>
-              </a:pPr>
+              <a:t>© Microsoft Corporation. All rights reserved. MICROSOFT MAKES NO WARRANTIES, EXPRESS, IMPLIED OR STATUTORY, AS TO THE INFORMATION IN THIS PRESENTATION.</a:t>
+            </a:r>
+          </a:p>
+        </p:txBody>
+      </p:sp>
+      <p:sp>
+        <p:nvSpPr>
+          <p:cNvPr id="6" name="Date Placeholder 5"/>
+          <p:cNvSpPr>
+            <a:spLocks noGrp="1"/>
+          </p:cNvSpPr>
+          <p:nvPr>
+            <p:ph type="dt" idx="12"/>
+          </p:nvPr>
+        </p:nvSpPr>
+        <p:spPr/>
+        <p:txBody>
+          <a:bodyPr/>
+          <a:lstStyle/>
+          <a:p>
+            <a:fld id="{9427A7F7-BB1E-479D-AFAA-B52F4D0C99F2}" type="datetime8">
+              <a:rPr lang="en-US" smtClean="0"/>
+              <a:t>4/6/2019 6:00 AM</a:t>
+            </a:fld>
+            <a:endParaRPr lang="en-US" dirty="0"/>
+          </a:p>
+        </p:txBody>
+      </p:sp>
+      <p:sp>
+        <p:nvSpPr>
+          <p:cNvPr id="7" name="Slide Number Placeholder 6"/>
+          <p:cNvSpPr>
+            <a:spLocks noGrp="1"/>
+          </p:cNvSpPr>
+          <p:nvPr>
+            <p:ph type="sldNum" sz="quarter" idx="13"/>
+          </p:nvPr>
+        </p:nvSpPr>
+        <p:spPr/>
+        <p:txBody>
+          <a:bodyPr/>
+          <a:lstStyle/>
+          <a:p>
+            <a:fld id="{B4008EB6-D09E-4580-8CD6-DDB14511944F}" type="slidenum">
+              <a:rPr lang="en-US" smtClean="0"/>
+              <a:pPr/>
               <a:t>9</a:t>
             </a:fld>
-            <a:endParaRPr kumimoji="0" lang="en-US" sz="1200" b="0" i="0" u="none" strike="noStrike" kern="1200" cap="none" spc="0" normalizeH="0" baseline="0" noProof="0" dirty="0">
-              <a:ln>
-                <a:noFill/>
-              </a:ln>
-              <a:solidFill>
-                <a:prstClr val="black"/>
-              </a:solidFill>
-              <a:effectLst/>
-              <a:uLnTx/>
-              <a:uFillTx/>
-              <a:latin typeface="Calibri" panose="020F0502020204030204"/>
-              <a:ea typeface="+mn-ea"/>
-              <a:cs typeface="+mn-cs"/>
-            </a:endParaRPr>
+            <a:endParaRPr lang="en-US" dirty="0"/>
           </a:p>
         </p:txBody>
       </p:sp>
     </p:spTree>
     <p:extLst>
       <p:ext uri="{BB962C8B-B14F-4D97-AF65-F5344CB8AC3E}">
-        <p14:creationId xmlns:p14="http://schemas.microsoft.com/office/powerpoint/2010/main" val="1670448340"/>
+        <p14:creationId xmlns:p14="http://schemas.microsoft.com/office/powerpoint/2010/main" val="1408112273"/>
       </p:ext>
     </p:extLst>
   </p:cSld>
@@ -15307,7 +15464,7 @@
           <a:p>
             <a:fld id="{FFDB6D7C-7927-4CBB-8A3C-B48A277CE5CB}" type="datetimeFigureOut">
               <a:rPr lang="en-US" smtClean="0"/>
-              <a:t>4/5/2019</a:t>
+              <a:t>4/6/2019</a:t>
             </a:fld>
             <a:endParaRPr lang="en-US" dirty="0"/>
           </a:p>
@@ -15505,7 +15662,7 @@
           <a:p>
             <a:fld id="{FFDB6D7C-7927-4CBB-8A3C-B48A277CE5CB}" type="datetimeFigureOut">
               <a:rPr lang="en-US" smtClean="0"/>
-              <a:t>4/5/2019</a:t>
+              <a:t>4/6/2019</a:t>
             </a:fld>
             <a:endParaRPr lang="en-US" dirty="0"/>
           </a:p>
@@ -15780,7 +15937,7 @@
           <a:p>
             <a:fld id="{FFDB6D7C-7927-4CBB-8A3C-B48A277CE5CB}" type="datetimeFigureOut">
               <a:rPr lang="en-US" smtClean="0"/>
-              <a:t>4/5/2019</a:t>
+              <a:t>4/6/2019</a:t>
             </a:fld>
             <a:endParaRPr lang="en-US" dirty="0"/>
           </a:p>
@@ -16045,7 +16202,7 @@
           <a:p>
             <a:fld id="{FFDB6D7C-7927-4CBB-8A3C-B48A277CE5CB}" type="datetimeFigureOut">
               <a:rPr lang="en-US" smtClean="0"/>
-              <a:t>4/5/2019</a:t>
+              <a:t>4/6/2019</a:t>
             </a:fld>
             <a:endParaRPr lang="en-US" dirty="0"/>
           </a:p>
@@ -16457,7 +16614,7 @@
           <a:p>
             <a:fld id="{FFDB6D7C-7927-4CBB-8A3C-B48A277CE5CB}" type="datetimeFigureOut">
               <a:rPr lang="en-US" smtClean="0"/>
-              <a:t>4/5/2019</a:t>
+              <a:t>4/6/2019</a:t>
             </a:fld>
             <a:endParaRPr lang="en-US" dirty="0"/>
           </a:p>
@@ -16598,7 +16755,7 @@
           <a:p>
             <a:fld id="{FFDB6D7C-7927-4CBB-8A3C-B48A277CE5CB}" type="datetimeFigureOut">
               <a:rPr lang="en-US" smtClean="0"/>
-              <a:t>4/5/2019</a:t>
+              <a:t>4/6/2019</a:t>
             </a:fld>
             <a:endParaRPr lang="en-US" dirty="0"/>
           </a:p>
@@ -16711,7 +16868,7 @@
           <a:p>
             <a:fld id="{FFDB6D7C-7927-4CBB-8A3C-B48A277CE5CB}" type="datetimeFigureOut">
               <a:rPr lang="en-US" smtClean="0"/>
-              <a:t>4/5/2019</a:t>
+              <a:t>4/6/2019</a:t>
             </a:fld>
             <a:endParaRPr lang="en-US" dirty="0"/>
           </a:p>
@@ -17022,7 +17179,7 @@
           <a:p>
             <a:fld id="{FFDB6D7C-7927-4CBB-8A3C-B48A277CE5CB}" type="datetimeFigureOut">
               <a:rPr lang="en-US" smtClean="0"/>
-              <a:t>4/5/2019</a:t>
+              <a:t>4/6/2019</a:t>
             </a:fld>
             <a:endParaRPr lang="en-US" dirty="0"/>
           </a:p>
@@ -17310,7 +17467,7 @@
           <a:p>
             <a:fld id="{FFDB6D7C-7927-4CBB-8A3C-B48A277CE5CB}" type="datetimeFigureOut">
               <a:rPr lang="en-US" smtClean="0"/>
-              <a:t>4/5/2019</a:t>
+              <a:t>4/6/2019</a:t>
             </a:fld>
             <a:endParaRPr lang="en-US" dirty="0"/>
           </a:p>
@@ -17648,7 +17805,7 @@
           <a:p>
             <a:fld id="{FFDB6D7C-7927-4CBB-8A3C-B48A277CE5CB}" type="datetimeFigureOut">
               <a:rPr lang="en-US" smtClean="0"/>
-              <a:t>4/5/2019</a:t>
+              <a:t>4/6/2019</a:t>
             </a:fld>
             <a:endParaRPr lang="en-US" dirty="0"/>
           </a:p>
@@ -17856,7 +18013,7 @@
           <a:p>
             <a:fld id="{FFDB6D7C-7927-4CBB-8A3C-B48A277CE5CB}" type="datetimeFigureOut">
               <a:rPr lang="en-US" smtClean="0"/>
-              <a:t>4/5/2019</a:t>
+              <a:t>4/6/2019</a:t>
             </a:fld>
             <a:endParaRPr lang="en-US" dirty="0"/>
           </a:p>
@@ -18070,286 +18227,6 @@
 </file>
 
 <file path=ppt/slideLayouts/slideLayout63.xml><?xml version="1.0" encoding="utf-8"?>
-<p:sldLayout xmlns:a="http://schemas.openxmlformats.org/drawingml/2006/main" xmlns:r="http://schemas.openxmlformats.org/officeDocument/2006/relationships" xmlns:p="http://schemas.openxmlformats.org/presentationml/2006/main" userDrawn="1">
-  <p:cSld name="2_Title and Content">
-    <p:spTree>
-      <p:nvGrpSpPr>
-        <p:cNvPr id="1" name=""/>
-        <p:cNvGrpSpPr/>
-        <p:nvPr/>
-      </p:nvGrpSpPr>
-      <p:grpSpPr>
-        <a:xfrm>
-          <a:off x="0" y="0"/>
-          <a:ext cx="0" cy="0"/>
-          <a:chOff x="0" y="0"/>
-          <a:chExt cx="0" cy="0"/>
-        </a:xfrm>
-      </p:grpSpPr>
-      <p:sp>
-        <p:nvSpPr>
-          <p:cNvPr id="2" name="Title 1">
-            <a:extLst>
-              <a:ext uri="{FF2B5EF4-FFF2-40B4-BE49-F238E27FC236}">
-                <a16:creationId xmlns:a16="http://schemas.microsoft.com/office/drawing/2014/main" id="{22FCFEFD-88E5-4869-B5C3-1611B0B50E15}"/>
-              </a:ext>
-            </a:extLst>
-          </p:cNvPr>
-          <p:cNvSpPr>
-            <a:spLocks noGrp="1"/>
-          </p:cNvSpPr>
-          <p:nvPr>
-            <p:ph type="title"/>
-          </p:nvPr>
-        </p:nvSpPr>
-        <p:spPr/>
-        <p:txBody>
-          <a:bodyPr/>
-          <a:lstStyle/>
-          <a:p>
-            <a:r>
-              <a:rPr lang="en-US"/>
-              <a:t>Click to edit Master title style</a:t>
-            </a:r>
-            <a:endParaRPr lang="en-US" dirty="0"/>
-          </a:p>
-        </p:txBody>
-      </p:sp>
-      <p:sp>
-        <p:nvSpPr>
-          <p:cNvPr id="3" name="Text Placeholder 2"/>
-          <p:cNvSpPr>
-            <a:spLocks noGrp="1"/>
-          </p:cNvSpPr>
-          <p:nvPr>
-            <p:ph type="body" sz="quarter" idx="10"/>
-          </p:nvPr>
-        </p:nvSpPr>
-        <p:spPr>
-          <a:xfrm>
-            <a:off x="584200" y="1435497"/>
-            <a:ext cx="11018520" cy="2308324"/>
-          </a:xfrm>
-        </p:spPr>
-        <p:txBody>
-          <a:bodyPr/>
-          <a:lstStyle/>
-          <a:p>
-            <a:pPr lvl="0"/>
-            <a:r>
-              <a:rPr lang="en-US"/>
-              <a:t>Edit Master text styles</a:t>
-            </a:r>
-          </a:p>
-          <a:p>
-            <a:pPr lvl="1"/>
-            <a:r>
-              <a:rPr lang="en-US"/>
-              <a:t>Second level</a:t>
-            </a:r>
-          </a:p>
-          <a:p>
-            <a:pPr lvl="2"/>
-            <a:r>
-              <a:rPr lang="en-US"/>
-              <a:t>Third level</a:t>
-            </a:r>
-          </a:p>
-          <a:p>
-            <a:pPr lvl="3"/>
-            <a:r>
-              <a:rPr lang="en-US"/>
-              <a:t>Fourth level</a:t>
-            </a:r>
-          </a:p>
-          <a:p>
-            <a:pPr lvl="4"/>
-            <a:r>
-              <a:rPr lang="en-US"/>
-              <a:t>Fifth level</a:t>
-            </a:r>
-            <a:endParaRPr lang="en-US" dirty="0"/>
-          </a:p>
-        </p:txBody>
-      </p:sp>
-    </p:spTree>
-    <p:extLst>
-      <p:ext uri="{BB962C8B-B14F-4D97-AF65-F5344CB8AC3E}">
-        <p14:creationId xmlns:p14="http://schemas.microsoft.com/office/powerpoint/2010/main" val="2221292789"/>
-      </p:ext>
-    </p:extLst>
-  </p:cSld>
-  <p:clrMapOvr>
-    <a:masterClrMapping/>
-  </p:clrMapOvr>
-  <p:transition>
-    <p:fade/>
-  </p:transition>
-  <p:extLst mod="1">
-    <p:ext uri="{DCECCB84-F9BA-43D5-87BE-67443E8EF086}">
-      <p15:sldGuideLst xmlns:p15="http://schemas.microsoft.com/office/powerpoint/2012/main">
-        <p15:guide id="2" orient="horz" pos="1272">
-          <p15:clr>
-            <a:srgbClr val="5ACBF0"/>
-          </p15:clr>
-        </p15:guide>
-        <p15:guide id="3" orient="horz" pos="288">
-          <p15:clr>
-            <a:srgbClr val="5ACBF0"/>
-          </p15:clr>
-        </p15:guide>
-        <p15:guide id="5" orient="horz" pos="904">
-          <p15:clr>
-            <a:srgbClr val="5ACBF0"/>
-          </p15:clr>
-        </p15:guide>
-      </p15:sldGuideLst>
-    </p:ext>
-  </p:extLst>
-</p:sldLayout>
-</file>
-
-<file path=ppt/slideLayouts/slideLayout64.xml><?xml version="1.0" encoding="utf-8"?>
-<p:sldLayout xmlns:a="http://schemas.openxmlformats.org/drawingml/2006/main" xmlns:r="http://schemas.openxmlformats.org/officeDocument/2006/relationships" xmlns:p="http://schemas.openxmlformats.org/presentationml/2006/main" userDrawn="1">
-  <p:cSld name="3_Title and Content">
-    <p:spTree>
-      <p:nvGrpSpPr>
-        <p:cNvPr id="1" name=""/>
-        <p:cNvGrpSpPr/>
-        <p:nvPr/>
-      </p:nvGrpSpPr>
-      <p:grpSpPr>
-        <a:xfrm>
-          <a:off x="0" y="0"/>
-          <a:ext cx="0" cy="0"/>
-          <a:chOff x="0" y="0"/>
-          <a:chExt cx="0" cy="0"/>
-        </a:xfrm>
-      </p:grpSpPr>
-      <p:sp>
-        <p:nvSpPr>
-          <p:cNvPr id="2" name="Title 1">
-            <a:extLst>
-              <a:ext uri="{FF2B5EF4-FFF2-40B4-BE49-F238E27FC236}">
-                <a16:creationId xmlns:a16="http://schemas.microsoft.com/office/drawing/2014/main" id="{22FCFEFD-88E5-4869-B5C3-1611B0B50E15}"/>
-              </a:ext>
-            </a:extLst>
-          </p:cNvPr>
-          <p:cNvSpPr>
-            <a:spLocks noGrp="1"/>
-          </p:cNvSpPr>
-          <p:nvPr>
-            <p:ph type="title"/>
-          </p:nvPr>
-        </p:nvSpPr>
-        <p:spPr/>
-        <p:txBody>
-          <a:bodyPr/>
-          <a:lstStyle/>
-          <a:p>
-            <a:r>
-              <a:rPr lang="en-US"/>
-              <a:t>Click to edit Master title style</a:t>
-            </a:r>
-            <a:endParaRPr lang="en-US" dirty="0"/>
-          </a:p>
-        </p:txBody>
-      </p:sp>
-      <p:sp>
-        <p:nvSpPr>
-          <p:cNvPr id="3" name="Text Placeholder 2"/>
-          <p:cNvSpPr>
-            <a:spLocks noGrp="1"/>
-          </p:cNvSpPr>
-          <p:nvPr>
-            <p:ph type="body" sz="quarter" idx="10"/>
-          </p:nvPr>
-        </p:nvSpPr>
-        <p:spPr>
-          <a:xfrm>
-            <a:off x="584200" y="1435497"/>
-            <a:ext cx="11018520" cy="2308324"/>
-          </a:xfrm>
-        </p:spPr>
-        <p:txBody>
-          <a:bodyPr/>
-          <a:lstStyle/>
-          <a:p>
-            <a:pPr lvl="0"/>
-            <a:r>
-              <a:rPr lang="en-US"/>
-              <a:t>Edit Master text styles</a:t>
-            </a:r>
-          </a:p>
-          <a:p>
-            <a:pPr lvl="1"/>
-            <a:r>
-              <a:rPr lang="en-US"/>
-              <a:t>Second level</a:t>
-            </a:r>
-          </a:p>
-          <a:p>
-            <a:pPr lvl="2"/>
-            <a:r>
-              <a:rPr lang="en-US"/>
-              <a:t>Third level</a:t>
-            </a:r>
-          </a:p>
-          <a:p>
-            <a:pPr lvl="3"/>
-            <a:r>
-              <a:rPr lang="en-US"/>
-              <a:t>Fourth level</a:t>
-            </a:r>
-          </a:p>
-          <a:p>
-            <a:pPr lvl="4"/>
-            <a:r>
-              <a:rPr lang="en-US"/>
-              <a:t>Fifth level</a:t>
-            </a:r>
-            <a:endParaRPr lang="en-US" dirty="0"/>
-          </a:p>
-        </p:txBody>
-      </p:sp>
-    </p:spTree>
-    <p:extLst>
-      <p:ext uri="{BB962C8B-B14F-4D97-AF65-F5344CB8AC3E}">
-        <p14:creationId xmlns:p14="http://schemas.microsoft.com/office/powerpoint/2010/main" val="1933020816"/>
-      </p:ext>
-    </p:extLst>
-  </p:cSld>
-  <p:clrMapOvr>
-    <a:masterClrMapping/>
-  </p:clrMapOvr>
-  <p:transition>
-    <p:fade/>
-  </p:transition>
-  <p:extLst mod="1">
-    <p:ext uri="{DCECCB84-F9BA-43D5-87BE-67443E8EF086}">
-      <p15:sldGuideLst xmlns:p15="http://schemas.microsoft.com/office/powerpoint/2012/main">
-        <p15:guide id="2" orient="horz" pos="1272">
-          <p15:clr>
-            <a:srgbClr val="5ACBF0"/>
-          </p15:clr>
-        </p15:guide>
-        <p15:guide id="3" orient="horz" pos="288">
-          <p15:clr>
-            <a:srgbClr val="5ACBF0"/>
-          </p15:clr>
-        </p15:guide>
-        <p15:guide id="5" orient="horz" pos="904">
-          <p15:clr>
-            <a:srgbClr val="5ACBF0"/>
-          </p15:clr>
-        </p15:guide>
-      </p15:sldGuideLst>
-    </p:ext>
-  </p:extLst>
-</p:sldLayout>
-</file>
-
-<file path=ppt/slideLayouts/slideLayout65.xml><?xml version="1.0" encoding="utf-8"?>
 <p:sldLayout xmlns:a="http://schemas.openxmlformats.org/drawingml/2006/main" xmlns:r="http://schemas.openxmlformats.org/officeDocument/2006/relationships" xmlns:p="http://schemas.openxmlformats.org/presentationml/2006/main" userDrawn="1">
   <p:cSld name="Section Title">
     <p:bg>
@@ -18512,7 +18389,7 @@
 </p:sldLayout>
 </file>
 
-<file path=ppt/slideLayouts/slideLayout66.xml><?xml version="1.0" encoding="utf-8"?>
+<file path=ppt/slideLayouts/slideLayout64.xml><?xml version="1.0" encoding="utf-8"?>
 <p:sldLayout xmlns:a="http://schemas.openxmlformats.org/drawingml/2006/main" xmlns:r="http://schemas.openxmlformats.org/officeDocument/2006/relationships" xmlns:p="http://schemas.openxmlformats.org/presentationml/2006/main" userDrawn="1">
   <p:cSld name="Video slide">
     <p:bg>
@@ -18665,6 +18542,146 @@
           </p15:clr>
         </p15:guide>
         <p15:guide id="4" orient="horz" pos="2505">
+          <p15:clr>
+            <a:srgbClr val="5ACBF0"/>
+          </p15:clr>
+        </p15:guide>
+      </p15:sldGuideLst>
+    </p:ext>
+  </p:extLst>
+</p:sldLayout>
+</file>
+
+<file path=ppt/slideLayouts/slideLayout65.xml><?xml version="1.0" encoding="utf-8"?>
+<p:sldLayout xmlns:a="http://schemas.openxmlformats.org/drawingml/2006/main" xmlns:r="http://schemas.openxmlformats.org/officeDocument/2006/relationships" xmlns:p="http://schemas.openxmlformats.org/presentationml/2006/main" userDrawn="1">
+  <p:cSld name="3_Title and Content">
+    <p:spTree>
+      <p:nvGrpSpPr>
+        <p:cNvPr id="1" name=""/>
+        <p:cNvGrpSpPr/>
+        <p:nvPr/>
+      </p:nvGrpSpPr>
+      <p:grpSpPr>
+        <a:xfrm>
+          <a:off x="0" y="0"/>
+          <a:ext cx="0" cy="0"/>
+          <a:chOff x="0" y="0"/>
+          <a:chExt cx="0" cy="0"/>
+        </a:xfrm>
+      </p:grpSpPr>
+      <p:sp>
+        <p:nvSpPr>
+          <p:cNvPr id="2" name="Title 1">
+            <a:extLst>
+              <a:ext uri="{FF2B5EF4-FFF2-40B4-BE49-F238E27FC236}">
+                <a16:creationId xmlns:a16="http://schemas.microsoft.com/office/drawing/2014/main" id="{22FCFEFD-88E5-4869-B5C3-1611B0B50E15}"/>
+              </a:ext>
+            </a:extLst>
+          </p:cNvPr>
+          <p:cNvSpPr>
+            <a:spLocks noGrp="1"/>
+          </p:cNvSpPr>
+          <p:nvPr>
+            <p:ph type="title"/>
+          </p:nvPr>
+        </p:nvSpPr>
+        <p:spPr/>
+        <p:txBody>
+          <a:bodyPr/>
+          <a:lstStyle/>
+          <a:p>
+            <a:r>
+              <a:rPr lang="en-US"/>
+              <a:t>Click to edit Master title style</a:t>
+            </a:r>
+            <a:endParaRPr lang="en-US" dirty="0"/>
+          </a:p>
+        </p:txBody>
+      </p:sp>
+      <p:sp>
+        <p:nvSpPr>
+          <p:cNvPr id="3" name="Text Placeholder 2"/>
+          <p:cNvSpPr>
+            <a:spLocks noGrp="1"/>
+          </p:cNvSpPr>
+          <p:nvPr>
+            <p:ph type="body" sz="quarter" idx="10"/>
+          </p:nvPr>
+        </p:nvSpPr>
+        <p:spPr>
+          <a:xfrm>
+            <a:off x="584200" y="1435497"/>
+            <a:ext cx="11018520" cy="2308324"/>
+          </a:xfrm>
+        </p:spPr>
+        <p:txBody>
+          <a:bodyPr/>
+          <a:lstStyle/>
+          <a:p>
+            <a:pPr lvl="0"/>
+            <a:r>
+              <a:rPr lang="en-US"/>
+              <a:t>Edit Master text styles</a:t>
+            </a:r>
+          </a:p>
+          <a:p>
+            <a:pPr lvl="1"/>
+            <a:r>
+              <a:rPr lang="en-US"/>
+              <a:t>Second level</a:t>
+            </a:r>
+          </a:p>
+          <a:p>
+            <a:pPr lvl="2"/>
+            <a:r>
+              <a:rPr lang="en-US"/>
+              <a:t>Third level</a:t>
+            </a:r>
+          </a:p>
+          <a:p>
+            <a:pPr lvl="3"/>
+            <a:r>
+              <a:rPr lang="en-US"/>
+              <a:t>Fourth level</a:t>
+            </a:r>
+          </a:p>
+          <a:p>
+            <a:pPr lvl="4"/>
+            <a:r>
+              <a:rPr lang="en-US"/>
+              <a:t>Fifth level</a:t>
+            </a:r>
+            <a:endParaRPr lang="en-US" dirty="0"/>
+          </a:p>
+        </p:txBody>
+      </p:sp>
+    </p:spTree>
+    <p:extLst>
+      <p:ext uri="{BB962C8B-B14F-4D97-AF65-F5344CB8AC3E}">
+        <p14:creationId xmlns:p14="http://schemas.microsoft.com/office/powerpoint/2010/main" val="2274490924"/>
+      </p:ext>
+    </p:extLst>
+  </p:cSld>
+  <p:clrMapOvr>
+    <a:masterClrMapping/>
+  </p:clrMapOvr>
+  <p:transition>
+    <p:fade/>
+  </p:transition>
+  <p:extLst mod="1">
+    <p:ext uri="{DCECCB84-F9BA-43D5-87BE-67443E8EF086}">
+      <p15:sldGuideLst xmlns:p15="http://schemas.microsoft.com/office/powerpoint/2012/main">
+        <p15:guide id="2" orient="horz" pos="1272">
+          <p15:clr>
+            <a:srgbClr val="5ACBF0"/>
+          </p15:clr>
+        </p15:guide>
+        <p15:guide id="3" orient="horz" pos="288">
+          <p15:clr>
+            <a:srgbClr val="5ACBF0"/>
+          </p15:clr>
+        </p15:guide>
+        <p15:guide id="5" orient="horz" pos="904">
           <p15:clr>
             <a:srgbClr val="5ACBF0"/>
           </p15:clr>
@@ -24074,7 +24091,7 @@
           <a:p>
             <a:fld id="{FFDB6D7C-7927-4CBB-8A3C-B48A277CE5CB}" type="datetimeFigureOut">
               <a:rPr lang="en-US" smtClean="0"/>
-              <a:t>4/5/2019</a:t>
+              <a:t>4/6/2019</a:t>
             </a:fld>
             <a:endParaRPr lang="en-US" dirty="0"/>
           </a:p>
@@ -24191,10 +24208,9 @@
     <p:sldLayoutId id="2147484753" r:id="rId10"/>
     <p:sldLayoutId id="2147484754" r:id="rId11"/>
     <p:sldLayoutId id="2147484755" r:id="rId12"/>
-    <p:sldLayoutId id="2147484756" r:id="rId13"/>
-    <p:sldLayoutId id="2147484757" r:id="rId14"/>
-    <p:sldLayoutId id="2147484758" r:id="rId15"/>
-    <p:sldLayoutId id="2147484759" r:id="rId16"/>
+    <p:sldLayoutId id="2147484758" r:id="rId13"/>
+    <p:sldLayoutId id="2147484759" r:id="rId14"/>
+    <p:sldLayoutId id="2147484760" r:id="rId15"/>
   </p:sldLayoutIdLst>
   <p:txStyles>
     <p:titleStyle>
@@ -24744,14 +24760,6 @@
 <file path=ppt/slides/slide12.xml><?xml version="1.0" encoding="utf-8"?>
 <p:sld xmlns:a="http://schemas.openxmlformats.org/drawingml/2006/main" xmlns:r="http://schemas.openxmlformats.org/officeDocument/2006/relationships" xmlns:p="http://schemas.openxmlformats.org/presentationml/2006/main">
   <p:cSld>
-    <p:bg>
-      <p:bgPr>
-        <a:solidFill>
-          <a:schemeClr val="bg1"/>
-        </a:solidFill>
-        <a:effectLst/>
-      </p:bgPr>
-    </p:bg>
     <p:spTree>
       <p:nvGrpSpPr>
         <p:cNvPr id="1" name=""/>
@@ -24768,256 +24776,55 @@
       </p:grpSpPr>
       <p:sp>
         <p:nvSpPr>
-          <p:cNvPr id="11" name="Rectangle 10">
-            <a:extLst>
-              <a:ext uri="{FF2B5EF4-FFF2-40B4-BE49-F238E27FC236}">
-                <a16:creationId xmlns:a16="http://schemas.microsoft.com/office/drawing/2014/main" id="{4038CB10-1F5C-4D54-9DF7-12586DE5B007}"/>
-              </a:ext>
-              <a:ext uri="{C183D7F6-B498-43B3-948B-1728B52AA6E4}">
-                <adec:decorative xmlns:adec="http://schemas.microsoft.com/office/drawing/2017/decorative" val="1"/>
-              </a:ext>
-            </a:extLst>
-          </p:cNvPr>
-          <p:cNvSpPr>
-            <a:spLocks noGrp="1" noRot="1" noChangeAspect="1" noMove="1" noResize="1" noEditPoints="1" noAdjustHandles="1" noChangeArrowheads="1" noChangeShapeType="1" noTextEdit="1"/>
-          </p:cNvSpPr>
-          <p:nvPr>
-            <p:extLst>
-              <p:ext uri="{386F3935-93C4-4BCD-93E2-E3B085C9AB24}">
-                <p16:designElem xmlns:p16="http://schemas.microsoft.com/office/powerpoint/2015/main" val="1"/>
-              </p:ext>
-            </p:extLst>
-          </p:nvPr>
-        </p:nvSpPr>
-        <p:spPr>
-          <a:xfrm>
-            <a:off x="327546" y="4572000"/>
-            <a:ext cx="7058307" cy="1964266"/>
-          </a:xfrm>
-          <a:prstGeom prst="rect">
-            <a:avLst/>
-          </a:prstGeom>
-          <a:solidFill>
-            <a:srgbClr val="4F4937"/>
-          </a:solidFill>
-          <a:ln>
-            <a:noFill/>
-          </a:ln>
-        </p:spPr>
-        <p:style>
-          <a:lnRef idx="2">
-            <a:schemeClr val="accent1">
-              <a:shade val="50000"/>
-            </a:schemeClr>
-          </a:lnRef>
-          <a:fillRef idx="1">
-            <a:schemeClr val="accent1"/>
-          </a:fillRef>
-          <a:effectRef idx="0">
-            <a:schemeClr val="accent1"/>
-          </a:effectRef>
-          <a:fontRef idx="minor">
-            <a:schemeClr val="lt1"/>
-          </a:fontRef>
-        </p:style>
-        <p:txBody>
-          <a:bodyPr rtlCol="0" anchor="ctr"/>
+          <p:cNvPr id="17" name="Title 16"/>
+          <p:cNvSpPr>
+            <a:spLocks noGrp="1"/>
+          </p:cNvSpPr>
+          <p:nvPr>
+            <p:ph type="title"/>
+          </p:nvPr>
+        </p:nvSpPr>
+        <p:spPr/>
+        <p:txBody>
+          <a:bodyPr/>
           <a:lstStyle/>
           <a:p>
-            <a:pPr marL="0" marR="0" lvl="0" indent="0" algn="ctr" defTabSz="914400" rtl="0" eaLnBrk="1" fontAlgn="auto" latinLnBrk="0" hangingPunct="1">
-              <a:lnSpc>
-                <a:spcPct val="100000"/>
-              </a:lnSpc>
-              <a:spcBef>
-                <a:spcPts val="0"/>
-              </a:spcBef>
-              <a:spcAft>
-                <a:spcPts val="0"/>
-              </a:spcAft>
-              <a:buClrTx/>
-              <a:buSzTx/>
-              <a:buFontTx/>
-              <a:buNone/>
-              <a:tabLst/>
-              <a:defRPr/>
-            </a:pPr>
-            <a:endParaRPr kumimoji="0" lang="en-US" sz="1800" b="0" i="0" u="none" strike="noStrike" kern="1200" cap="none" spc="0" normalizeH="0" baseline="0" noProof="0" dirty="0">
-              <a:ln>
-                <a:noFill/>
-              </a:ln>
-              <a:solidFill>
-                <a:prstClr val="white"/>
-              </a:solidFill>
-              <a:effectLst/>
-              <a:uLnTx/>
-              <a:uFillTx/>
-              <a:latin typeface="Calibri" panose="020F0502020204030204"/>
-              <a:ea typeface="+mn-ea"/>
-              <a:cs typeface="+mn-cs"/>
-            </a:endParaRPr>
-          </a:p>
-        </p:txBody>
-      </p:sp>
-      <p:sp>
-        <p:nvSpPr>
-          <p:cNvPr id="2" name="Title 1">
-            <a:extLst>
-              <a:ext uri="{FF2B5EF4-FFF2-40B4-BE49-F238E27FC236}">
-                <a16:creationId xmlns:a16="http://schemas.microsoft.com/office/drawing/2014/main" id="{81B28370-6B1C-41C1-B51B-DEB7E13BAC04}"/>
-              </a:ext>
-            </a:extLst>
-          </p:cNvPr>
-          <p:cNvSpPr>
-            <a:spLocks noGrp="1"/>
-          </p:cNvSpPr>
-          <p:nvPr>
-            <p:ph type="title"/>
-          </p:nvPr>
-        </p:nvSpPr>
-        <p:spPr>
-          <a:xfrm>
-            <a:off x="524256" y="4767072"/>
-            <a:ext cx="6594189" cy="1625210"/>
-          </a:xfrm>
-        </p:spPr>
-        <p:txBody>
-          <a:bodyPr vert="horz" lIns="91440" tIns="45720" rIns="91440" bIns="45720" rtlCol="0" anchor="ctr">
-            <a:normAutofit/>
-          </a:bodyPr>
-          <a:lstStyle/>
-          <a:p>
-            <a:pPr algn="r"/>
-            <a:r>
-              <a:rPr lang="en-US" sz="3600" dirty="0">
+            <a:r>
+              <a:rPr lang="en-US" dirty="0">
                 <a:solidFill>
-                  <a:srgbClr val="FFFFFF"/>
+                  <a:schemeClr val="tx1"/>
                 </a:solidFill>
                 <a:latin typeface="Segoe UI Semibold (Headings)"/>
                 <a:cs typeface="Segoe UI Semilight" panose="020B0402040204020203" pitchFamily="34" charset="0"/>
               </a:rPr>
               <a:t>Public cloud</a:t>
             </a:r>
-          </a:p>
-        </p:txBody>
-      </p:sp>
-      <p:sp>
-        <p:nvSpPr>
-          <p:cNvPr id="13" name="Rectangle 12">
-            <a:extLst>
-              <a:ext uri="{FF2B5EF4-FFF2-40B4-BE49-F238E27FC236}">
-                <a16:creationId xmlns:a16="http://schemas.microsoft.com/office/drawing/2014/main" id="{73ED6512-6858-4552-B699-9A97FE9A4EA2}"/>
-              </a:ext>
-              <a:ext uri="{C183D7F6-B498-43B3-948B-1728B52AA6E4}">
-                <adec:decorative xmlns:adec="http://schemas.microsoft.com/office/drawing/2017/decorative" val="1"/>
-              </a:ext>
-            </a:extLst>
-          </p:cNvPr>
-          <p:cNvSpPr>
-            <a:spLocks noGrp="1" noRot="1" noChangeAspect="1" noMove="1" noResize="1" noEditPoints="1" noAdjustHandles="1" noChangeArrowheads="1" noChangeShapeType="1" noTextEdit="1"/>
-          </p:cNvSpPr>
-          <p:nvPr>
-            <p:extLst>
-              <p:ext uri="{386F3935-93C4-4BCD-93E2-E3B085C9AB24}">
-                <p16:designElem xmlns:p16="http://schemas.microsoft.com/office/powerpoint/2015/main" val="1"/>
-              </p:ext>
-            </p:extLst>
+            <a:endParaRPr lang="en-US" dirty="0">
+              <a:solidFill>
+                <a:schemeClr val="tx1"/>
+              </a:solidFill>
+            </a:endParaRPr>
+          </a:p>
+        </p:txBody>
+      </p:sp>
+      <p:sp>
+        <p:nvSpPr>
+          <p:cNvPr id="6" name="Text Placeholder 5"/>
+          <p:cNvSpPr>
+            <a:spLocks noGrp="1"/>
+          </p:cNvSpPr>
+          <p:nvPr>
+            <p:ph type="body" sz="quarter" idx="10"/>
           </p:nvPr>
         </p:nvSpPr>
         <p:spPr>
           <a:xfrm>
-            <a:off x="7534655" y="321732"/>
-            <a:ext cx="4335613" cy="6214534"/>
-          </a:xfrm>
-          <a:prstGeom prst="rect">
-            <a:avLst/>
-          </a:prstGeom>
-          <a:solidFill>
-            <a:srgbClr val="404040"/>
-          </a:solidFill>
-          <a:ln>
-            <a:noFill/>
-          </a:ln>
-        </p:spPr>
-        <p:style>
-          <a:lnRef idx="2">
-            <a:schemeClr val="accent1">
-              <a:shade val="50000"/>
-            </a:schemeClr>
-          </a:lnRef>
-          <a:fillRef idx="1">
-            <a:schemeClr val="accent1"/>
-          </a:fillRef>
-          <a:effectRef idx="0">
-            <a:schemeClr val="accent1"/>
-          </a:effectRef>
-          <a:fontRef idx="minor">
-            <a:schemeClr val="lt1"/>
-          </a:fontRef>
-        </p:style>
-        <p:txBody>
-          <a:bodyPr rtlCol="0" anchor="ctr"/>
-          <a:lstStyle/>
-          <a:p>
-            <a:pPr marL="0" marR="0" lvl="0" indent="0" algn="ctr" defTabSz="914400" rtl="0" eaLnBrk="1" fontAlgn="auto" latinLnBrk="0" hangingPunct="1">
-              <a:lnSpc>
-                <a:spcPct val="100000"/>
-              </a:lnSpc>
-              <a:spcBef>
-                <a:spcPts val="0"/>
-              </a:spcBef>
-              <a:spcAft>
-                <a:spcPts val="0"/>
-              </a:spcAft>
-              <a:buClrTx/>
-              <a:buSzTx/>
-              <a:buFontTx/>
-              <a:buNone/>
-              <a:tabLst/>
-              <a:defRPr/>
-            </a:pPr>
-            <a:endParaRPr kumimoji="0" lang="en-US" sz="1800" b="0" i="0" u="none" strike="noStrike" kern="1200" cap="none" spc="0" normalizeH="0" baseline="0" noProof="0" dirty="0">
-              <a:ln>
-                <a:noFill/>
-              </a:ln>
-              <a:solidFill>
-                <a:prstClr val="white"/>
-              </a:solidFill>
-              <a:effectLst/>
-              <a:uLnTx/>
-              <a:uFillTx/>
-              <a:latin typeface="Calibri" panose="020F0502020204030204"/>
-              <a:ea typeface="+mn-ea"/>
-              <a:cs typeface="+mn-cs"/>
-            </a:endParaRPr>
-          </a:p>
-        </p:txBody>
-      </p:sp>
-      <p:sp>
-        <p:nvSpPr>
-          <p:cNvPr id="4" name="Text Placeholder 2">
-            <a:extLst>
-              <a:ext uri="{FF2B5EF4-FFF2-40B4-BE49-F238E27FC236}">
-                <a16:creationId xmlns:a16="http://schemas.microsoft.com/office/drawing/2014/main" id="{4417CA15-B530-4B0C-A9EA-BD0052763176}"/>
-              </a:ext>
-            </a:extLst>
-          </p:cNvPr>
-          <p:cNvSpPr>
-            <a:spLocks noGrp="1"/>
-          </p:cNvSpPr>
-          <p:nvPr>
-            <p:ph type="body" sz="quarter" idx="10"/>
-          </p:nvPr>
-        </p:nvSpPr>
-        <p:spPr>
-          <a:xfrm>
-            <a:off x="7990091" y="1002818"/>
-            <a:ext cx="3424739" cy="4852362"/>
+            <a:off x="7917688" y="1324144"/>
+            <a:ext cx="4060952" cy="4581256"/>
           </a:xfrm>
         </p:spPr>
         <p:txBody>
-          <a:bodyPr vert="horz" lIns="91440" tIns="45720" rIns="91440" bIns="45720" rtlCol="0" anchor="ctr">
-            <a:normAutofit fontScale="92500"/>
-          </a:bodyPr>
+          <a:bodyPr/>
           <a:lstStyle/>
           <a:p>
             <a:pPr marL="0" indent="0">
@@ -25026,76 +24833,52 @@
             <a:r>
               <a:rPr lang="en-US" dirty="0">
                 <a:solidFill>
-                  <a:srgbClr val="FFFFFF"/>
+                  <a:schemeClr val="tx1"/>
                 </a:solidFill>
-                <a:latin typeface="Segoe UI Semilight" panose="020B0402040204020203" pitchFamily="34" charset="0"/>
-                <a:cs typeface="Segoe UI Semilight" panose="020B0402040204020203" pitchFamily="34" charset="0"/>
               </a:rPr>
               <a:t>A </a:t>
             </a:r>
             <a:r>
               <a:rPr lang="en-US" i="1" dirty="0">
                 <a:solidFill>
-                  <a:srgbClr val="FFFFFF"/>
+                  <a:schemeClr val="tx1"/>
                 </a:solidFill>
-                <a:latin typeface="Segoe UI Semilight" panose="020B0402040204020203" pitchFamily="34" charset="0"/>
-                <a:cs typeface="Segoe UI Semilight" panose="020B0402040204020203" pitchFamily="34" charset="0"/>
               </a:rPr>
               <a:t>public cloud </a:t>
             </a:r>
             <a:r>
               <a:rPr lang="en-US" dirty="0">
                 <a:solidFill>
-                  <a:srgbClr val="FFFFFF"/>
+                  <a:schemeClr val="tx1"/>
                 </a:solidFill>
-                <a:latin typeface="Segoe UI Semilight" panose="020B0402040204020203" pitchFamily="34" charset="0"/>
-                <a:cs typeface="Segoe UI Semilight" panose="020B0402040204020203" pitchFamily="34" charset="0"/>
               </a:rPr>
               <a:t>is owned by a cloud services provider (also known as a </a:t>
             </a:r>
             <a:r>
               <a:rPr lang="en-US" i="1" dirty="0">
                 <a:solidFill>
-                  <a:srgbClr val="FFFFFF"/>
+                  <a:schemeClr val="tx1"/>
                 </a:solidFill>
-                <a:latin typeface="Segoe UI Semilight" panose="020B0402040204020203" pitchFamily="34" charset="0"/>
-                <a:cs typeface="Segoe UI Semilight" panose="020B0402040204020203" pitchFamily="34" charset="0"/>
               </a:rPr>
               <a:t>hosting provider</a:t>
             </a:r>
             <a:r>
               <a:rPr lang="en-US" dirty="0">
                 <a:solidFill>
-                  <a:srgbClr val="FFFFFF"/>
+                  <a:schemeClr val="tx1"/>
                 </a:solidFill>
-                <a:latin typeface="Segoe UI Semilight" panose="020B0402040204020203" pitchFamily="34" charset="0"/>
-                <a:cs typeface="Segoe UI Semilight" panose="020B0402040204020203" pitchFamily="34" charset="0"/>
               </a:rPr>
               <a:t>). It provides resources and services to multiple organizations and users who connect to the cloud service via a secure network connection, typically over the internet</a:t>
             </a:r>
           </a:p>
-          <a:p>
-            <a:endParaRPr lang="en-US" sz="2000" dirty="0">
-              <a:solidFill>
-                <a:srgbClr val="FFFFFF"/>
-              </a:solidFill>
-            </a:endParaRPr>
-          </a:p>
-          <a:p>
-            <a:endParaRPr lang="en-US" sz="2000" dirty="0">
-              <a:solidFill>
-                <a:srgbClr val="FFFFFF"/>
-              </a:solidFill>
-            </a:endParaRPr>
-          </a:p>
         </p:txBody>
       </p:sp>
       <p:pic>
         <p:nvPicPr>
-          <p:cNvPr id="6" name="Picture 5" descr="Multiple hands hold data up to servers in the clouds.">
+          <p:cNvPr id="5" name="Picture 4" descr="Multiple hands hold data up to servers in the clouds.">
             <a:extLst>
               <a:ext uri="{FF2B5EF4-FFF2-40B4-BE49-F238E27FC236}">
-                <a16:creationId xmlns:a16="http://schemas.microsoft.com/office/drawing/2014/main" id="{F8699052-5AB1-45C3-AF8F-E738AEF6C2EC}"/>
+                <a16:creationId xmlns:a16="http://schemas.microsoft.com/office/drawing/2014/main" id="{24C1C11F-6E6D-4250-8043-EA724A676D1B}"/>
               </a:ext>
               <a:ext uri="{C183D7F6-B498-43B3-948B-1728B52AA6E4}">
                 <adec:decorative xmlns:adec="http://schemas.microsoft.com/office/drawing/2017/decorative" val="0"/>
@@ -25120,7 +24903,7 @@
         </p:blipFill>
         <p:spPr>
           <a:xfrm>
-            <a:off x="327547" y="321733"/>
+            <a:off x="588263" y="1426464"/>
             <a:ext cx="7058306" cy="4107392"/>
           </a:xfrm>
           <a:prstGeom prst="rect">
@@ -25131,16 +24914,25 @@
     </p:spTree>
     <p:extLst>
       <p:ext uri="{BB962C8B-B14F-4D97-AF65-F5344CB8AC3E}">
-        <p14:creationId xmlns:p14="http://schemas.microsoft.com/office/powerpoint/2010/main" val="3568637727"/>
+        <p14:creationId xmlns:p14="http://schemas.microsoft.com/office/powerpoint/2010/main" val="309643214"/>
       </p:ext>
     </p:extLst>
   </p:cSld>
   <p:clrMapOvr>
     <a:masterClrMapping/>
   </p:clrMapOvr>
-  <p:transition>
-    <p:fade/>
-  </p:transition>
+  <mc:AlternateContent xmlns:mc="http://schemas.openxmlformats.org/markup-compatibility/2006" xmlns:p14="http://schemas.microsoft.com/office/powerpoint/2010/main">
+    <mc:Choice Requires="p14">
+      <p:transition spd="med" p14:dur="700">
+        <p:fade/>
+      </p:transition>
+    </mc:Choice>
+    <mc:Fallback xmlns="">
+      <p:transition spd="med">
+        <p:fade/>
+      </p:transition>
+    </mc:Fallback>
+  </mc:AlternateContent>
 </p:sld>
 </file>
 
@@ -25260,7 +25052,7 @@
     </p:spTree>
     <p:extLst>
       <p:ext uri="{BB962C8B-B14F-4D97-AF65-F5344CB8AC3E}">
-        <p14:creationId xmlns:p14="http://schemas.microsoft.com/office/powerpoint/2010/main" val="309643214"/>
+        <p14:creationId xmlns:p14="http://schemas.microsoft.com/office/powerpoint/2010/main" val="2348823034"/>
       </p:ext>
     </p:extLst>
   </p:cSld>
@@ -25285,14 +25077,6 @@
 <file path=ppt/slides/slide14.xml><?xml version="1.0" encoding="utf-8"?>
 <p:sld xmlns:a="http://schemas.openxmlformats.org/drawingml/2006/main" xmlns:r="http://schemas.openxmlformats.org/officeDocument/2006/relationships" xmlns:p="http://schemas.openxmlformats.org/presentationml/2006/main">
   <p:cSld>
-    <p:bg>
-      <p:bgPr>
-        <a:solidFill>
-          <a:schemeClr val="bg1"/>
-        </a:solidFill>
-        <a:effectLst/>
-      </p:bgPr>
-    </p:bg>
     <p:spTree>
       <p:nvGrpSpPr>
         <p:cNvPr id="1" name=""/>
@@ -25309,470 +25093,21 @@
       </p:grpSpPr>
       <p:sp>
         <p:nvSpPr>
-          <p:cNvPr id="10" name="Freeform: Shape 9">
-            <a:extLst>
-              <a:ext uri="{FF2B5EF4-FFF2-40B4-BE49-F238E27FC236}">
-                <a16:creationId xmlns:a16="http://schemas.microsoft.com/office/drawing/2014/main" id="{F60FCA6E-0894-46CD-BD49-5955A51E0084}"/>
-              </a:ext>
-              <a:ext uri="{C183D7F6-B498-43B3-948B-1728B52AA6E4}">
-                <adec:decorative xmlns:adec="http://schemas.microsoft.com/office/drawing/2017/decorative" val="1"/>
-              </a:ext>
-            </a:extLst>
-          </p:cNvPr>
-          <p:cNvSpPr>
-            <a:spLocks noGrp="1" noRot="1" noChangeAspect="1" noMove="1" noResize="1" noEditPoints="1" noAdjustHandles="1" noChangeArrowheads="1" noChangeShapeType="1" noTextEdit="1"/>
-          </p:cNvSpPr>
-          <p:nvPr>
-            <p:extLst>
-              <p:ext uri="{386F3935-93C4-4BCD-93E2-E3B085C9AB24}">
-                <p16:designElem xmlns:p16="http://schemas.microsoft.com/office/powerpoint/2015/main" val="1"/>
-              </p:ext>
-            </p:extLst>
-          </p:nvPr>
-        </p:nvSpPr>
-        <p:spPr>
-          <a:xfrm>
-            <a:off x="6831955" y="5346696"/>
-            <a:ext cx="5360045" cy="1511304"/>
-          </a:xfrm>
-          <a:custGeom>
-            <a:avLst/>
-            <a:gdLst>
-              <a:gd name="connsiteX0" fmla="*/ 4545473 w 5360045"/>
-              <a:gd name="connsiteY0" fmla="*/ 0 h 1511304"/>
-              <a:gd name="connsiteX1" fmla="*/ 5360045 w 5360045"/>
-              <a:gd name="connsiteY1" fmla="*/ 0 h 1511304"/>
-              <a:gd name="connsiteX2" fmla="*/ 5360045 w 5360045"/>
-              <a:gd name="connsiteY2" fmla="*/ 1046730 h 1511304"/>
-              <a:gd name="connsiteX3" fmla="*/ 5360045 w 5360045"/>
-              <a:gd name="connsiteY3" fmla="*/ 1508760 h 1511304"/>
-              <a:gd name="connsiteX4" fmla="*/ 5360045 w 5360045"/>
-              <a:gd name="connsiteY4" fmla="*/ 1511304 h 1511304"/>
-              <a:gd name="connsiteX5" fmla="*/ 4545474 w 5360045"/>
-              <a:gd name="connsiteY5" fmla="*/ 1511304 h 1511304"/>
-              <a:gd name="connsiteX6" fmla="*/ 2525897 w 5360045"/>
-              <a:gd name="connsiteY6" fmla="*/ 1511304 h 1511304"/>
-              <a:gd name="connsiteX7" fmla="*/ 0 w 5360045"/>
-              <a:gd name="connsiteY7" fmla="*/ 1511304 h 1511304"/>
-              <a:gd name="connsiteX8" fmla="*/ 697617 w 5360045"/>
-              <a:gd name="connsiteY8" fmla="*/ 3 h 1511304"/>
-              <a:gd name="connsiteX9" fmla="*/ 4545473 w 5360045"/>
-              <a:gd name="connsiteY9" fmla="*/ 3 h 1511304"/>
-            </a:gdLst>
-            <a:ahLst/>
-            <a:cxnLst>
-              <a:cxn ang="0">
-                <a:pos x="connsiteX0" y="connsiteY0"/>
-              </a:cxn>
-              <a:cxn ang="0">
-                <a:pos x="connsiteX1" y="connsiteY1"/>
-              </a:cxn>
-              <a:cxn ang="0">
-                <a:pos x="connsiteX2" y="connsiteY2"/>
-              </a:cxn>
-              <a:cxn ang="0">
-                <a:pos x="connsiteX3" y="connsiteY3"/>
-              </a:cxn>
-              <a:cxn ang="0">
-                <a:pos x="connsiteX4" y="connsiteY4"/>
-              </a:cxn>
-              <a:cxn ang="0">
-                <a:pos x="connsiteX5" y="connsiteY5"/>
-              </a:cxn>
-              <a:cxn ang="0">
-                <a:pos x="connsiteX6" y="connsiteY6"/>
-              </a:cxn>
-              <a:cxn ang="0">
-                <a:pos x="connsiteX7" y="connsiteY7"/>
-              </a:cxn>
-              <a:cxn ang="0">
-                <a:pos x="connsiteX8" y="connsiteY8"/>
-              </a:cxn>
-              <a:cxn ang="0">
-                <a:pos x="connsiteX9" y="connsiteY9"/>
-              </a:cxn>
-            </a:cxnLst>
-            <a:rect l="l" t="t" r="r" b="b"/>
-            <a:pathLst>
-              <a:path w="5360045" h="1511304">
-                <a:moveTo>
-                  <a:pt x="4545473" y="0"/>
-                </a:moveTo>
-                <a:lnTo>
-                  <a:pt x="5360045" y="0"/>
-                </a:lnTo>
-                <a:lnTo>
-                  <a:pt x="5360045" y="1046730"/>
-                </a:lnTo>
-                <a:lnTo>
-                  <a:pt x="5360045" y="1508760"/>
-                </a:lnTo>
-                <a:lnTo>
-                  <a:pt x="5360045" y="1511304"/>
-                </a:lnTo>
-                <a:lnTo>
-                  <a:pt x="4545474" y="1511304"/>
-                </a:lnTo>
-                <a:lnTo>
-                  <a:pt x="2525897" y="1511304"/>
-                </a:lnTo>
-                <a:lnTo>
-                  <a:pt x="0" y="1511304"/>
-                </a:lnTo>
-                <a:lnTo>
-                  <a:pt x="697617" y="3"/>
-                </a:lnTo>
-                <a:lnTo>
-                  <a:pt x="4545473" y="3"/>
-                </a:lnTo>
-                <a:close/>
-              </a:path>
-            </a:pathLst>
-          </a:custGeom>
-          <a:solidFill>
-            <a:srgbClr val="404040">
-              <a:alpha val="84706"/>
-            </a:srgbClr>
-          </a:solidFill>
-          <a:ln>
-            <a:noFill/>
-          </a:ln>
-        </p:spPr>
-        <p:style>
-          <a:lnRef idx="2">
-            <a:schemeClr val="accent1">
-              <a:shade val="50000"/>
-            </a:schemeClr>
-          </a:lnRef>
-          <a:fillRef idx="1">
-            <a:schemeClr val="accent1"/>
-          </a:fillRef>
-          <a:effectRef idx="0">
-            <a:schemeClr val="accent1"/>
-          </a:effectRef>
-          <a:fontRef idx="minor">
-            <a:schemeClr val="lt1"/>
-          </a:fontRef>
-        </p:style>
-        <p:txBody>
-          <a:bodyPr wrap="square" rtlCol="0" anchor="ctr">
-            <a:noAutofit/>
-          </a:bodyPr>
+          <p:cNvPr id="17" name="Title 16"/>
+          <p:cNvSpPr>
+            <a:spLocks noGrp="1"/>
+          </p:cNvSpPr>
+          <p:nvPr>
+            <p:ph type="title"/>
+          </p:nvPr>
+        </p:nvSpPr>
+        <p:spPr/>
+        <p:txBody>
+          <a:bodyPr/>
           <a:lstStyle/>
           <a:p>
-            <a:pPr marL="0" marR="0" lvl="0" indent="0" algn="ctr" defTabSz="914400" rtl="0" eaLnBrk="1" fontAlgn="auto" latinLnBrk="0" hangingPunct="1">
-              <a:lnSpc>
-                <a:spcPct val="100000"/>
-              </a:lnSpc>
-              <a:spcBef>
-                <a:spcPts val="0"/>
-              </a:spcBef>
-              <a:spcAft>
-                <a:spcPts val="0"/>
-              </a:spcAft>
-              <a:buClrTx/>
-              <a:buSzTx/>
-              <a:buFontTx/>
-              <a:buNone/>
-              <a:tabLst/>
-              <a:defRPr/>
-            </a:pPr>
-            <a:endParaRPr kumimoji="0" lang="en-US" sz="1800" b="0" i="0" u="none" strike="noStrike" kern="1200" cap="none" spc="0" normalizeH="0" baseline="0" noProof="0" dirty="0">
-              <a:ln>
-                <a:noFill/>
-              </a:ln>
-              <a:solidFill>
-                <a:prstClr val="white"/>
-              </a:solidFill>
-              <a:effectLst/>
-              <a:uLnTx/>
-              <a:uFillTx/>
-              <a:latin typeface="Calibri" panose="020F0502020204030204"/>
-              <a:ea typeface="+mn-ea"/>
-              <a:cs typeface="+mn-cs"/>
-            </a:endParaRPr>
-          </a:p>
-        </p:txBody>
-      </p:sp>
-      <p:sp>
-        <p:nvSpPr>
-          <p:cNvPr id="12" name="Freeform: Shape 11">
-            <a:extLst>
-              <a:ext uri="{FF2B5EF4-FFF2-40B4-BE49-F238E27FC236}">
-                <a16:creationId xmlns:a16="http://schemas.microsoft.com/office/drawing/2014/main" id="{E78C6E4B-A1F1-4B6C-97EC-BE997495D6AC}"/>
-              </a:ext>
-              <a:ext uri="{C183D7F6-B498-43B3-948B-1728B52AA6E4}">
-                <adec:decorative xmlns:adec="http://schemas.microsoft.com/office/drawing/2017/decorative" val="1"/>
-              </a:ext>
-            </a:extLst>
-          </p:cNvPr>
-          <p:cNvSpPr>
-            <a:spLocks noGrp="1" noRot="1" noChangeAspect="1" noMove="1" noResize="1" noEditPoints="1" noAdjustHandles="1" noChangeArrowheads="1" noChangeShapeType="1" noTextEdit="1"/>
-          </p:cNvSpPr>
-          <p:nvPr>
-            <p:extLst>
-              <p:ext uri="{386F3935-93C4-4BCD-93E2-E3B085C9AB24}">
-                <p16:designElem xmlns:p16="http://schemas.microsoft.com/office/powerpoint/2015/main" val="1"/>
-              </p:ext>
-            </p:extLst>
-          </p:nvPr>
-        </p:nvSpPr>
-        <p:spPr>
-          <a:xfrm>
-            <a:off x="0" y="5346694"/>
-            <a:ext cx="7346605" cy="1511306"/>
-          </a:xfrm>
-          <a:custGeom>
-            <a:avLst/>
-            <a:gdLst>
-              <a:gd name="connsiteX0" fmla="*/ 0 w 7346605"/>
-              <a:gd name="connsiteY0" fmla="*/ 0 h 1511306"/>
-              <a:gd name="connsiteX1" fmla="*/ 239486 w 7346605"/>
-              <a:gd name="connsiteY1" fmla="*/ 0 h 1511306"/>
-              <a:gd name="connsiteX2" fmla="*/ 1209568 w 7346605"/>
-              <a:gd name="connsiteY2" fmla="*/ 0 h 1511306"/>
-              <a:gd name="connsiteX3" fmla="*/ 2405743 w 7346605"/>
-              <a:gd name="connsiteY3" fmla="*/ 0 h 1511306"/>
-              <a:gd name="connsiteX4" fmla="*/ 2405743 w 7346605"/>
-              <a:gd name="connsiteY4" fmla="*/ 2544 h 1511306"/>
-              <a:gd name="connsiteX5" fmla="*/ 2801131 w 7346605"/>
-              <a:gd name="connsiteY5" fmla="*/ 2544 h 1511306"/>
-              <a:gd name="connsiteX6" fmla="*/ 2801131 w 7346605"/>
-              <a:gd name="connsiteY6" fmla="*/ 0 h 1511306"/>
-              <a:gd name="connsiteX7" fmla="*/ 7346605 w 7346605"/>
-              <a:gd name="connsiteY7" fmla="*/ 0 h 1511306"/>
-              <a:gd name="connsiteX8" fmla="*/ 6648988 w 7346605"/>
-              <a:gd name="connsiteY8" fmla="*/ 1511301 h 1511306"/>
-              <a:gd name="connsiteX9" fmla="*/ 2801132 w 7346605"/>
-              <a:gd name="connsiteY9" fmla="*/ 1511301 h 1511306"/>
-              <a:gd name="connsiteX10" fmla="*/ 2801132 w 7346605"/>
-              <a:gd name="connsiteY10" fmla="*/ 1511304 h 1511306"/>
-              <a:gd name="connsiteX11" fmla="*/ 2405743 w 7346605"/>
-              <a:gd name="connsiteY11" fmla="*/ 1511304 h 1511306"/>
-              <a:gd name="connsiteX12" fmla="*/ 2405743 w 7346605"/>
-              <a:gd name="connsiteY12" fmla="*/ 1511306 h 1511306"/>
-              <a:gd name="connsiteX13" fmla="*/ 1333411 w 7346605"/>
-              <a:gd name="connsiteY13" fmla="*/ 1511306 h 1511306"/>
-              <a:gd name="connsiteX14" fmla="*/ 1219208 w 7346605"/>
-              <a:gd name="connsiteY14" fmla="*/ 1511306 h 1511306"/>
-              <a:gd name="connsiteX15" fmla="*/ 1209568 w 7346605"/>
-              <a:gd name="connsiteY15" fmla="*/ 1511306 h 1511306"/>
-              <a:gd name="connsiteX16" fmla="*/ 239486 w 7346605"/>
-              <a:gd name="connsiteY16" fmla="*/ 1511306 h 1511306"/>
-              <a:gd name="connsiteX17" fmla="*/ 0 w 7346605"/>
-              <a:gd name="connsiteY17" fmla="*/ 1511306 h 1511306"/>
-            </a:gdLst>
-            <a:ahLst/>
-            <a:cxnLst>
-              <a:cxn ang="0">
-                <a:pos x="connsiteX0" y="connsiteY0"/>
-              </a:cxn>
-              <a:cxn ang="0">
-                <a:pos x="connsiteX1" y="connsiteY1"/>
-              </a:cxn>
-              <a:cxn ang="0">
-                <a:pos x="connsiteX2" y="connsiteY2"/>
-              </a:cxn>
-              <a:cxn ang="0">
-                <a:pos x="connsiteX3" y="connsiteY3"/>
-              </a:cxn>
-              <a:cxn ang="0">
-                <a:pos x="connsiteX4" y="connsiteY4"/>
-              </a:cxn>
-              <a:cxn ang="0">
-                <a:pos x="connsiteX5" y="connsiteY5"/>
-              </a:cxn>
-              <a:cxn ang="0">
-                <a:pos x="connsiteX6" y="connsiteY6"/>
-              </a:cxn>
-              <a:cxn ang="0">
-                <a:pos x="connsiteX7" y="connsiteY7"/>
-              </a:cxn>
-              <a:cxn ang="0">
-                <a:pos x="connsiteX8" y="connsiteY8"/>
-              </a:cxn>
-              <a:cxn ang="0">
-                <a:pos x="connsiteX9" y="connsiteY9"/>
-              </a:cxn>
-              <a:cxn ang="0">
-                <a:pos x="connsiteX10" y="connsiteY10"/>
-              </a:cxn>
-              <a:cxn ang="0">
-                <a:pos x="connsiteX11" y="connsiteY11"/>
-              </a:cxn>
-              <a:cxn ang="0">
-                <a:pos x="connsiteX12" y="connsiteY12"/>
-              </a:cxn>
-              <a:cxn ang="0">
-                <a:pos x="connsiteX13" y="connsiteY13"/>
-              </a:cxn>
-              <a:cxn ang="0">
-                <a:pos x="connsiteX14" y="connsiteY14"/>
-              </a:cxn>
-              <a:cxn ang="0">
-                <a:pos x="connsiteX15" y="connsiteY15"/>
-              </a:cxn>
-              <a:cxn ang="0">
-                <a:pos x="connsiteX16" y="connsiteY16"/>
-              </a:cxn>
-              <a:cxn ang="0">
-                <a:pos x="connsiteX17" y="connsiteY17"/>
-              </a:cxn>
-            </a:cxnLst>
-            <a:rect l="l" t="t" r="r" b="b"/>
-            <a:pathLst>
-              <a:path w="7346605" h="1511306">
-                <a:moveTo>
-                  <a:pt x="0" y="0"/>
-                </a:moveTo>
-                <a:lnTo>
-                  <a:pt x="239486" y="0"/>
-                </a:lnTo>
-                <a:lnTo>
-                  <a:pt x="1209568" y="0"/>
-                </a:lnTo>
-                <a:lnTo>
-                  <a:pt x="2405743" y="0"/>
-                </a:lnTo>
-                <a:lnTo>
-                  <a:pt x="2405743" y="2544"/>
-                </a:lnTo>
-                <a:lnTo>
-                  <a:pt x="2801131" y="2544"/>
-                </a:lnTo>
-                <a:lnTo>
-                  <a:pt x="2801131" y="0"/>
-                </a:lnTo>
-                <a:lnTo>
-                  <a:pt x="7346605" y="0"/>
-                </a:lnTo>
-                <a:lnTo>
-                  <a:pt x="6648988" y="1511301"/>
-                </a:lnTo>
-                <a:lnTo>
-                  <a:pt x="2801132" y="1511301"/>
-                </a:lnTo>
-                <a:lnTo>
-                  <a:pt x="2801132" y="1511304"/>
-                </a:lnTo>
-                <a:lnTo>
-                  <a:pt x="2405743" y="1511304"/>
-                </a:lnTo>
-                <a:lnTo>
-                  <a:pt x="2405743" y="1511306"/>
-                </a:lnTo>
-                <a:lnTo>
-                  <a:pt x="1333411" y="1511306"/>
-                </a:lnTo>
-                <a:lnTo>
-                  <a:pt x="1219208" y="1511306"/>
-                </a:lnTo>
-                <a:lnTo>
-                  <a:pt x="1209568" y="1511306"/>
-                </a:lnTo>
-                <a:lnTo>
-                  <a:pt x="239486" y="1511306"/>
-                </a:lnTo>
-                <a:lnTo>
-                  <a:pt x="0" y="1511306"/>
-                </a:lnTo>
-                <a:close/>
-              </a:path>
-            </a:pathLst>
-          </a:custGeom>
-          <a:solidFill>
-            <a:srgbClr val="D0CECE"/>
-          </a:solidFill>
-          <a:ln>
-            <a:noFill/>
-          </a:ln>
-        </p:spPr>
-        <p:style>
-          <a:lnRef idx="2">
-            <a:schemeClr val="accent1">
-              <a:shade val="50000"/>
-            </a:schemeClr>
-          </a:lnRef>
-          <a:fillRef idx="1">
-            <a:schemeClr val="accent1"/>
-          </a:fillRef>
-          <a:effectRef idx="0">
-            <a:schemeClr val="accent1"/>
-          </a:effectRef>
-          <a:fontRef idx="minor">
-            <a:schemeClr val="lt1"/>
-          </a:fontRef>
-        </p:style>
-        <p:txBody>
-          <a:bodyPr rtlCol="0" anchor="ctr"/>
-          <a:lstStyle/>
-          <a:p>
-            <a:pPr marL="0" marR="0" lvl="0" indent="0" algn="ctr" defTabSz="914400" rtl="0" eaLnBrk="1" fontAlgn="auto" latinLnBrk="0" hangingPunct="1">
-              <a:lnSpc>
-                <a:spcPct val="100000"/>
-              </a:lnSpc>
-              <a:spcBef>
-                <a:spcPts val="0"/>
-              </a:spcBef>
-              <a:spcAft>
-                <a:spcPts val="0"/>
-              </a:spcAft>
-              <a:buClrTx/>
-              <a:buSzTx/>
-              <a:buFontTx/>
-              <a:buNone/>
-              <a:tabLst/>
-              <a:defRPr/>
-            </a:pPr>
-            <a:endParaRPr kumimoji="0" lang="en-US" sz="1800" b="0" i="0" u="none" strike="noStrike" kern="1200" cap="none" spc="0" normalizeH="0" baseline="0" noProof="0" dirty="0">
-              <a:ln>
-                <a:noFill/>
-              </a:ln>
-              <a:solidFill>
-                <a:prstClr val="white">
-                  <a:lumMod val="95000"/>
-                </a:prstClr>
-              </a:solidFill>
-              <a:effectLst/>
-              <a:uLnTx/>
-              <a:uFillTx/>
-              <a:latin typeface="Calibri" panose="020F0502020204030204"/>
-              <a:ea typeface="+mn-ea"/>
-              <a:cs typeface="+mn-cs"/>
-            </a:endParaRPr>
-          </a:p>
-        </p:txBody>
-      </p:sp>
-      <p:sp>
-        <p:nvSpPr>
-          <p:cNvPr id="2" name="Title 1">
-            <a:extLst>
-              <a:ext uri="{FF2B5EF4-FFF2-40B4-BE49-F238E27FC236}">
-                <a16:creationId xmlns:a16="http://schemas.microsoft.com/office/drawing/2014/main" id="{81B28370-6B1C-41C1-B51B-DEB7E13BAC04}"/>
-              </a:ext>
-            </a:extLst>
-          </p:cNvPr>
-          <p:cNvSpPr>
-            <a:spLocks noGrp="1"/>
-          </p:cNvSpPr>
-          <p:nvPr>
-            <p:ph type="title"/>
-          </p:nvPr>
-        </p:nvSpPr>
-        <p:spPr>
-          <a:xfrm>
-            <a:off x="950121" y="5529884"/>
-            <a:ext cx="5693783" cy="1096331"/>
-          </a:xfrm>
-        </p:spPr>
-        <p:txBody>
-          <a:bodyPr vert="horz" lIns="91440" tIns="45720" rIns="91440" bIns="45720" rtlCol="0" anchor="ctr">
-            <a:normAutofit/>
-          </a:bodyPr>
-          <a:lstStyle/>
-          <a:p>
-            <a:r>
-              <a:rPr lang="en-US" sz="3600" kern="1200" dirty="0">
+            <a:r>
+              <a:rPr lang="en-US" dirty="0">
                 <a:solidFill>
                   <a:srgbClr val="303030"/>
                 </a:solidFill>
@@ -25780,18 +25115,13 @@
               </a:rPr>
               <a:t>Hybrid cloud</a:t>
             </a:r>
-          </a:p>
-        </p:txBody>
-      </p:sp>
-      <p:sp>
-        <p:nvSpPr>
-          <p:cNvPr id="3" name="Text Placeholder 2">
-            <a:extLst>
-              <a:ext uri="{FF2B5EF4-FFF2-40B4-BE49-F238E27FC236}">
-                <a16:creationId xmlns:a16="http://schemas.microsoft.com/office/drawing/2014/main" id="{F5B850AC-D558-4397-A13C-1B32E5FA6B7C}"/>
-              </a:ext>
-            </a:extLst>
-          </p:cNvPr>
+            <a:endParaRPr lang="en-US" dirty="0"/>
+          </a:p>
+        </p:txBody>
+      </p:sp>
+      <p:sp>
+        <p:nvSpPr>
+          <p:cNvPr id="6" name="Text Placeholder 5"/>
           <p:cNvSpPr>
             <a:spLocks noGrp="1"/>
           </p:cNvSpPr>
@@ -25801,47 +25131,33 @@
         </p:nvSpPr>
         <p:spPr>
           <a:xfrm>
-            <a:off x="7534655" y="965199"/>
-            <a:ext cx="4008101" cy="4020458"/>
+            <a:off x="1086611" y="5305819"/>
+            <a:ext cx="10018777" cy="1094981"/>
           </a:xfrm>
         </p:spPr>
         <p:txBody>
-          <a:bodyPr vert="horz" lIns="91440" tIns="45720" rIns="91440" bIns="45720" rtlCol="0" anchor="ctr">
-            <a:normAutofit/>
-          </a:bodyPr>
+          <a:bodyPr/>
           <a:lstStyle/>
           <a:p>
             <a:pPr marL="0" indent="0">
               <a:buNone/>
             </a:pPr>
             <a:r>
-              <a:rPr lang="en-IE" dirty="0">
-                <a:latin typeface="Segoe UI Semilight" panose="020B0402040204020203" pitchFamily="34" charset="0"/>
-                <a:cs typeface="Segoe UI Semilight" panose="020B0402040204020203" pitchFamily="34" charset="0"/>
-              </a:rPr>
+              <a:rPr lang="en-IE" dirty="0"/>
               <a:t>A </a:t>
             </a:r>
             <a:r>
-              <a:rPr lang="en-IE" i="1" dirty="0">
-                <a:latin typeface="Segoe UI Semilight" panose="020B0402040204020203" pitchFamily="34" charset="0"/>
-                <a:cs typeface="Segoe UI Semilight" panose="020B0402040204020203" pitchFamily="34" charset="0"/>
-              </a:rPr>
+              <a:rPr lang="en-IE" i="1" dirty="0"/>
               <a:t>hybrid cloud </a:t>
             </a:r>
             <a:r>
-              <a:rPr lang="en-IE" dirty="0">
-                <a:latin typeface="Segoe UI Semilight" panose="020B0402040204020203" pitchFamily="34" charset="0"/>
-                <a:cs typeface="Segoe UI Semilight" panose="020B0402040204020203" pitchFamily="34" charset="0"/>
-              </a:rPr>
+              <a:rPr lang="en-IE" dirty="0"/>
               <a:t>combines both public and private clouds, allowing you to run your applications in the most appropriate location</a:t>
             </a:r>
-            <a:endParaRPr lang="en-US" dirty="0">
-              <a:latin typeface="Segoe UI Semilight" panose="020B0402040204020203" pitchFamily="34" charset="0"/>
-              <a:cs typeface="Segoe UI Semilight" panose="020B0402040204020203" pitchFamily="34" charset="0"/>
-            </a:endParaRPr>
-          </a:p>
-          <a:p>
-            <a:endParaRPr lang="en-US" sz="2000" dirty="0"/>
+            <a:r>
+              <a:rPr lang="en-US" dirty="0"/>
+              <a:t>.</a:t>
+            </a:r>
           </a:p>
         </p:txBody>
       </p:sp>
@@ -25850,7 +25166,7 @@
           <p:cNvPr id="5" name="Picture 4" descr="The public cloud image and private cloud image are connected with a plus sign, demonstrating that a hybrid cloud is a combination of the two.">
             <a:extLst>
               <a:ext uri="{FF2B5EF4-FFF2-40B4-BE49-F238E27FC236}">
-                <a16:creationId xmlns:a16="http://schemas.microsoft.com/office/drawing/2014/main" id="{ED7C7614-FBDC-4247-874E-DC5CA77E9C89}"/>
+                <a16:creationId xmlns:a16="http://schemas.microsoft.com/office/drawing/2014/main" id="{14976C97-24C8-4AD8-BD44-300CAFDDB0B7}"/>
               </a:ext>
             </a:extLst>
           </p:cNvPr>
@@ -25873,8 +25189,8 @@
         </p:blipFill>
         <p:spPr>
           <a:xfrm>
-            <a:off x="950121" y="1385350"/>
-            <a:ext cx="5941068" cy="3148766"/>
+            <a:off x="1901096" y="1166444"/>
+            <a:ext cx="7517223" cy="3984128"/>
           </a:xfrm>
           <a:prstGeom prst="rect">
             <a:avLst/>
@@ -25884,16 +25200,25 @@
     </p:spTree>
     <p:extLst>
       <p:ext uri="{BB962C8B-B14F-4D97-AF65-F5344CB8AC3E}">
-        <p14:creationId xmlns:p14="http://schemas.microsoft.com/office/powerpoint/2010/main" val="447015450"/>
+        <p14:creationId xmlns:p14="http://schemas.microsoft.com/office/powerpoint/2010/main" val="3382167658"/>
       </p:ext>
     </p:extLst>
   </p:cSld>
   <p:clrMapOvr>
     <a:masterClrMapping/>
   </p:clrMapOvr>
-  <p:transition>
-    <p:fade/>
-  </p:transition>
+  <mc:AlternateContent xmlns:mc="http://schemas.openxmlformats.org/markup-compatibility/2006" xmlns:p14="http://schemas.microsoft.com/office/powerpoint/2010/main">
+    <mc:Choice Requires="p14">
+      <p:transition spd="med" p14:dur="700">
+        <p:fade/>
+      </p:transition>
+    </mc:Choice>
+    <mc:Fallback xmlns="">
+      <p:transition spd="med">
+        <p:fade/>
+      </p:transition>
+    </mc:Fallback>
+  </mc:AlternateContent>
 </p:sld>
 </file>
 
@@ -26247,14 +25572,6 @@
 <file path=ppt/slides/slide18.xml><?xml version="1.0" encoding="utf-8"?>
 <p:sld xmlns:a="http://schemas.openxmlformats.org/drawingml/2006/main" xmlns:r="http://schemas.openxmlformats.org/officeDocument/2006/relationships" xmlns:p="http://schemas.openxmlformats.org/presentationml/2006/main">
   <p:cSld>
-    <p:bg>
-      <p:bgPr>
-        <a:solidFill>
-          <a:schemeClr val="bg1"/>
-        </a:solidFill>
-        <a:effectLst/>
-      </p:bgPr>
-    </p:bg>
     <p:spTree>
       <p:nvGrpSpPr>
         <p:cNvPr id="1" name=""/>
@@ -26271,153 +25588,39 @@
       </p:grpSpPr>
       <p:sp>
         <p:nvSpPr>
-          <p:cNvPr id="10" name="Rectangle 9">
-            <a:extLst>
-              <a:ext uri="{FF2B5EF4-FFF2-40B4-BE49-F238E27FC236}">
-                <a16:creationId xmlns:a16="http://schemas.microsoft.com/office/drawing/2014/main" id="{867D4867-5BA7-4462-B2F6-A23F4A622AA7}"/>
-              </a:ext>
-              <a:ext uri="{C183D7F6-B498-43B3-948B-1728B52AA6E4}">
-                <adec:decorative xmlns:adec="http://schemas.microsoft.com/office/drawing/2017/decorative" val="1"/>
-              </a:ext>
-            </a:extLst>
-          </p:cNvPr>
-          <p:cNvSpPr>
-            <a:spLocks noGrp="1" noRot="1" noChangeAspect="1" noMove="1" noResize="1" noEditPoints="1" noAdjustHandles="1" noChangeArrowheads="1" noChangeShapeType="1" noTextEdit="1"/>
-          </p:cNvSpPr>
-          <p:nvPr>
-            <p:extLst>
-              <p:ext uri="{386F3935-93C4-4BCD-93E2-E3B085C9AB24}">
-                <p16:designElem xmlns:p16="http://schemas.microsoft.com/office/powerpoint/2015/main" val="1"/>
-              </p:ext>
-            </p:extLst>
+          <p:cNvPr id="17" name="Title 16"/>
+          <p:cNvSpPr>
+            <a:spLocks noGrp="1"/>
+          </p:cNvSpPr>
+          <p:nvPr>
+            <p:ph type="title"/>
           </p:nvPr>
         </p:nvSpPr>
         <p:spPr>
           <a:xfrm>
-            <a:off x="0" y="0"/>
-            <a:ext cx="4654296" cy="6858000"/>
+            <a:off x="684275" y="364491"/>
+            <a:ext cx="10515600" cy="933958"/>
           </a:xfrm>
-          <a:prstGeom prst="rect">
-            <a:avLst/>
-          </a:prstGeom>
-          <a:solidFill>
-            <a:schemeClr val="tx1">
-              <a:lumMod val="75000"/>
-              <a:lumOff val="25000"/>
-            </a:schemeClr>
-          </a:solidFill>
-          <a:ln>
-            <a:noFill/>
-          </a:ln>
         </p:spPr>
-        <p:style>
-          <a:lnRef idx="0">
-            <a:scrgbClr r="0" g="0" b="0"/>
-          </a:lnRef>
-          <a:fillRef idx="0">
-            <a:scrgbClr r="0" g="0" b="0"/>
-          </a:fillRef>
-          <a:effectRef idx="0">
-            <a:scrgbClr r="0" g="0" b="0"/>
-          </a:effectRef>
-          <a:fontRef idx="minor">
-            <a:schemeClr val="lt1"/>
-          </a:fontRef>
-        </p:style>
-        <p:txBody>
-          <a:bodyPr rtlCol="0" anchor="ctr"/>
-          <a:lstStyle/>
-          <a:p>
-            <a:pPr marL="0" marR="0" lvl="0" indent="0" algn="ctr" defTabSz="914400" rtl="0" eaLnBrk="1" fontAlgn="auto" latinLnBrk="0" hangingPunct="1">
-              <a:lnSpc>
-                <a:spcPct val="100000"/>
-              </a:lnSpc>
-              <a:spcBef>
-                <a:spcPts val="0"/>
-              </a:spcBef>
-              <a:spcAft>
-                <a:spcPts val="0"/>
-              </a:spcAft>
-              <a:buClrTx/>
-              <a:buSzTx/>
-              <a:buFontTx/>
-              <a:buNone/>
-              <a:tabLst/>
-              <a:defRPr/>
-            </a:pPr>
-            <a:endParaRPr kumimoji="0" lang="en-US" sz="1800" b="0" i="0" u="none" strike="noStrike" kern="1200" cap="none" spc="0" normalizeH="0" baseline="0" noProof="0" dirty="0">
-              <a:ln>
-                <a:noFill/>
-              </a:ln>
-              <a:solidFill>
-                <a:prstClr val="white"/>
-              </a:solidFill>
-              <a:effectLst/>
-              <a:uLnTx/>
-              <a:uFillTx/>
-              <a:latin typeface="Calibri" panose="020F0502020204030204"/>
-              <a:ea typeface="+mn-ea"/>
-              <a:cs typeface="+mn-cs"/>
-            </a:endParaRPr>
-          </a:p>
-        </p:txBody>
-      </p:sp>
-      <p:sp>
-        <p:nvSpPr>
-          <p:cNvPr id="2" name="Title 1">
-            <a:extLst>
-              <a:ext uri="{FF2B5EF4-FFF2-40B4-BE49-F238E27FC236}">
-                <a16:creationId xmlns:a16="http://schemas.microsoft.com/office/drawing/2014/main" id="{1786866D-A435-4CF0-908C-E7FC50CA1600}"/>
-              </a:ext>
-            </a:extLst>
-          </p:cNvPr>
-          <p:cNvSpPr>
-            <a:spLocks noGrp="1"/>
-          </p:cNvSpPr>
-          <p:nvPr>
-            <p:ph type="title"/>
-          </p:nvPr>
-        </p:nvSpPr>
-        <p:spPr>
-          <a:xfrm>
-            <a:off x="635910" y="360246"/>
-            <a:ext cx="3363974" cy="694832"/>
-          </a:xfrm>
-          <a:noFill/>
-          <a:ln w="19050">
-            <a:solidFill>
-              <a:schemeClr val="bg1"/>
-            </a:solidFill>
-          </a:ln>
-        </p:spPr>
-        <p:txBody>
-          <a:bodyPr vert="horz" wrap="square" lIns="91440" tIns="45720" rIns="91440" bIns="45720" rtlCol="0" anchor="ctr">
+        <p:txBody>
+          <a:bodyPr>
             <a:normAutofit/>
           </a:bodyPr>
           <a:lstStyle/>
           <a:p>
-            <a:pPr algn="ctr"/>
-            <a:r>
-              <a:rPr lang="en-US" sz="3600" kern="1200" dirty="0">
-                <a:solidFill>
-                  <a:schemeClr val="bg1"/>
-                </a:solidFill>
+            <a:r>
+              <a:rPr lang="en-US" sz="3600" dirty="0">
                 <a:latin typeface="Segoe UI Semibold (Headings)"/>
               </a:rPr>
               <a:t>IaaS</a:t>
             </a:r>
-          </a:p>
-        </p:txBody>
-      </p:sp>
-      <p:sp>
-        <p:nvSpPr>
-          <p:cNvPr id="3" name="Text Placeholder 2">
-            <a:extLst>
-              <a:ext uri="{FF2B5EF4-FFF2-40B4-BE49-F238E27FC236}">
-                <a16:creationId xmlns:a16="http://schemas.microsoft.com/office/drawing/2014/main" id="{013477EB-7FAD-4477-A63C-B9B582BD14A4}"/>
-              </a:ext>
-            </a:extLst>
-          </p:cNvPr>
+            <a:endParaRPr lang="en-US" sz="3600" dirty="0"/>
+          </a:p>
+        </p:txBody>
+      </p:sp>
+      <p:sp>
+        <p:nvSpPr>
+          <p:cNvPr id="6" name="Text Placeholder 5"/>
           <p:cNvSpPr>
             <a:spLocks noGrp="1"/>
           </p:cNvSpPr>
@@ -26427,13 +25630,13 @@
         </p:nvSpPr>
         <p:spPr>
           <a:xfrm>
-            <a:off x="179371" y="1274647"/>
-            <a:ext cx="4295553" cy="3415622"/>
+            <a:off x="684275" y="1298449"/>
+            <a:ext cx="4472941" cy="5193791"/>
           </a:xfrm>
         </p:spPr>
         <p:txBody>
-          <a:bodyPr vert="horz" lIns="91440" tIns="45720" rIns="91440" bIns="45720" rtlCol="0">
-            <a:noAutofit/>
+          <a:bodyPr>
+            <a:normAutofit/>
           </a:bodyPr>
           <a:lstStyle/>
           <a:p>
@@ -26442,9 +25645,6 @@
             </a:pPr>
             <a:r>
               <a:rPr lang="en-US" dirty="0">
-                <a:solidFill>
-                  <a:schemeClr val="bg1"/>
-                </a:solidFill>
                 <a:latin typeface="Segoe UI Semilight" panose="020B0402040204020203" pitchFamily="34" charset="0"/>
                 <a:cs typeface="Segoe UI Semilight" panose="020B0402040204020203" pitchFamily="34" charset="0"/>
               </a:rPr>
@@ -26455,10 +25655,10 @@
       </p:sp>
       <p:pic>
         <p:nvPicPr>
-          <p:cNvPr id="8" name="Picture 7" descr="IaaS is encompassing the following three icons: Servers and storage, Networking firewalls and security, and Datacenter physical plant and building.">
+          <p:cNvPr id="7" name="Picture 6" descr="IaaS is encompassing the following three icons: Servers and storage, Networking firewalls and security, and Datacenter physical plant and building.">
             <a:extLst>
               <a:ext uri="{FF2B5EF4-FFF2-40B4-BE49-F238E27FC236}">
-                <a16:creationId xmlns:a16="http://schemas.microsoft.com/office/drawing/2014/main" id="{052FE75B-D023-445E-80F4-A24E03F8EAAC}"/>
+                <a16:creationId xmlns:a16="http://schemas.microsoft.com/office/drawing/2014/main" id="{19264D1A-B73C-482B-BEA3-7160F1421BB9}"/>
               </a:ext>
             </a:extLst>
           </p:cNvPr>
@@ -26481,8 +25681,8 @@
         </p:blipFill>
         <p:spPr>
           <a:xfrm>
-            <a:off x="5035137" y="1780262"/>
-            <a:ext cx="6513395" cy="3706136"/>
+            <a:off x="5056225" y="1536192"/>
+            <a:ext cx="6784916" cy="3860632"/>
           </a:xfrm>
           <a:prstGeom prst="rect">
             <a:avLst/>
@@ -26492,30 +25692,31 @@
     </p:spTree>
     <p:extLst>
       <p:ext uri="{BB962C8B-B14F-4D97-AF65-F5344CB8AC3E}">
-        <p14:creationId xmlns:p14="http://schemas.microsoft.com/office/powerpoint/2010/main" val="1107964273"/>
+        <p14:creationId xmlns:p14="http://schemas.microsoft.com/office/powerpoint/2010/main" val="1278500812"/>
       </p:ext>
     </p:extLst>
   </p:cSld>
   <p:clrMapOvr>
     <a:masterClrMapping/>
   </p:clrMapOvr>
-  <p:transition>
-    <p:fade/>
-  </p:transition>
+  <mc:AlternateContent xmlns:mc="http://schemas.openxmlformats.org/markup-compatibility/2006" xmlns:p14="http://schemas.microsoft.com/office/powerpoint/2010/main">
+    <mc:Choice Requires="p14">
+      <p:transition spd="med" p14:dur="700">
+        <p:fade/>
+      </p:transition>
+    </mc:Choice>
+    <mc:Fallback xmlns="">
+      <p:transition spd="med">
+        <p:fade/>
+      </p:transition>
+    </mc:Fallback>
+  </mc:AlternateContent>
 </p:sld>
 </file>
 
 <file path=ppt/slides/slide19.xml><?xml version="1.0" encoding="utf-8"?>
 <p:sld xmlns:a="http://schemas.openxmlformats.org/drawingml/2006/main" xmlns:r="http://schemas.openxmlformats.org/officeDocument/2006/relationships" xmlns:p="http://schemas.openxmlformats.org/presentationml/2006/main">
   <p:cSld>
-    <p:bg>
-      <p:bgPr>
-        <a:solidFill>
-          <a:schemeClr val="bg1"/>
-        </a:solidFill>
-        <a:effectLst/>
-      </p:bgPr>
-    </p:bg>
     <p:spTree>
       <p:nvGrpSpPr>
         <p:cNvPr id="1" name=""/>
@@ -26532,153 +25733,39 @@
       </p:grpSpPr>
       <p:sp>
         <p:nvSpPr>
-          <p:cNvPr id="15" name="Rectangle 14">
-            <a:extLst>
-              <a:ext uri="{FF2B5EF4-FFF2-40B4-BE49-F238E27FC236}">
-                <a16:creationId xmlns:a16="http://schemas.microsoft.com/office/drawing/2014/main" id="{867D4867-5BA7-4462-B2F6-A23F4A622AA7}"/>
-              </a:ext>
-              <a:ext uri="{C183D7F6-B498-43B3-948B-1728B52AA6E4}">
-                <adec:decorative xmlns:adec="http://schemas.microsoft.com/office/drawing/2017/decorative" val="1"/>
-              </a:ext>
-            </a:extLst>
-          </p:cNvPr>
-          <p:cNvSpPr>
-            <a:spLocks noGrp="1" noRot="1" noChangeAspect="1" noMove="1" noResize="1" noEditPoints="1" noAdjustHandles="1" noChangeArrowheads="1" noChangeShapeType="1" noTextEdit="1"/>
-          </p:cNvSpPr>
-          <p:nvPr>
-            <p:extLst>
-              <p:ext uri="{386F3935-93C4-4BCD-93E2-E3B085C9AB24}">
-                <p16:designElem xmlns:p16="http://schemas.microsoft.com/office/powerpoint/2015/main" val="1"/>
-              </p:ext>
-            </p:extLst>
+          <p:cNvPr id="17" name="Title 16"/>
+          <p:cNvSpPr>
+            <a:spLocks noGrp="1"/>
+          </p:cNvSpPr>
+          <p:nvPr>
+            <p:ph type="title"/>
           </p:nvPr>
         </p:nvSpPr>
         <p:spPr>
           <a:xfrm>
-            <a:off x="7528560" y="0"/>
-            <a:ext cx="4654296" cy="6858000"/>
+            <a:off x="684275" y="364491"/>
+            <a:ext cx="10515600" cy="933958"/>
           </a:xfrm>
-          <a:prstGeom prst="rect">
-            <a:avLst/>
-          </a:prstGeom>
-          <a:solidFill>
-            <a:schemeClr val="tx1">
-              <a:lumMod val="75000"/>
-              <a:lumOff val="25000"/>
-            </a:schemeClr>
-          </a:solidFill>
-          <a:ln>
-            <a:noFill/>
-          </a:ln>
         </p:spPr>
-        <p:style>
-          <a:lnRef idx="0">
-            <a:scrgbClr r="0" g="0" b="0"/>
-          </a:lnRef>
-          <a:fillRef idx="0">
-            <a:scrgbClr r="0" g="0" b="0"/>
-          </a:fillRef>
-          <a:effectRef idx="0">
-            <a:scrgbClr r="0" g="0" b="0"/>
-          </a:effectRef>
-          <a:fontRef idx="minor">
-            <a:schemeClr val="lt1"/>
-          </a:fontRef>
-        </p:style>
-        <p:txBody>
-          <a:bodyPr rtlCol="0" anchor="ctr"/>
-          <a:lstStyle/>
-          <a:p>
-            <a:pPr marL="0" marR="0" lvl="0" indent="0" algn="ctr" defTabSz="914400" rtl="0" eaLnBrk="1" fontAlgn="auto" latinLnBrk="0" hangingPunct="1">
-              <a:lnSpc>
-                <a:spcPct val="100000"/>
-              </a:lnSpc>
-              <a:spcBef>
-                <a:spcPts val="0"/>
-              </a:spcBef>
-              <a:spcAft>
-                <a:spcPts val="0"/>
-              </a:spcAft>
-              <a:buClrTx/>
-              <a:buSzTx/>
-              <a:buFontTx/>
-              <a:buNone/>
-              <a:tabLst/>
-              <a:defRPr/>
-            </a:pPr>
-            <a:endParaRPr kumimoji="0" lang="en-US" sz="1800" b="0" i="0" u="none" strike="noStrike" kern="1200" cap="none" spc="0" normalizeH="0" baseline="0" noProof="0" dirty="0">
-              <a:ln>
-                <a:noFill/>
-              </a:ln>
-              <a:solidFill>
-                <a:prstClr val="white"/>
-              </a:solidFill>
-              <a:effectLst/>
-              <a:uLnTx/>
-              <a:uFillTx/>
-              <a:latin typeface="Calibri" panose="020F0502020204030204"/>
-              <a:ea typeface="+mn-ea"/>
-              <a:cs typeface="+mn-cs"/>
-            </a:endParaRPr>
-          </a:p>
-        </p:txBody>
-      </p:sp>
-      <p:sp>
-        <p:nvSpPr>
-          <p:cNvPr id="2" name="Title 1">
-            <a:extLst>
-              <a:ext uri="{FF2B5EF4-FFF2-40B4-BE49-F238E27FC236}">
-                <a16:creationId xmlns:a16="http://schemas.microsoft.com/office/drawing/2014/main" id="{1786866D-A435-4CF0-908C-E7FC50CA1600}"/>
-              </a:ext>
-            </a:extLst>
-          </p:cNvPr>
-          <p:cNvSpPr>
-            <a:spLocks noGrp="1"/>
-          </p:cNvSpPr>
-          <p:nvPr>
-            <p:ph type="title"/>
-          </p:nvPr>
-        </p:nvSpPr>
-        <p:spPr>
-          <a:xfrm>
-            <a:off x="8172027" y="354930"/>
-            <a:ext cx="3363974" cy="805656"/>
-          </a:xfrm>
-          <a:noFill/>
-          <a:ln w="19050">
-            <a:solidFill>
-              <a:schemeClr val="bg1"/>
-            </a:solidFill>
-          </a:ln>
-        </p:spPr>
-        <p:txBody>
-          <a:bodyPr vert="horz" wrap="square" lIns="91440" tIns="45720" rIns="91440" bIns="45720" rtlCol="0" anchor="ctr">
+        <p:txBody>
+          <a:bodyPr>
             <a:normAutofit/>
           </a:bodyPr>
           <a:lstStyle/>
           <a:p>
-            <a:pPr algn="ctr"/>
-            <a:r>
-              <a:rPr lang="en-US" sz="3600" kern="1200" dirty="0">
-                <a:solidFill>
-                  <a:schemeClr val="bg1"/>
-                </a:solidFill>
+            <a:r>
+              <a:rPr lang="en-US" sz="3600" dirty="0">
                 <a:latin typeface="Segoe UI Semibold (Headings)"/>
               </a:rPr>
               <a:t>PaaS</a:t>
             </a:r>
-          </a:p>
-        </p:txBody>
-      </p:sp>
-      <p:sp>
-        <p:nvSpPr>
-          <p:cNvPr id="3" name="Text Placeholder 2">
-            <a:extLst>
-              <a:ext uri="{FF2B5EF4-FFF2-40B4-BE49-F238E27FC236}">
-                <a16:creationId xmlns:a16="http://schemas.microsoft.com/office/drawing/2014/main" id="{013477EB-7FAD-4477-A63C-B9B582BD14A4}"/>
-              </a:ext>
-            </a:extLst>
-          </p:cNvPr>
+            <a:endParaRPr lang="en-US" sz="3600" dirty="0"/>
+          </a:p>
+        </p:txBody>
+      </p:sp>
+      <p:sp>
+        <p:nvSpPr>
+          <p:cNvPr id="6" name="Text Placeholder 5"/>
           <p:cNvSpPr>
             <a:spLocks noGrp="1"/>
           </p:cNvSpPr>
@@ -26688,13 +25775,13 @@
         </p:nvSpPr>
         <p:spPr>
           <a:xfrm>
-            <a:off x="8172027" y="1721189"/>
-            <a:ext cx="3627249" cy="3415622"/>
+            <a:off x="7981004" y="1691477"/>
+            <a:ext cx="3814573" cy="4279391"/>
           </a:xfrm>
         </p:spPr>
         <p:txBody>
-          <a:bodyPr vert="horz" lIns="91440" tIns="45720" rIns="91440" bIns="45720" rtlCol="0">
-            <a:noAutofit/>
+          <a:bodyPr>
+            <a:normAutofit lnSpcReduction="10000"/>
           </a:bodyPr>
           <a:lstStyle/>
           <a:p>
@@ -26703,9 +25790,6 @@
             </a:pPr>
             <a:r>
               <a:rPr lang="en-US" dirty="0">
-                <a:solidFill>
-                  <a:schemeClr val="bg1"/>
-                </a:solidFill>
                 <a:latin typeface="Segoe UI Semilight" panose="020B0402040204020203" pitchFamily="34" charset="0"/>
                 <a:cs typeface="Segoe UI Semilight" panose="020B0402040204020203" pitchFamily="34" charset="0"/>
               </a:rPr>
@@ -26716,10 +25800,10 @@
       </p:sp>
       <p:pic>
         <p:nvPicPr>
-          <p:cNvPr id="6" name="Picture 5" descr="PaaS encompasses IaaS. The IaaS icons are Servers and Storage, Networking firewalls and security, and Datacenter physical plant and security. In addition to the IaaS icons, PaaS icons include an Operating systems icon, and a Development tools, database management, and business analytics icons.">
+          <p:cNvPr id="5" name="Picture 4" descr="PaaS encompasses IaaS. The IaaS icons are Servers and Storage, Networking firewalls and security, and Datacenter physical plant and security. In addition to the IaaS icons, PaaS icons include an Operating systems icon, and a Development tools, database management, and business analytics icons.">
             <a:extLst>
               <a:ext uri="{FF2B5EF4-FFF2-40B4-BE49-F238E27FC236}">
-                <a16:creationId xmlns:a16="http://schemas.microsoft.com/office/drawing/2014/main" id="{23F88025-03F2-43B9-8CE8-0E6D8D3A4A90}"/>
+                <a16:creationId xmlns:a16="http://schemas.microsoft.com/office/drawing/2014/main" id="{762123AF-6EB1-42A3-B858-5CB39542AC78}"/>
               </a:ext>
             </a:extLst>
           </p:cNvPr>
@@ -26742,8 +25826,8 @@
         </p:blipFill>
         <p:spPr>
           <a:xfrm>
-            <a:off x="113856" y="2005263"/>
-            <a:ext cx="7297598" cy="3161260"/>
+            <a:off x="113855" y="2005262"/>
+            <a:ext cx="7867149" cy="3407985"/>
           </a:xfrm>
           <a:prstGeom prst="rect">
             <a:avLst/>
@@ -26753,16 +25837,25 @@
     </p:spTree>
     <p:extLst>
       <p:ext uri="{BB962C8B-B14F-4D97-AF65-F5344CB8AC3E}">
-        <p14:creationId xmlns:p14="http://schemas.microsoft.com/office/powerpoint/2010/main" val="1548623036"/>
+        <p14:creationId xmlns:p14="http://schemas.microsoft.com/office/powerpoint/2010/main" val="2249075106"/>
       </p:ext>
     </p:extLst>
   </p:cSld>
   <p:clrMapOvr>
     <a:masterClrMapping/>
   </p:clrMapOvr>
-  <p:transition>
-    <p:fade/>
-  </p:transition>
+  <mc:AlternateContent xmlns:mc="http://schemas.openxmlformats.org/markup-compatibility/2006" xmlns:p14="http://schemas.microsoft.com/office/powerpoint/2010/main">
+    <mc:Choice Requires="p14">
+      <p:transition spd="med" p14:dur="700">
+        <p:fade/>
+      </p:transition>
+    </mc:Choice>
+    <mc:Fallback xmlns="">
+      <p:transition spd="med">
+        <p:fade/>
+      </p:transition>
+    </mc:Fallback>
+  </mc:AlternateContent>
 </p:sld>
 </file>
 
@@ -26841,14 +25934,6 @@
 <file path=ppt/slides/slide20.xml><?xml version="1.0" encoding="utf-8"?>
 <p:sld xmlns:a="http://schemas.openxmlformats.org/drawingml/2006/main" xmlns:r="http://schemas.openxmlformats.org/officeDocument/2006/relationships" xmlns:p="http://schemas.openxmlformats.org/presentationml/2006/main">
   <p:cSld>
-    <p:bg>
-      <p:bgPr>
-        <a:solidFill>
-          <a:schemeClr val="bg1"/>
-        </a:solidFill>
-        <a:effectLst/>
-      </p:bgPr>
-    </p:bg>
     <p:spTree>
       <p:nvGrpSpPr>
         <p:cNvPr id="1" name=""/>
@@ -26865,146 +25950,87 @@
       </p:grpSpPr>
       <p:sp>
         <p:nvSpPr>
-          <p:cNvPr id="15" name="Rectangle 14">
-            <a:extLst>
-              <a:ext uri="{FF2B5EF4-FFF2-40B4-BE49-F238E27FC236}">
-                <a16:creationId xmlns:a16="http://schemas.microsoft.com/office/drawing/2014/main" id="{B0792D4F-247E-46FE-85FC-881DEFA41D94}"/>
-              </a:ext>
-              <a:ext uri="{C183D7F6-B498-43B3-948B-1728B52AA6E4}">
-                <adec:decorative xmlns:adec="http://schemas.microsoft.com/office/drawing/2017/decorative" val="1"/>
-              </a:ext>
-            </a:extLst>
-          </p:cNvPr>
-          <p:cNvSpPr>
-            <a:spLocks noGrp="1" noRot="1" noChangeAspect="1" noMove="1" noResize="1" noEditPoints="1" noAdjustHandles="1" noChangeArrowheads="1" noChangeShapeType="1" noTextEdit="1"/>
-          </p:cNvSpPr>
-          <p:nvPr>
-            <p:extLst>
-              <p:ext uri="{386F3935-93C4-4BCD-93E2-E3B085C9AB24}">
-                <p16:designElem xmlns:p16="http://schemas.microsoft.com/office/powerpoint/2015/main" val="1"/>
-              </p:ext>
-            </p:extLst>
+          <p:cNvPr id="17" name="Title 16"/>
+          <p:cNvSpPr>
+            <a:spLocks noGrp="1"/>
+          </p:cNvSpPr>
+          <p:nvPr>
+            <p:ph type="title"/>
           </p:nvPr>
         </p:nvSpPr>
         <p:spPr>
           <a:xfrm>
-            <a:off x="0" y="4572457"/>
-            <a:ext cx="12188952" cy="2285543"/>
-          </a:xfrm>
-          <a:prstGeom prst="rect">
-            <a:avLst/>
-          </a:prstGeom>
-          <a:solidFill>
-            <a:schemeClr val="tx1">
-              <a:lumMod val="75000"/>
-              <a:lumOff val="25000"/>
-            </a:schemeClr>
-          </a:solidFill>
-          <a:ln>
-            <a:noFill/>
-          </a:ln>
-        </p:spPr>
-        <p:style>
-          <a:lnRef idx="2">
-            <a:schemeClr val="accent1">
-              <a:shade val="50000"/>
-            </a:schemeClr>
-          </a:lnRef>
-          <a:fillRef idx="1">
-            <a:schemeClr val="accent1"/>
-          </a:fillRef>
-          <a:effectRef idx="0">
-            <a:schemeClr val="accent1"/>
-          </a:effectRef>
-          <a:fontRef idx="minor">
-            <a:schemeClr val="lt1"/>
-          </a:fontRef>
-        </p:style>
-        <p:txBody>
-          <a:bodyPr rtlCol="0" anchor="ctr"/>
-          <a:lstStyle/>
-          <a:p>
-            <a:pPr marL="0" marR="0" lvl="0" indent="0" algn="ctr" defTabSz="914400" rtl="0" eaLnBrk="1" fontAlgn="auto" latinLnBrk="0" hangingPunct="1">
-              <a:lnSpc>
-                <a:spcPct val="100000"/>
-              </a:lnSpc>
-              <a:spcBef>
-                <a:spcPts val="0"/>
-              </a:spcBef>
-              <a:spcAft>
-                <a:spcPts val="0"/>
-              </a:spcAft>
-              <a:buClrTx/>
-              <a:buSzTx/>
-              <a:buFontTx/>
-              <a:buNone/>
-              <a:tabLst/>
-              <a:defRPr/>
-            </a:pPr>
-            <a:endParaRPr kumimoji="0" lang="en-US" sz="1800" b="0" i="0" u="none" strike="noStrike" kern="1200" cap="none" spc="0" normalizeH="0" baseline="0" noProof="0">
-              <a:ln>
-                <a:noFill/>
-              </a:ln>
-              <a:solidFill>
-                <a:prstClr val="white"/>
-              </a:solidFill>
-              <a:effectLst/>
-              <a:uLnTx/>
-              <a:uFillTx/>
-              <a:latin typeface="Tw Cen MT" panose="020B0602020104020603"/>
-              <a:ea typeface="+mn-ea"/>
-              <a:cs typeface="+mn-cs"/>
-            </a:endParaRPr>
-          </a:p>
-        </p:txBody>
-      </p:sp>
-      <p:sp>
-        <p:nvSpPr>
-          <p:cNvPr id="2" name="Title 1">
-            <a:extLst>
-              <a:ext uri="{FF2B5EF4-FFF2-40B4-BE49-F238E27FC236}">
-                <a16:creationId xmlns:a16="http://schemas.microsoft.com/office/drawing/2014/main" id="{1786866D-A435-4CF0-908C-E7FC50CA1600}"/>
-              </a:ext>
-            </a:extLst>
-          </p:cNvPr>
-          <p:cNvSpPr>
-            <a:spLocks noGrp="1"/>
-          </p:cNvSpPr>
-          <p:nvPr>
-            <p:ph type="title"/>
-          </p:nvPr>
-        </p:nvSpPr>
-        <p:spPr>
-          <a:xfrm>
-            <a:off x="634276" y="4892358"/>
-            <a:ext cx="3322261" cy="1325563"/>
+            <a:off x="684275" y="364491"/>
+            <a:ext cx="10515600" cy="933958"/>
           </a:xfrm>
         </p:spPr>
         <p:txBody>
-          <a:bodyPr vert="horz" lIns="91440" tIns="45720" rIns="91440" bIns="45720" rtlCol="0" anchor="ctr">
+          <a:bodyPr>
             <a:normAutofit/>
           </a:bodyPr>
           <a:lstStyle/>
           <a:p>
-            <a:pPr algn="ctr"/>
-            <a:r>
-              <a:rPr lang="en-US" sz="3600" kern="1200" dirty="0">
+            <a:r>
+              <a:rPr lang="en-US" sz="3600" dirty="0">
+                <a:latin typeface="Segoe UI Semibold (Headings)"/>
+              </a:rPr>
+              <a:t>SaaS</a:t>
+            </a:r>
+            <a:endParaRPr lang="en-US" sz="3600" dirty="0"/>
+          </a:p>
+        </p:txBody>
+      </p:sp>
+      <p:sp>
+        <p:nvSpPr>
+          <p:cNvPr id="6" name="Text Placeholder 5"/>
+          <p:cNvSpPr>
+            <a:spLocks noGrp="1"/>
+          </p:cNvSpPr>
+          <p:nvPr>
+            <p:ph type="body" sz="quarter" idx="10"/>
+          </p:nvPr>
+        </p:nvSpPr>
+        <p:spPr>
+          <a:xfrm>
+            <a:off x="626548" y="5161886"/>
+            <a:ext cx="11370380" cy="1696113"/>
+          </a:xfrm>
+        </p:spPr>
+        <p:txBody>
+          <a:bodyPr>
+            <a:noAutofit/>
+          </a:bodyPr>
+          <a:lstStyle/>
+          <a:p>
+            <a:pPr marL="0" indent="0">
+              <a:buNone/>
+            </a:pPr>
+            <a:r>
+              <a:rPr lang="en-US" dirty="0">
+                <a:latin typeface="Segoe UI Semilight" panose="020B0402040204020203" pitchFamily="34" charset="0"/>
+                <a:cs typeface="Segoe UI Semilight" panose="020B0402040204020203" pitchFamily="34" charset="0"/>
+              </a:rPr>
+              <a:t>SaaS is software that is centrally hosted and managed for the end customer. It allows users to connect to and use cloud-based apps over the internet. Common examples are email, calendars, and office tools such as Microsoft Office 365</a:t>
+            </a:r>
+            <a:r>
+              <a:rPr lang="en-US" dirty="0">
                 <a:solidFill>
                   <a:schemeClr val="bg1"/>
                 </a:solidFill>
-                <a:latin typeface="Segoe UI Semibold (Headings)"/>
+                <a:latin typeface="Segoe UI Semilight" panose="020B0402040204020203" pitchFamily="34" charset="0"/>
+                <a:cs typeface="Segoe UI Semilight" panose="020B0402040204020203" pitchFamily="34" charset="0"/>
               </a:rPr>
-              <a:t>SaaS</a:t>
+              <a:t>.</a:t>
             </a:r>
           </a:p>
         </p:txBody>
       </p:sp>
       <p:pic>
         <p:nvPicPr>
-          <p:cNvPr id="6" name="Picture 5" descr="SaaS encompasses PaaS, which encompasses IaaS. The IaaS icons are Servers and Storage, Networking firewalls and security, and Datacenter physical plant and security. In addition to the IaaS icons, PaaS icons include an Operating systems icon, and a Development tools, database management, and business analytics icon. The SaaS icon includes all of the PaaS icon and a Hosted applications and apps icon.">
+          <p:cNvPr id="7" name="Picture 6" descr="SaaS encompasses PaaS, which encompasses IaaS. The IaaS icons are Servers and Storage, Networking firewalls and security, and Datacenter physical plant and security. In addition to the IaaS icons, PaaS icons include an Operating systems icon, and a Development tools, database management, and business analytics icon. The SaaS icon includes all of the PaaS icon and a Hosted applications and apps icon.">
             <a:extLst>
               <a:ext uri="{FF2B5EF4-FFF2-40B4-BE49-F238E27FC236}">
-                <a16:creationId xmlns:a16="http://schemas.microsoft.com/office/drawing/2014/main" id="{3736F518-16D9-40E6-BB25-30605A32E18B}"/>
+                <a16:creationId xmlns:a16="http://schemas.microsoft.com/office/drawing/2014/main" id="{59190E1F-A53C-40E4-A200-B8E2EC4D4BCC}"/>
               </a:ext>
             </a:extLst>
           </p:cNvPr>
@@ -27027,125 +26053,36 @@
         </p:blipFill>
         <p:spPr>
           <a:xfrm>
-            <a:off x="417096" y="66786"/>
-            <a:ext cx="10972800" cy="4306825"/>
+            <a:off x="626548" y="1010313"/>
+            <a:ext cx="10823450" cy="4248205"/>
           </a:xfrm>
           <a:prstGeom prst="rect">
             <a:avLst/>
           </a:prstGeom>
         </p:spPr>
       </p:pic>
-      <p:cxnSp>
-        <p:nvCxnSpPr>
-          <p:cNvPr id="17" name="Straight Connector 16">
-            <a:extLst>
-              <a:ext uri="{FF2B5EF4-FFF2-40B4-BE49-F238E27FC236}">
-                <a16:creationId xmlns:a16="http://schemas.microsoft.com/office/drawing/2014/main" id="{CE272F12-AF86-441A-BC1B-C014BBBF85B5}"/>
-              </a:ext>
-              <a:ext uri="{C183D7F6-B498-43B3-948B-1728B52AA6E4}">
-                <adec:decorative xmlns:adec="http://schemas.microsoft.com/office/drawing/2017/decorative" val="1"/>
-              </a:ext>
-            </a:extLst>
-          </p:cNvPr>
-          <p:cNvCxnSpPr>
-            <a:cxnSpLocks noGrp="1" noRot="1" noChangeAspect="1" noMove="1" noResize="1" noEditPoints="1" noAdjustHandles="1" noChangeArrowheads="1" noChangeShapeType="1"/>
-          </p:cNvCxnSpPr>
-          <p:nvPr>
-            <p:extLst>
-              <p:ext uri="{386F3935-93C4-4BCD-93E2-E3B085C9AB24}">
-                <p16:designElem xmlns:p16="http://schemas.microsoft.com/office/powerpoint/2015/main" val="1"/>
-              </p:ext>
-            </p:extLst>
-          </p:nvPr>
-        </p:nvCxnSpPr>
-        <p:spPr>
-          <a:xfrm flipV="1">
-            <a:off x="4639665" y="5097939"/>
-            <a:ext cx="0" cy="914400"/>
-          </a:xfrm>
-          <a:prstGeom prst="line">
-            <a:avLst/>
-          </a:prstGeom>
-          <a:ln w="19050">
-            <a:solidFill>
-              <a:schemeClr val="bg1">
-                <a:alpha val="70000"/>
-              </a:schemeClr>
-            </a:solidFill>
-          </a:ln>
-        </p:spPr>
-        <p:style>
-          <a:lnRef idx="1">
-            <a:schemeClr val="accent1"/>
-          </a:lnRef>
-          <a:fillRef idx="0">
-            <a:schemeClr val="accent1"/>
-          </a:fillRef>
-          <a:effectRef idx="0">
-            <a:schemeClr val="accent1"/>
-          </a:effectRef>
-          <a:fontRef idx="minor">
-            <a:schemeClr val="tx1"/>
-          </a:fontRef>
-        </p:style>
-      </p:cxnSp>
-      <p:sp>
-        <p:nvSpPr>
-          <p:cNvPr id="3" name="Text Placeholder 2">
-            <a:extLst>
-              <a:ext uri="{FF2B5EF4-FFF2-40B4-BE49-F238E27FC236}">
-                <a16:creationId xmlns:a16="http://schemas.microsoft.com/office/drawing/2014/main" id="{013477EB-7FAD-4477-A63C-B9B582BD14A4}"/>
-              </a:ext>
-            </a:extLst>
-          </p:cNvPr>
-          <p:cNvSpPr>
-            <a:spLocks noGrp="1"/>
-          </p:cNvSpPr>
-          <p:nvPr>
-            <p:ph type="body" sz="quarter" idx="10"/>
-          </p:nvPr>
-        </p:nvSpPr>
-        <p:spPr>
-          <a:xfrm>
-            <a:off x="5082489" y="4578520"/>
-            <a:ext cx="7448027" cy="2285542"/>
-          </a:xfrm>
-        </p:spPr>
-        <p:txBody>
-          <a:bodyPr vert="horz" lIns="91440" tIns="45720" rIns="91440" bIns="45720" rtlCol="0" anchor="ctr">
-            <a:noAutofit/>
-          </a:bodyPr>
-          <a:lstStyle/>
-          <a:p>
-            <a:pPr marL="0" indent="0">
-              <a:buNone/>
-            </a:pPr>
-            <a:r>
-              <a:rPr lang="en-US" sz="2600" dirty="0">
-                <a:solidFill>
-                  <a:schemeClr val="bg1"/>
-                </a:solidFill>
-                <a:latin typeface="Segoe UI Semilight" panose="020B0402040204020203" pitchFamily="34" charset="0"/>
-                <a:cs typeface="Segoe UI Semilight" panose="020B0402040204020203" pitchFamily="34" charset="0"/>
-              </a:rPr>
-              <a:t>SaaS is software that is centrally hosted and managed for the end customer. It allows users to connect to and use cloud-based apps over the internet. Common examples are email, calendars, and office tools such as Microsoft Office 365.</a:t>
-            </a:r>
-          </a:p>
-        </p:txBody>
-      </p:sp>
     </p:spTree>
     <p:extLst>
       <p:ext uri="{BB962C8B-B14F-4D97-AF65-F5344CB8AC3E}">
-        <p14:creationId xmlns:p14="http://schemas.microsoft.com/office/powerpoint/2010/main" val="2948584715"/>
+        <p14:creationId xmlns:p14="http://schemas.microsoft.com/office/powerpoint/2010/main" val="834699987"/>
       </p:ext>
     </p:extLst>
   </p:cSld>
   <p:clrMapOvr>
     <a:masterClrMapping/>
   </p:clrMapOvr>
-  <p:transition>
-    <p:fade/>
-  </p:transition>
+  <mc:AlternateContent xmlns:mc="http://schemas.openxmlformats.org/markup-compatibility/2006" xmlns:p14="http://schemas.microsoft.com/office/powerpoint/2010/main">
+    <mc:Choice Requires="p14">
+      <p:transition spd="med" p14:dur="700">
+        <p:fade/>
+      </p:transition>
+    </mc:Choice>
+    <mc:Fallback xmlns="">
+      <p:transition spd="med">
+        <p:fade/>
+      </p:transition>
+    </mc:Fallback>
+  </mc:AlternateContent>
 </p:sld>
 </file>
 
@@ -28597,14 +27534,6 @@
 <file path=ppt/slides/slide9.xml><?xml version="1.0" encoding="utf-8"?>
 <p:sld xmlns:a="http://schemas.openxmlformats.org/drawingml/2006/main" xmlns:r="http://schemas.openxmlformats.org/officeDocument/2006/relationships" xmlns:p="http://schemas.openxmlformats.org/presentationml/2006/main">
   <p:cSld>
-    <p:bg>
-      <p:bgPr>
-        <a:solidFill>
-          <a:schemeClr val="bg1"/>
-        </a:solidFill>
-        <a:effectLst/>
-      </p:bgPr>
-    </p:bg>
     <p:spTree>
       <p:nvGrpSpPr>
         <p:cNvPr id="1" name=""/>
@@ -28621,111 +27550,7 @@
       </p:grpSpPr>
       <p:sp>
         <p:nvSpPr>
-          <p:cNvPr id="14" name="Rectangle 9">
-            <a:extLst>
-              <a:ext uri="{FF2B5EF4-FFF2-40B4-BE49-F238E27FC236}">
-                <a16:creationId xmlns:a16="http://schemas.microsoft.com/office/drawing/2014/main" id="{AB45A142-4255-493C-8284-5D566C121B10}"/>
-              </a:ext>
-              <a:ext uri="{C183D7F6-B498-43B3-948B-1728B52AA6E4}">
-                <adec:decorative xmlns:adec="http://schemas.microsoft.com/office/drawing/2017/decorative" val="1"/>
-              </a:ext>
-            </a:extLst>
-          </p:cNvPr>
-          <p:cNvSpPr>
-            <a:spLocks noGrp="1" noRot="1" noChangeAspect="1" noMove="1" noResize="1" noEditPoints="1" noAdjustHandles="1" noChangeArrowheads="1" noChangeShapeType="1" noTextEdit="1"/>
-          </p:cNvSpPr>
-          <p:nvPr>
-            <p:extLst>
-              <p:ext uri="{386F3935-93C4-4BCD-93E2-E3B085C9AB24}">
-                <p16:designElem xmlns:p16="http://schemas.microsoft.com/office/powerpoint/2015/main" val="1"/>
-              </p:ext>
-            </p:extLst>
-          </p:nvPr>
-        </p:nvSpPr>
-        <p:spPr bwMode="ltGray">
-          <a:xfrm>
-            <a:off x="336884" y="321177"/>
-            <a:ext cx="4332307" cy="6179552"/>
-          </a:xfrm>
-          <a:prstGeom prst="rect">
-            <a:avLst/>
-          </a:prstGeom>
-          <a:solidFill>
-            <a:srgbClr val="404040">
-              <a:alpha val="89804"/>
-            </a:srgbClr>
-          </a:solidFill>
-          <a:ln w="127000" cap="sq" cmpd="thinThick">
-            <a:solidFill>
-              <a:srgbClr val="595959">
-                <a:alpha val="80000"/>
-              </a:srgbClr>
-            </a:solidFill>
-          </a:ln>
-        </p:spPr>
-        <p:style>
-          <a:lnRef idx="2">
-            <a:schemeClr val="accent1">
-              <a:shade val="50000"/>
-            </a:schemeClr>
-          </a:lnRef>
-          <a:fillRef idx="1">
-            <a:schemeClr val="accent1"/>
-          </a:fillRef>
-          <a:effectRef idx="0">
-            <a:schemeClr val="accent1"/>
-          </a:effectRef>
-          <a:fontRef idx="minor">
-            <a:schemeClr val="lt1"/>
-          </a:fontRef>
-        </p:style>
-        <p:txBody>
-          <a:bodyPr rtlCol="0" anchor="ctr"/>
-          <a:lstStyle/>
-          <a:p>
-            <a:pPr marL="0" marR="0" lvl="0" indent="0" algn="ctr" defTabSz="914400" rtl="0" eaLnBrk="1" fontAlgn="auto" latinLnBrk="0" hangingPunct="1">
-              <a:lnSpc>
-                <a:spcPct val="100000"/>
-              </a:lnSpc>
-              <a:spcBef>
-                <a:spcPts val="0"/>
-              </a:spcBef>
-              <a:spcAft>
-                <a:spcPts val="0"/>
-              </a:spcAft>
-              <a:buClrTx/>
-              <a:buSzTx/>
-              <a:buFontTx/>
-              <a:buNone/>
-              <a:tabLst/>
-              <a:defRPr/>
-            </a:pPr>
-            <a:endParaRPr kumimoji="0" lang="en-US" sz="1800" b="0" i="0" u="none" strike="noStrike" kern="1200" cap="none" spc="0" normalizeH="0" baseline="0" noProof="0" dirty="0">
-              <a:ln>
-                <a:noFill/>
-              </a:ln>
-              <a:solidFill>
-                <a:prstClr val="white"/>
-              </a:solidFill>
-              <a:effectLst/>
-              <a:uLnTx/>
-              <a:uFillTx/>
-              <a:latin typeface="Calibri" panose="020F0502020204030204"/>
-              <a:ea typeface="+mn-ea"/>
-              <a:cs typeface="+mn-cs"/>
-            </a:endParaRPr>
-          </a:p>
-        </p:txBody>
-      </p:sp>
-      <p:sp>
-        <p:nvSpPr>
-          <p:cNvPr id="2" name="Title 1">
-            <a:extLst>
-              <a:ext uri="{FF2B5EF4-FFF2-40B4-BE49-F238E27FC236}">
-                <a16:creationId xmlns:a16="http://schemas.microsoft.com/office/drawing/2014/main" id="{0A75F90D-B26C-4841-A34E-779F74FBE1DE}"/>
-              </a:ext>
-            </a:extLst>
-          </p:cNvPr>
+          <p:cNvPr id="17" name="Title 16"/>
           <p:cNvSpPr>
             <a:spLocks noGrp="1"/>
           </p:cNvSpPr>
@@ -28735,44 +27560,34 @@
         </p:nvSpPr>
         <p:spPr>
           <a:xfrm>
-            <a:off x="505560" y="2071211"/>
-            <a:ext cx="3994954" cy="1753043"/>
+            <a:off x="588263" y="457200"/>
+            <a:ext cx="11018520" cy="553998"/>
           </a:xfrm>
         </p:spPr>
         <p:txBody>
-          <a:bodyPr vert="horz" lIns="91440" tIns="45720" rIns="91440" bIns="45720" rtlCol="0" anchor="b">
-            <a:normAutofit/>
-          </a:bodyPr>
+          <a:bodyPr/>
           <a:lstStyle/>
           <a:p>
-            <a:pPr algn="ctr"/>
-            <a:r>
-              <a:rPr lang="en-US" sz="4800" b="1" kern="1200" dirty="0">
+            <a:r>
+              <a:rPr lang="en-US" b="1" dirty="0">
                 <a:solidFill>
-                  <a:srgbClr val="FFFFFF"/>
+                  <a:schemeClr val="tx1"/>
                 </a:solidFill>
                 <a:latin typeface="Segoe UI Semibold (Headings)"/>
               </a:rPr>
               <a:t>Consumption-based model</a:t>
             </a:r>
-            <a:endParaRPr lang="en-US" sz="4800" kern="1200" dirty="0">
+            <a:endParaRPr lang="en-US" dirty="0">
               <a:solidFill>
-                <a:srgbClr val="FFFFFF"/>
+                <a:schemeClr val="tx1"/>
               </a:solidFill>
-              <a:latin typeface="Segoe UI Semibold (Headings)"/>
             </a:endParaRPr>
           </a:p>
         </p:txBody>
       </p:sp>
       <p:sp>
         <p:nvSpPr>
-          <p:cNvPr id="3" name="Text Placeholder 2">
-            <a:extLst>
-              <a:ext uri="{FF2B5EF4-FFF2-40B4-BE49-F238E27FC236}">
-                <a16:creationId xmlns:a16="http://schemas.microsoft.com/office/drawing/2014/main" id="{7A82A1C3-BB15-4168-9A47-D2275EF75806}"/>
-              </a:ext>
-            </a:extLst>
-          </p:cNvPr>
+          <p:cNvPr id="6" name="Text Placeholder 5"/>
           <p:cNvSpPr>
             <a:spLocks noGrp="1"/>
           </p:cNvSpPr>
@@ -28782,90 +27597,34 @@
         </p:nvSpPr>
         <p:spPr>
           <a:xfrm>
-            <a:off x="674237" y="4170501"/>
-            <a:ext cx="3657600" cy="1525597"/>
+            <a:off x="586740" y="5676418"/>
+            <a:ext cx="11018520" cy="430887"/>
           </a:xfrm>
         </p:spPr>
         <p:txBody>
-          <a:bodyPr vert="horz" lIns="91440" tIns="45720" rIns="91440" bIns="45720" rtlCol="0">
-            <a:normAutofit/>
-          </a:bodyPr>
+          <a:bodyPr/>
           <a:lstStyle/>
           <a:p>
             <a:pPr marL="0" indent="0" algn="ctr">
               <a:buNone/>
             </a:pPr>
             <a:r>
-              <a:rPr lang="en-US" sz="2000" kern="1200" dirty="0">
+              <a:rPr lang="en-US" dirty="0">
                 <a:solidFill>
-                  <a:srgbClr val="FFFFFF"/>
+                  <a:schemeClr val="tx1"/>
                 </a:solidFill>
-                <a:latin typeface="Segoe UI Semilight" panose="020B0402040204020203" pitchFamily="34" charset="0"/>
-                <a:cs typeface="Segoe UI Semilight" panose="020B0402040204020203" pitchFamily="34" charset="0"/>
               </a:rPr>
               <a:t>Users only pay for the resources they use</a:t>
             </a:r>
           </a:p>
         </p:txBody>
       </p:sp>
-      <p:cxnSp>
-        <p:nvCxnSpPr>
-          <p:cNvPr id="15" name="Straight Connector 11">
+      <p:pic>
+        <p:nvPicPr>
+          <p:cNvPr id="4" name="Picture 3" descr="A diagram has an arrow pointing from physical structures to a user with ideas in the cloud, representing the migration from CapEx to OpEx.">
             <a:extLst>
               <a:ext uri="{FF2B5EF4-FFF2-40B4-BE49-F238E27FC236}">
-                <a16:creationId xmlns:a16="http://schemas.microsoft.com/office/drawing/2014/main" id="{38FB9660-F42F-4313-BBC4-47C007FE484C}"/>
-              </a:ext>
-              <a:ext uri="{C183D7F6-B498-43B3-948B-1728B52AA6E4}">
-                <adec:decorative xmlns:adec="http://schemas.microsoft.com/office/drawing/2017/decorative" val="1"/>
-              </a:ext>
-            </a:extLst>
-          </p:cNvPr>
-          <p:cNvCxnSpPr>
-            <a:cxnSpLocks noGrp="1" noRot="1" noChangeAspect="1" noMove="1" noResize="1" noEditPoints="1" noAdjustHandles="1" noChangeArrowheads="1" noChangeShapeType="1"/>
-          </p:cNvCxnSpPr>
-          <p:nvPr>
-            <p:extLst>
-              <p:ext uri="{386F3935-93C4-4BCD-93E2-E3B085C9AB24}">
-                <p16:designElem xmlns:p16="http://schemas.microsoft.com/office/powerpoint/2015/main" val="1"/>
-              </p:ext>
-            </p:extLst>
-          </p:nvPr>
-        </p:nvCxnSpPr>
-        <p:spPr>
-          <a:xfrm>
-            <a:off x="1191126" y="3910267"/>
-            <a:ext cx="2586790" cy="0"/>
-          </a:xfrm>
-          <a:prstGeom prst="line">
-            <a:avLst/>
-          </a:prstGeom>
-          <a:ln w="22225">
-            <a:solidFill>
-              <a:srgbClr val="D9D9D9"/>
-            </a:solidFill>
-          </a:ln>
-        </p:spPr>
-        <p:style>
-          <a:lnRef idx="1">
-            <a:schemeClr val="accent1"/>
-          </a:lnRef>
-          <a:fillRef idx="0">
-            <a:schemeClr val="accent1"/>
-          </a:fillRef>
-          <a:effectRef idx="0">
-            <a:schemeClr val="accent1"/>
-          </a:effectRef>
-          <a:fontRef idx="minor">
-            <a:schemeClr val="tx1"/>
-          </a:fontRef>
-        </p:style>
-      </p:cxnSp>
-      <p:pic>
-        <p:nvPicPr>
-          <p:cNvPr id="5" name="Picture 4" descr="A diagram has an arrow pointing from physical structures to a user with ideas in the cloud, representing the migration from CapEx to OpEx.">
-            <a:extLst>
-              <a:ext uri="{FF2B5EF4-FFF2-40B4-BE49-F238E27FC236}">
-                <a16:creationId xmlns:a16="http://schemas.microsoft.com/office/drawing/2014/main" id="{134B56CE-A3FF-445C-895A-88E6B85D37A0}"/>
+                <a16:creationId xmlns:a16="http://schemas.microsoft.com/office/drawing/2014/main" id="{1B341E22-07FC-42FC-88ED-2A57D3248354}"/>
               </a:ext>
             </a:extLst>
           </p:cNvPr>
@@ -28888,8 +27647,8 @@
         </p:blipFill>
         <p:spPr>
           <a:xfrm>
-            <a:off x="5134620" y="1778000"/>
-            <a:ext cx="6572748" cy="3300299"/>
+            <a:off x="2583444" y="1563407"/>
+            <a:ext cx="7048026" cy="3538945"/>
           </a:xfrm>
           <a:prstGeom prst="rect">
             <a:avLst/>
@@ -28899,16 +27658,25 @@
     </p:spTree>
     <p:extLst>
       <p:ext uri="{BB962C8B-B14F-4D97-AF65-F5344CB8AC3E}">
-        <p14:creationId xmlns:p14="http://schemas.microsoft.com/office/powerpoint/2010/main" val="2915803039"/>
+        <p14:creationId xmlns:p14="http://schemas.microsoft.com/office/powerpoint/2010/main" val="2506531128"/>
       </p:ext>
     </p:extLst>
   </p:cSld>
   <p:clrMapOvr>
     <a:masterClrMapping/>
   </p:clrMapOvr>
-  <p:transition>
-    <p:fade/>
-  </p:transition>
+  <mc:AlternateContent xmlns:mc="http://schemas.openxmlformats.org/markup-compatibility/2006" xmlns:p14="http://schemas.microsoft.com/office/powerpoint/2010/main">
+    <mc:Choice Requires="p14">
+      <p:transition spd="med" p14:dur="700">
+        <p:fade/>
+      </p:transition>
+    </mc:Choice>
+    <mc:Fallback xmlns="">
+      <p:transition spd="med">
+        <p:fade/>
+      </p:transition>
+    </mc:Fallback>
+  </mc:AlternateContent>
 </p:sld>
 </file>
 
@@ -30360,21 +29128,6 @@
 </file>
 
 <file path=customXml/item1.xml><?xml version="1.0" encoding="utf-8"?>
-<?mso-contentType ?>
-<FormTemplates xmlns="http://schemas.microsoft.com/sharepoint/v3/contenttype/forms">
-  <Display>DocumentLibraryForm</Display>
-  <Edit>DocumentLibraryForm</Edit>
-  <New>DocumentLibraryForm</New>
-</FormTemplates>
-</file>
-
-<file path=customXml/item2.xml><?xml version="1.0" encoding="utf-8"?>
-<p:properties xmlns:p="http://schemas.microsoft.com/office/2006/metadata/properties" xmlns:xsi="http://www.w3.org/2001/XMLSchema-instance" xmlns:pc="http://schemas.microsoft.com/office/infopath/2007/PartnerControls">
-  <documentManagement/>
-</p:properties>
-</file>
-
-<file path=customXml/item3.xml><?xml version="1.0" encoding="utf-8"?>
 <ct:contentTypeSchema xmlns:ct="http://schemas.microsoft.com/office/2006/metadata/contentType" xmlns:ma="http://schemas.microsoft.com/office/2006/metadata/properties/metaAttributes" ct:_="" ma:_="" ma:contentTypeName="Document" ma:contentTypeID="0x010100A2B0BB5962AB3C45A9A1CE1EC4C4F647" ma:contentTypeVersion="3" ma:contentTypeDescription="Create a new document." ma:contentTypeScope="" ma:versionID="f0876370c90de824ab54c09b0bd2a056">
   <xsd:schema xmlns:xsd="http://www.w3.org/2001/XMLSchema" xmlns:xs="http://www.w3.org/2001/XMLSchema" xmlns:p="http://schemas.microsoft.com/office/2006/metadata/properties" xmlns:ns3="630a2e83-186a-4a0f-ab27-bee8a8096abc" targetNamespace="http://schemas.microsoft.com/office/2006/metadata/properties" ma:root="true" ma:fieldsID="a2a3b5ed8b4accd7c8a398d0cb075271" ns3:_="">
     <xsd:import namespace="630a2e83-186a-4a0f-ab27-bee8a8096abc"/>
@@ -30528,10 +29281,35 @@
 </ct:contentTypeSchema>
 </file>
 
+<file path=customXml/item2.xml><?xml version="1.0" encoding="utf-8"?>
+<p:properties xmlns:p="http://schemas.microsoft.com/office/2006/metadata/properties" xmlns:xsi="http://www.w3.org/2001/XMLSchema-instance" xmlns:pc="http://schemas.microsoft.com/office/infopath/2007/PartnerControls">
+  <documentManagement/>
+</p:properties>
+</file>
+
+<file path=customXml/item3.xml><?xml version="1.0" encoding="utf-8"?>
+<?mso-contentType ?>
+<FormTemplates xmlns="http://schemas.microsoft.com/sharepoint/v3/contenttype/forms">
+  <Display>DocumentLibraryForm</Display>
+  <Edit>DocumentLibraryForm</Edit>
+  <New>DocumentLibraryForm</New>
+</FormTemplates>
+</file>
+
 <file path=customXml/itemProps1.xml><?xml version="1.0" encoding="utf-8"?>
-<ds:datastoreItem xmlns:ds="http://schemas.openxmlformats.org/officeDocument/2006/customXml" ds:itemID="{758FDAC0-319D-4A54-8D8E-1D42CB1F8004}">
+<ds:datastoreItem xmlns:ds="http://schemas.openxmlformats.org/officeDocument/2006/customXml" ds:itemID="{F330841A-A209-44E7-824E-9DDB4DE0DC3C}">
   <ds:schemaRefs>
-    <ds:schemaRef ds:uri="http://schemas.microsoft.com/sharepoint/v3/contenttype/forms"/>
+    <ds:schemaRef ds:uri="http://schemas.microsoft.com/office/2006/metadata/contentType"/>
+    <ds:schemaRef ds:uri="http://schemas.microsoft.com/office/2006/metadata/properties/metaAttributes"/>
+    <ds:schemaRef ds:uri="http://www.w3.org/2001/XMLSchema"/>
+    <ds:schemaRef ds:uri="http://schemas.microsoft.com/office/2006/metadata/properties"/>
+    <ds:schemaRef ds:uri="630a2e83-186a-4a0f-ab27-bee8a8096abc"/>
+    <ds:schemaRef ds:uri="http://schemas.microsoft.com/office/2006/documentManagement/types"/>
+    <ds:schemaRef ds:uri="http://schemas.microsoft.com/office/infopath/2007/PartnerControls"/>
+    <ds:schemaRef ds:uri="http://schemas.openxmlformats.org/package/2006/metadata/core-properties"/>
+    <ds:schemaRef ds:uri="http://purl.org/dc/elements/1.1/"/>
+    <ds:schemaRef ds:uri="http://purl.org/dc/terms/"/>
+    <ds:schemaRef ds:uri="http://schemas.microsoft.com/internal/obd"/>
   </ds:schemaRefs>
 </ds:datastoreItem>
 </file>
@@ -30553,19 +29331,9 @@
 </file>
 
 <file path=customXml/itemProps3.xml><?xml version="1.0" encoding="utf-8"?>
-<ds:datastoreItem xmlns:ds="http://schemas.openxmlformats.org/officeDocument/2006/customXml" ds:itemID="{F330841A-A209-44E7-824E-9DDB4DE0DC3C}">
+<ds:datastoreItem xmlns:ds="http://schemas.openxmlformats.org/officeDocument/2006/customXml" ds:itemID="{758FDAC0-319D-4A54-8D8E-1D42CB1F8004}">
   <ds:schemaRefs>
-    <ds:schemaRef ds:uri="http://schemas.microsoft.com/office/2006/metadata/contentType"/>
-    <ds:schemaRef ds:uri="http://schemas.microsoft.com/office/2006/metadata/properties/metaAttributes"/>
-    <ds:schemaRef ds:uri="http://www.w3.org/2001/XMLSchema"/>
-    <ds:schemaRef ds:uri="http://schemas.microsoft.com/office/2006/metadata/properties"/>
-    <ds:schemaRef ds:uri="630a2e83-186a-4a0f-ab27-bee8a8096abc"/>
-    <ds:schemaRef ds:uri="http://schemas.microsoft.com/office/2006/documentManagement/types"/>
-    <ds:schemaRef ds:uri="http://schemas.microsoft.com/office/infopath/2007/PartnerControls"/>
-    <ds:schemaRef ds:uri="http://schemas.openxmlformats.org/package/2006/metadata/core-properties"/>
-    <ds:schemaRef ds:uri="http://purl.org/dc/elements/1.1/"/>
-    <ds:schemaRef ds:uri="http://purl.org/dc/terms/"/>
-    <ds:schemaRef ds:uri="http://schemas.microsoft.com/internal/obd"/>
+    <ds:schemaRef ds:uri="http://schemas.microsoft.com/sharepoint/v3/contenttype/forms"/>
   </ds:schemaRefs>
 </ds:datastoreItem>
 </file>
</xml_diff>

<commit_message>
added firewall walkthrough to mod 03 ppt
</commit_message>
<xml_diff>
--- a/Templates/PPTs and pdfs released apr 2019/AZ-900T01 Microsoft Azure Fundamentals-01.pptx
+++ b/Templates/PPTs and pdfs released apr 2019/AZ-900T01 Microsoft Azure Fundamentals-01.pptx
@@ -302,7 +302,7 @@
               <a:rPr lang="en-US" smtClean="0">
                 <a:latin typeface="Segoe UI" pitchFamily="34" charset="0"/>
               </a:rPr>
-              <a:t>4/6/2019 5:49 AM</a:t>
+              <a:t>4/6/2019 7:12 AM</a:t>
             </a:fld>
             <a:endParaRPr lang="en-US" dirty="0">
               <a:latin typeface="Segoe UI" pitchFamily="34" charset="0"/>
@@ -580,7 +580,7 @@
           <a:p>
             <a:fld id="{386CE63F-9E7F-4C04-9D0D-FCA25A8E9E86}" type="datetime8">
               <a:rPr lang="en-US" smtClean="0"/>
-              <a:t>4/6/2019 5:49 AM</a:t>
+              <a:t>4/6/2019 7:12 AM</a:t>
             </a:fld>
             <a:endParaRPr lang="en-US" dirty="0"/>
           </a:p>
@@ -947,7 +947,7 @@
           <a:p>
             <a:fld id="{3619146B-24F9-441E-A368-DB3B5A84C1D4}" type="datetime8">
               <a:rPr lang="en-US" smtClean="0"/>
-              <a:t>4/6/2019 5:49 AM</a:t>
+              <a:t>4/6/2019 7:12 AM</a:t>
             </a:fld>
             <a:endParaRPr lang="en-US" dirty="0"/>
           </a:p>
@@ -1112,7 +1112,7 @@
           <a:p>
             <a:fld id="{E2F19A73-88F5-4B80-A929-CF8E66EE5449}" type="datetime8">
               <a:rPr lang="en-US" smtClean="0"/>
-              <a:t>4/6/2019 5:49 AM</a:t>
+              <a:t>4/6/2019 7:12 AM</a:t>
             </a:fld>
             <a:endParaRPr lang="en-US" dirty="0"/>
           </a:p>
@@ -1277,7 +1277,7 @@
           <a:p>
             <a:fld id="{801BB6DB-292D-4F55-8FEB-A2186E983E2E}" type="datetime8">
               <a:rPr lang="en-US" smtClean="0"/>
-              <a:t>4/6/2019 5:49 AM</a:t>
+              <a:t>4/6/2019 7:12 AM</a:t>
             </a:fld>
             <a:endParaRPr lang="en-US" dirty="0"/>
           </a:p>
@@ -1545,7 +1545,7 @@
           <a:p>
             <a:fld id="{9427A7F7-BB1E-479D-AFAA-B52F4D0C99F2}" type="datetime8">
               <a:rPr lang="en-US" smtClean="0"/>
-              <a:t>4/6/2019 6:01 AM</a:t>
+              <a:t>4/6/2019 7:12 AM</a:t>
             </a:fld>
             <a:endParaRPr lang="en-US" dirty="0"/>
           </a:p>
@@ -1917,7 +1917,7 @@
           <a:p>
             <a:fld id="{9427A7F7-BB1E-479D-AFAA-B52F4D0C99F2}" type="datetime8">
               <a:rPr lang="en-US" smtClean="0"/>
-              <a:t>4/6/2019 6:01 AM</a:t>
+              <a:t>4/6/2019 7:12 AM</a:t>
             </a:fld>
             <a:endParaRPr lang="en-US" dirty="0"/>
           </a:p>
@@ -2314,7 +2314,7 @@
           <a:p>
             <a:fld id="{9427A7F7-BB1E-479D-AFAA-B52F4D0C99F2}" type="datetime8">
               <a:rPr lang="en-US" smtClean="0"/>
-              <a:t>4/6/2019 6:01 AM</a:t>
+              <a:t>4/6/2019 7:12 AM</a:t>
             </a:fld>
             <a:endParaRPr lang="en-US" dirty="0"/>
           </a:p>
@@ -2632,7 +2632,7 @@
           <a:p>
             <a:fld id="{9427A7F7-BB1E-479D-AFAA-B52F4D0C99F2}" type="datetime8">
               <a:rPr lang="en-US" smtClean="0"/>
-              <a:t>4/6/2019 5:49 AM</a:t>
+              <a:t>4/6/2019 7:12 AM</a:t>
             </a:fld>
             <a:endParaRPr lang="en-US" dirty="0"/>
           </a:p>
@@ -2797,7 +2797,7 @@
           <a:p>
             <a:fld id="{E2F19A73-88F5-4B80-A929-CF8E66EE5449}" type="datetime8">
               <a:rPr lang="en-US" smtClean="0"/>
-              <a:t>4/6/2019 5:49 AM</a:t>
+              <a:t>4/6/2019 7:12 AM</a:t>
             </a:fld>
             <a:endParaRPr lang="en-US" dirty="0"/>
           </a:p>
@@ -2962,7 +2962,7 @@
           <a:p>
             <a:fld id="{801BB6DB-292D-4F55-8FEB-A2186E983E2E}" type="datetime8">
               <a:rPr lang="en-US" smtClean="0"/>
-              <a:t>4/6/2019 5:49 AM</a:t>
+              <a:t>4/6/2019 7:12 AM</a:t>
             </a:fld>
             <a:endParaRPr lang="en-US" dirty="0"/>
           </a:p>
@@ -3146,7 +3146,7 @@
           <a:p>
             <a:fld id="{9427A7F7-BB1E-479D-AFAA-B52F4D0C99F2}" type="datetime8">
               <a:rPr lang="en-US" smtClean="0"/>
-              <a:t>4/6/2019 6:01 AM</a:t>
+              <a:t>4/6/2019 7:12 AM</a:t>
             </a:fld>
             <a:endParaRPr lang="en-US" dirty="0"/>
           </a:p>
@@ -3440,7 +3440,7 @@
           <a:p>
             <a:fld id="{9427A7F7-BB1E-479D-AFAA-B52F4D0C99F2}" type="datetime8">
               <a:rPr lang="en-US" smtClean="0"/>
-              <a:t>4/6/2019 6:02 AM</a:t>
+              <a:t>4/6/2019 7:12 AM</a:t>
             </a:fld>
             <a:endParaRPr lang="en-US" dirty="0"/>
           </a:p>
@@ -3605,7 +3605,7 @@
           <a:p>
             <a:fld id="{E2F19A73-88F5-4B80-A929-CF8E66EE5449}" type="datetime8">
               <a:rPr lang="en-US" smtClean="0"/>
-              <a:t>4/6/2019 5:49 AM</a:t>
+              <a:t>4/6/2019 7:12 AM</a:t>
             </a:fld>
             <a:endParaRPr lang="en-US" dirty="0"/>
           </a:p>
@@ -3838,7 +3838,7 @@
           <a:p>
             <a:fld id="{9427A7F7-BB1E-479D-AFAA-B52F4D0C99F2}" type="datetime8">
               <a:rPr lang="en-US" smtClean="0"/>
-              <a:t>4/6/2019 5:59 AM</a:t>
+              <a:t>4/6/2019 7:12 AM</a:t>
             </a:fld>
             <a:endParaRPr lang="en-US" dirty="0"/>
           </a:p>
@@ -4518,7 +4518,7 @@
           <a:p>
             <a:fld id="{9427A7F7-BB1E-479D-AFAA-B52F4D0C99F2}" type="datetime8">
               <a:rPr lang="en-US" smtClean="0"/>
-              <a:t>4/6/2019 5:49 AM</a:t>
+              <a:t>4/6/2019 7:12 AM</a:t>
             </a:fld>
             <a:endParaRPr lang="en-US" dirty="0"/>
           </a:p>
@@ -4747,7 +4747,7 @@
           <a:p>
             <a:fld id="{9427A7F7-BB1E-479D-AFAA-B52F4D0C99F2}" type="datetime8">
               <a:rPr lang="en-US" smtClean="0"/>
-              <a:t>4/6/2019 5:49 AM</a:t>
+              <a:t>4/6/2019 7:12 AM</a:t>
             </a:fld>
             <a:endParaRPr lang="en-US" dirty="0"/>
           </a:p>
@@ -4912,7 +4912,7 @@
           <a:p>
             <a:fld id="{E2F19A73-88F5-4B80-A929-CF8E66EE5449}" type="datetime8">
               <a:rPr lang="en-US" smtClean="0"/>
-              <a:t>4/6/2019 5:49 AM</a:t>
+              <a:t>4/6/2019 7:12 AM</a:t>
             </a:fld>
             <a:endParaRPr lang="en-US" dirty="0"/>
           </a:p>
@@ -5172,7 +5172,7 @@
           <a:p>
             <a:fld id="{2D0AF0B6-AF0D-4EDB-B60E-27694EB68262}" type="datetime8">
               <a:rPr lang="en-US" smtClean="0"/>
-              <a:t>4/6/2019 5:49 AM</a:t>
+              <a:t>4/6/2019 7:12 AM</a:t>
             </a:fld>
             <a:endParaRPr lang="en-US" dirty="0"/>
           </a:p>
@@ -5337,7 +5337,7 @@
           <a:p>
             <a:fld id="{72E0C910-0166-48E0-B8EF-5071277A02A8}" type="datetime8">
               <a:rPr lang="en-US" smtClean="0"/>
-              <a:t>4/6/2019 5:49 AM</a:t>
+              <a:t>4/6/2019 7:12 AM</a:t>
             </a:fld>
             <a:endParaRPr lang="en-US" dirty="0"/>
           </a:p>
@@ -5502,7 +5502,7 @@
           <a:p>
             <a:fld id="{E2F19A73-88F5-4B80-A929-CF8E66EE5449}" type="datetime8">
               <a:rPr lang="en-US" smtClean="0"/>
-              <a:t>4/6/2019 5:49 AM</a:t>
+              <a:t>4/6/2019 7:12 AM</a:t>
             </a:fld>
             <a:endParaRPr lang="en-US" dirty="0"/>
           </a:p>
@@ -5667,7 +5667,7 @@
           <a:p>
             <a:fld id="{801BB6DB-292D-4F55-8FEB-A2186E983E2E}" type="datetime8">
               <a:rPr lang="en-US" smtClean="0"/>
-              <a:t>4/6/2019 5:49 AM</a:t>
+              <a:t>4/6/2019 7:12 AM</a:t>
             </a:fld>
             <a:endParaRPr lang="en-US" dirty="0"/>
           </a:p>
@@ -5878,7 +5878,7 @@
           <a:p>
             <a:fld id="{9427A7F7-BB1E-479D-AFAA-B52F4D0C99F2}" type="datetime8">
               <a:rPr lang="en-US" smtClean="0"/>
-              <a:t>4/6/2019 5:49 AM</a:t>
+              <a:t>4/6/2019 7:12 AM</a:t>
             </a:fld>
             <a:endParaRPr lang="en-US" dirty="0"/>
           </a:p>
@@ -6104,7 +6104,7 @@
           <a:p>
             <a:fld id="{9427A7F7-BB1E-479D-AFAA-B52F4D0C99F2}" type="datetime8">
               <a:rPr lang="en-US" smtClean="0"/>
-              <a:t>4/6/2019 5:49 AM</a:t>
+              <a:t>4/6/2019 7:12 AM</a:t>
             </a:fld>
             <a:endParaRPr lang="en-US" dirty="0"/>
           </a:p>
@@ -6357,7 +6357,7 @@
           <a:p>
             <a:fld id="{9427A7F7-BB1E-479D-AFAA-B52F4D0C99F2}" type="datetime8">
               <a:rPr lang="en-US" smtClean="0"/>
-              <a:t>4/6/2019 5:49 AM</a:t>
+              <a:t>4/6/2019 7:12 AM</a:t>
             </a:fld>
             <a:endParaRPr lang="en-US" dirty="0"/>
           </a:p>
@@ -6630,7 +6630,7 @@
           <a:p>
             <a:fld id="{9427A7F7-BB1E-479D-AFAA-B52F4D0C99F2}" type="datetime8">
               <a:rPr lang="en-US" smtClean="0"/>
-              <a:t>4/6/2019 6:00 AM</a:t>
+              <a:t>4/6/2019 7:12 AM</a:t>
             </a:fld>
             <a:endParaRPr lang="en-US" dirty="0"/>
           </a:p>
@@ -26497,9 +26497,9 @@
           <a:bodyPr/>
           <a:lstStyle/>
           <a:p>
-            <a:pPr marL="457200" indent="-457200">
-              <a:buFont typeface="Arial" panose="020B0604020202020204" pitchFamily="34" charset="0"/>
-              <a:buChar char="•"/>
+            <a:pPr marL="514350" indent="-514350">
+              <a:buFont typeface="+mj-lt"/>
+              <a:buAutoNum type="arabicPeriod"/>
             </a:pPr>
             <a:r>
               <a:rPr lang="en-IE" dirty="0"/>
@@ -26507,9 +26507,9 @@
             </a:r>
           </a:p>
           <a:p>
-            <a:pPr marL="457200" indent="-457200">
-              <a:buFont typeface="Arial" panose="020B0604020202020204" pitchFamily="34" charset="0"/>
-              <a:buChar char="•"/>
+            <a:pPr marL="514350" indent="-514350">
+              <a:buFont typeface="+mj-lt"/>
+              <a:buAutoNum type="arabicPeriod"/>
             </a:pPr>
             <a:r>
               <a:rPr lang="en-IE" dirty="0"/>
@@ -26517,9 +26517,9 @@
             </a:r>
           </a:p>
           <a:p>
-            <a:pPr marL="457200" indent="-457200">
-              <a:buFont typeface="Arial" panose="020B0604020202020204" pitchFamily="34" charset="0"/>
-              <a:buChar char="•"/>
+            <a:pPr marL="514350" indent="-514350">
+              <a:buFont typeface="+mj-lt"/>
+              <a:buAutoNum type="arabicPeriod"/>
             </a:pPr>
             <a:r>
               <a:rPr lang="en-IE" dirty="0"/>
@@ -29128,6 +29128,12 @@
 </file>
 
 <file path=customXml/item1.xml><?xml version="1.0" encoding="utf-8"?>
+<p:properties xmlns:p="http://schemas.microsoft.com/office/2006/metadata/properties" xmlns:xsi="http://www.w3.org/2001/XMLSchema-instance" xmlns:pc="http://schemas.microsoft.com/office/infopath/2007/PartnerControls">
+  <documentManagement/>
+</p:properties>
+</file>
+
+<file path=customXml/item2.xml><?xml version="1.0" encoding="utf-8"?>
 <ct:contentTypeSchema xmlns:ct="http://schemas.microsoft.com/office/2006/metadata/contentType" xmlns:ma="http://schemas.microsoft.com/office/2006/metadata/properties/metaAttributes" ct:_="" ma:_="" ma:contentTypeName="Document" ma:contentTypeID="0x010100A2B0BB5962AB3C45A9A1CE1EC4C4F647" ma:contentTypeVersion="3" ma:contentTypeDescription="Create a new document." ma:contentTypeScope="" ma:versionID="f0876370c90de824ab54c09b0bd2a056">
   <xsd:schema xmlns:xsd="http://www.w3.org/2001/XMLSchema" xmlns:xs="http://www.w3.org/2001/XMLSchema" xmlns:p="http://schemas.microsoft.com/office/2006/metadata/properties" xmlns:ns3="630a2e83-186a-4a0f-ab27-bee8a8096abc" targetNamespace="http://schemas.microsoft.com/office/2006/metadata/properties" ma:root="true" ma:fieldsID="a2a3b5ed8b4accd7c8a398d0cb075271" ns3:_="">
     <xsd:import namespace="630a2e83-186a-4a0f-ab27-bee8a8096abc"/>
@@ -29281,12 +29287,6 @@
 </ct:contentTypeSchema>
 </file>
 
-<file path=customXml/item2.xml><?xml version="1.0" encoding="utf-8"?>
-<p:properties xmlns:p="http://schemas.microsoft.com/office/2006/metadata/properties" xmlns:xsi="http://www.w3.org/2001/XMLSchema-instance" xmlns:pc="http://schemas.microsoft.com/office/infopath/2007/PartnerControls">
-  <documentManagement/>
-</p:properties>
-</file>
-
 <file path=customXml/item3.xml><?xml version="1.0" encoding="utf-8"?>
 <?mso-contentType ?>
 <FormTemplates xmlns="http://schemas.microsoft.com/sharepoint/v3/contenttype/forms">
@@ -29297,6 +29297,22 @@
 </file>
 
 <file path=customXml/itemProps1.xml><?xml version="1.0" encoding="utf-8"?>
+<ds:datastoreItem xmlns:ds="http://schemas.openxmlformats.org/officeDocument/2006/customXml" ds:itemID="{F990F116-B58F-4255-B05B-DA3808E0E5C6}">
+  <ds:schemaRefs>
+    <ds:schemaRef ds:uri="http://purl.org/dc/elements/1.1/"/>
+    <ds:schemaRef ds:uri="http://schemas.microsoft.com/office/2006/metadata/properties"/>
+    <ds:schemaRef ds:uri="http://purl.org/dc/terms/"/>
+    <ds:schemaRef ds:uri="http://schemas.openxmlformats.org/package/2006/metadata/core-properties"/>
+    <ds:schemaRef ds:uri="630a2e83-186a-4a0f-ab27-bee8a8096abc"/>
+    <ds:schemaRef ds:uri="http://schemas.microsoft.com/office/2006/documentManagement/types"/>
+    <ds:schemaRef ds:uri="http://schemas.microsoft.com/office/infopath/2007/PartnerControls"/>
+    <ds:schemaRef ds:uri="http://www.w3.org/XML/1998/namespace"/>
+    <ds:schemaRef ds:uri="http://purl.org/dc/dcmitype/"/>
+  </ds:schemaRefs>
+</ds:datastoreItem>
+</file>
+
+<file path=customXml/itemProps2.xml><?xml version="1.0" encoding="utf-8"?>
 <ds:datastoreItem xmlns:ds="http://schemas.openxmlformats.org/officeDocument/2006/customXml" ds:itemID="{F330841A-A209-44E7-824E-9DDB4DE0DC3C}">
   <ds:schemaRefs>
     <ds:schemaRef ds:uri="http://schemas.microsoft.com/office/2006/metadata/contentType"/>
@@ -29314,22 +29330,6 @@
 </ds:datastoreItem>
 </file>
 
-<file path=customXml/itemProps2.xml><?xml version="1.0" encoding="utf-8"?>
-<ds:datastoreItem xmlns:ds="http://schemas.openxmlformats.org/officeDocument/2006/customXml" ds:itemID="{F990F116-B58F-4255-B05B-DA3808E0E5C6}">
-  <ds:schemaRefs>
-    <ds:schemaRef ds:uri="http://purl.org/dc/elements/1.1/"/>
-    <ds:schemaRef ds:uri="http://schemas.microsoft.com/office/2006/metadata/properties"/>
-    <ds:schemaRef ds:uri="http://purl.org/dc/terms/"/>
-    <ds:schemaRef ds:uri="http://schemas.openxmlformats.org/package/2006/metadata/core-properties"/>
-    <ds:schemaRef ds:uri="630a2e83-186a-4a0f-ab27-bee8a8096abc"/>
-    <ds:schemaRef ds:uri="http://schemas.microsoft.com/office/2006/documentManagement/types"/>
-    <ds:schemaRef ds:uri="http://schemas.microsoft.com/office/infopath/2007/PartnerControls"/>
-    <ds:schemaRef ds:uri="http://www.w3.org/XML/1998/namespace"/>
-    <ds:schemaRef ds:uri="http://purl.org/dc/dcmitype/"/>
-  </ds:schemaRefs>
-</ds:datastoreItem>
-</file>
-
 <file path=customXml/itemProps3.xml><?xml version="1.0" encoding="utf-8"?>
 <ds:datastoreItem xmlns:ds="http://schemas.openxmlformats.org/officeDocument/2006/customXml" ds:itemID="{758FDAC0-319D-4A54-8D8E-1D42CB1F8004}">
   <ds:schemaRefs>

</xml_diff>